<commit_message>
Delta change; format adjust
</commit_message>
<xml_diff>
--- a/01 天球概念与时间系统.pptx
+++ b/01 天球概念与时间系统.pptx
@@ -246,7 +246,7 @@
           <a:p>
             <a:fld id="{26DDD1A4-63E9-4C41-BD0C-A6576214358F}" type="datetimeFigureOut">
               <a:rPr kumimoji="1" lang="zh-CN" altLang="en-US" smtClean="0"/>
-              <a:t>2023/7/20</a:t>
+              <a:t>2023/8/7</a:t>
             </a:fld>
             <a:endParaRPr kumimoji="1" lang="zh-CN" altLang="en-US"/>
           </a:p>
@@ -840,7 +840,7 @@
           <a:p>
             <a:fld id="{8664C608-40B1-4030-A28D-5B74BC98ADCE}" type="datetimeFigureOut">
               <a:rPr lang="en-US" smtClean="0"/>
-              <a:t>7/20/2023</a:t>
+              <a:t>8/7/2023</a:t>
             </a:fld>
             <a:endParaRPr lang="en-US" dirty="0"/>
           </a:p>
@@ -1934,13 +1934,13 @@
   <p:clrMapOvr>
     <a:masterClrMapping/>
   </p:clrMapOvr>
-  <mc:AlternateContent xmlns:mc="http://schemas.openxmlformats.org/markup-compatibility/2006">
-    <mc:Choice xmlns:p159="http://schemas.microsoft.com/office/powerpoint/2015/09/main" Requires="p159">
+  <mc:AlternateContent xmlns:mc="http://schemas.openxmlformats.org/markup-compatibility/2006" xmlns:p159="http://schemas.microsoft.com/office/powerpoint/2015/09/main">
+    <mc:Choice Requires="p159">
       <p:transition spd="slow">
         <p159:morph option="byObject"/>
       </p:transition>
     </mc:Choice>
-    <mc:Fallback>
+    <mc:Fallback xmlns="">
       <p:transition spd="slow">
         <p:fade/>
       </p:transition>
@@ -2424,13 +2424,13 @@
   <p:clrMapOvr>
     <a:masterClrMapping/>
   </p:clrMapOvr>
-  <mc:AlternateContent xmlns:mc="http://schemas.openxmlformats.org/markup-compatibility/2006">
-    <mc:Choice xmlns:p159="http://schemas.microsoft.com/office/powerpoint/2015/09/main" Requires="p159">
+  <mc:AlternateContent xmlns:mc="http://schemas.openxmlformats.org/markup-compatibility/2006" xmlns:p159="http://schemas.microsoft.com/office/powerpoint/2015/09/main">
+    <mc:Choice Requires="p159">
       <p:transition spd="slow">
         <p159:morph option="byObject"/>
       </p:transition>
     </mc:Choice>
-    <mc:Fallback>
+    <mc:Fallback xmlns="">
       <p:transition spd="slow">
         <p:fade/>
       </p:transition>
@@ -3137,13 +3137,13 @@
   <p:clrMapOvr>
     <a:masterClrMapping/>
   </p:clrMapOvr>
-  <mc:AlternateContent xmlns:mc="http://schemas.openxmlformats.org/markup-compatibility/2006">
-    <mc:Choice xmlns:p159="http://schemas.microsoft.com/office/powerpoint/2015/09/main" Requires="p159">
+  <mc:AlternateContent xmlns:mc="http://schemas.openxmlformats.org/markup-compatibility/2006" xmlns:p159="http://schemas.microsoft.com/office/powerpoint/2015/09/main">
+    <mc:Choice Requires="p159">
       <p:transition spd="slow">
         <p159:morph option="byObject"/>
       </p:transition>
     </mc:Choice>
-    <mc:Fallback>
+    <mc:Fallback xmlns="">
       <p:transition spd="slow">
         <p:fade/>
       </p:transition>
@@ -3578,7 +3578,7 @@
           </a:bodyPr>
           <a:lstStyle/>
           <a:p>
-            <a:pPr algn="ctr" fontAlgn="auto">
+            <a:pPr fontAlgn="auto">
               <a:spcBef>
                 <a:spcPts val="600"/>
               </a:spcBef>
@@ -3591,43 +3591,12 @@
                 <a:latin typeface="微软雅黑" panose="020B0503020204020204" pitchFamily="34" charset="-122"/>
                 <a:ea typeface="微软雅黑" panose="020B0503020204020204" pitchFamily="34" charset="-122"/>
               </a:rPr>
-              <a:t>恒星时 </a:t>
-            </a:r>
-            <a:r>
-              <a:rPr lang="en-US" altLang="zh-CN" b="1" i="1" dirty="0">
-                <a:latin typeface="微软雅黑" panose="020B0503020204020204" pitchFamily="34" charset="-122"/>
-                <a:ea typeface="微软雅黑" panose="020B0503020204020204" pitchFamily="34" charset="-122"/>
-              </a:rPr>
-              <a:t>S </a:t>
-            </a:r>
-            <a:r>
-              <a:rPr lang="en-US" altLang="zh-CN" b="1" dirty="0">
-                <a:latin typeface="微软雅黑" panose="020B0503020204020204" pitchFamily="34" charset="-122"/>
-                <a:ea typeface="微软雅黑" panose="020B0503020204020204" pitchFamily="34" charset="-122"/>
-              </a:rPr>
-              <a:t>=</a:t>
-            </a:r>
-            <a:r>
-              <a:rPr lang="en-US" altLang="zh-CN" b="1" i="1" dirty="0">
-                <a:latin typeface="微软雅黑" panose="020B0503020204020204" pitchFamily="34" charset="-122"/>
-                <a:ea typeface="微软雅黑" panose="020B0503020204020204" pitchFamily="34" charset="-122"/>
-              </a:rPr>
-              <a:t>α</a:t>
-            </a:r>
-            <a:r>
-              <a:rPr lang="en-US" altLang="zh-CN" b="1" dirty="0">
-                <a:latin typeface="微软雅黑" panose="020B0503020204020204" pitchFamily="34" charset="-122"/>
-                <a:ea typeface="微软雅黑" panose="020B0503020204020204" pitchFamily="34" charset="-122"/>
-              </a:rPr>
-              <a:t>+</a:t>
-            </a:r>
-            <a:r>
-              <a:rPr lang="en-US" altLang="zh-CN" b="1" i="1" dirty="0">
-                <a:latin typeface="微软雅黑" panose="020B0503020204020204" pitchFamily="34" charset="-122"/>
-                <a:ea typeface="微软雅黑" panose="020B0503020204020204" pitchFamily="34" charset="-122"/>
-              </a:rPr>
-              <a:t>t</a:t>
-            </a:r>
+              <a:t>  恒星时  </a:t>
+            </a:r>
+            <a:endParaRPr lang="en-US" altLang="zh-CN" b="1" i="1" dirty="0">
+              <a:latin typeface="微软雅黑" panose="020B0503020204020204" pitchFamily="34" charset="-122"/>
+              <a:ea typeface="微软雅黑" panose="020B0503020204020204" pitchFamily="34" charset="-122"/>
+            </a:endParaRPr>
           </a:p>
           <a:p>
             <a:pPr algn="ctr" fontAlgn="auto">
@@ -3700,7 +3669,7 @@
           <p:nvPr>
             <p:extLst>
               <p:ext uri="{D42A27DB-BD31-4B8C-83A1-F6EECF244321}">
-                <p14:modId xmlns:p14="http://schemas.microsoft.com/office/powerpoint/2010/main" val="3723174018"/>
+                <p14:modId xmlns:p14="http://schemas.microsoft.com/office/powerpoint/2010/main" val="1909122576"/>
               </p:ext>
             </p:extLst>
           </p:nvPr>
@@ -3894,6 +3863,69 @@
           </a:prstGeom>
         </p:spPr>
       </p:pic>
+      <p:graphicFrame>
+        <p:nvGraphicFramePr>
+          <p:cNvPr id="7" name="对象 6">
+            <a:extLst>
+              <a:ext uri="{FF2B5EF4-FFF2-40B4-BE49-F238E27FC236}">
+                <a16:creationId xmlns:a16="http://schemas.microsoft.com/office/drawing/2014/main" id="{139AE67D-5362-43ED-B8CD-4536CC752BF9}"/>
+              </a:ext>
+            </a:extLst>
+          </p:cNvPr>
+          <p:cNvGraphicFramePr>
+            <a:graphicFrameLocks noChangeAspect="1"/>
+          </p:cNvGraphicFramePr>
+          <p:nvPr>
+            <p:extLst>
+              <p:ext uri="{D42A27DB-BD31-4B8C-83A1-F6EECF244321}">
+                <p14:modId xmlns:p14="http://schemas.microsoft.com/office/powerpoint/2010/main" val="4115960874"/>
+              </p:ext>
+            </p:extLst>
+          </p:nvPr>
+        </p:nvGraphicFramePr>
+        <p:xfrm>
+          <a:off x="5946239" y="5832222"/>
+          <a:ext cx="1098550" cy="377825"/>
+        </p:xfrm>
+        <a:graphic>
+          <a:graphicData uri="http://schemas.openxmlformats.org/presentationml/2006/ole">
+            <mc:AlternateContent xmlns:mc="http://schemas.openxmlformats.org/markup-compatibility/2006">
+              <mc:Choice xmlns:v="urn:schemas-microsoft-com:vml" Requires="v">
+                <p:oleObj name="AxMath" r:id="rId8" imgW="549360" imgH="189000" progId="Equation.AxMath">
+                  <p:embed/>
+                </p:oleObj>
+              </mc:Choice>
+              <mc:Fallback>
+                <p:oleObj name="AxMath" r:id="rId8" imgW="549360" imgH="189000" progId="Equation.AxMath">
+                  <p:embed/>
+                  <p:pic>
+                    <p:nvPicPr>
+                      <p:cNvPr id="0" name=""/>
+                      <p:cNvPicPr/>
+                      <p:nvPr/>
+                    </p:nvPicPr>
+                    <p:blipFill>
+                      <a:blip r:embed="rId9"/>
+                      <a:stretch>
+                        <a:fillRect/>
+                      </a:stretch>
+                    </p:blipFill>
+                    <p:spPr>
+                      <a:xfrm>
+                        <a:off x="5946239" y="5832222"/>
+                        <a:ext cx="1098550" cy="377825"/>
+                      </a:xfrm>
+                      <a:prstGeom prst="rect">
+                        <a:avLst/>
+                      </a:prstGeom>
+                    </p:spPr>
+                  </p:pic>
+                </p:oleObj>
+              </mc:Fallback>
+            </mc:AlternateContent>
+          </a:graphicData>
+        </a:graphic>
+      </p:graphicFrame>
     </p:spTree>
     <p:extLst>
       <p:ext uri="{BB962C8B-B14F-4D97-AF65-F5344CB8AC3E}">
@@ -3904,13 +3936,13 @@
   <p:clrMapOvr>
     <a:masterClrMapping/>
   </p:clrMapOvr>
-  <mc:AlternateContent xmlns:mc="http://schemas.openxmlformats.org/markup-compatibility/2006">
-    <mc:Choice xmlns:p159="http://schemas.microsoft.com/office/powerpoint/2015/09/main" Requires="p159">
+  <mc:AlternateContent xmlns:mc="http://schemas.openxmlformats.org/markup-compatibility/2006" xmlns:p159="http://schemas.microsoft.com/office/powerpoint/2015/09/main">
+    <mc:Choice Requires="p159">
       <p:transition spd="slow">
         <p159:morph option="byObject"/>
       </p:transition>
     </mc:Choice>
-    <mc:Fallback>
+    <mc:Fallback xmlns="">
       <p:transition spd="slow">
         <p:fade/>
       </p:transition>
@@ -4613,13 +4645,13 @@
   <p:clrMapOvr>
     <a:masterClrMapping/>
   </p:clrMapOvr>
-  <mc:AlternateContent xmlns:mc="http://schemas.openxmlformats.org/markup-compatibility/2006">
-    <mc:Choice xmlns:p159="http://schemas.microsoft.com/office/powerpoint/2015/09/main" Requires="p159">
+  <mc:AlternateContent xmlns:mc="http://schemas.openxmlformats.org/markup-compatibility/2006" xmlns:p159="http://schemas.microsoft.com/office/powerpoint/2015/09/main">
+    <mc:Choice Requires="p159">
       <p:transition spd="slow">
         <p159:morph option="byObject"/>
       </p:transition>
     </mc:Choice>
-    <mc:Fallback>
+    <mc:Fallback xmlns="">
       <p:transition spd="slow">
         <p:fade/>
       </p:transition>
@@ -4743,7 +4775,7 @@
               <a:t>球面三角形 </a:t>
             </a:r>
             <a:r>
-              <a:rPr lang="en-US" altLang="zh-CN" sz="2400" b="1" i="1" dirty="0">
+              <a:rPr lang="en-US" altLang="zh-CN" sz="2400" i="1" dirty="0">
                 <a:latin typeface="微软雅黑" panose="020B0503020204020204" pitchFamily="34" charset="-122"/>
                 <a:ea typeface="微软雅黑" panose="020B0503020204020204" pitchFamily="34" charset="-122"/>
                 <a:sym typeface="+mn-ea"/>
@@ -4903,28 +4935,32 @@
             </a:pPr>
             <a:r>
               <a:rPr lang="en-US" altLang="zh-CN" sz="2000" b="1" i="1" dirty="0">
-                <a:latin typeface="微软雅黑" panose="020B0503020204020204" pitchFamily="34" charset="-122"/>
-                <a:ea typeface="微软雅黑" panose="020B0503020204020204" pitchFamily="34" charset="-122"/>
+                <a:latin typeface="Times New Roman" panose="02020603050405020304" pitchFamily="18" charset="0"/>
+                <a:ea typeface="微软雅黑" panose="020B0503020204020204" pitchFamily="34" charset="-122"/>
+                <a:cs typeface="Times New Roman" panose="02020603050405020304" pitchFamily="18" charset="0"/>
               </a:rPr>
               <a:t>C </a:t>
             </a:r>
             <a:r>
               <a:rPr lang="zh-CN" altLang="en-US" sz="2000" b="1" dirty="0">
-                <a:latin typeface="微软雅黑" panose="020B0503020204020204" pitchFamily="34" charset="-122"/>
-                <a:ea typeface="微软雅黑" panose="020B0503020204020204" pitchFamily="34" charset="-122"/>
+                <a:latin typeface="Times New Roman" panose="02020603050405020304" pitchFamily="18" charset="0"/>
+                <a:ea typeface="微软雅黑" panose="020B0503020204020204" pitchFamily="34" charset="-122"/>
+                <a:cs typeface="Times New Roman" panose="02020603050405020304" pitchFamily="18" charset="0"/>
               </a:rPr>
               <a:t>在 </a:t>
             </a:r>
             <a:r>
               <a:rPr lang="en-US" altLang="zh-CN" sz="2000" b="1" i="1" dirty="0">
-                <a:latin typeface="微软雅黑" panose="020B0503020204020204" pitchFamily="34" charset="-122"/>
-                <a:ea typeface="微软雅黑" panose="020B0503020204020204" pitchFamily="34" charset="-122"/>
+                <a:latin typeface="Times New Roman" panose="02020603050405020304" pitchFamily="18" charset="0"/>
+                <a:ea typeface="微软雅黑" panose="020B0503020204020204" pitchFamily="34" charset="-122"/>
+                <a:cs typeface="Times New Roman" panose="02020603050405020304" pitchFamily="18" charset="0"/>
               </a:rPr>
               <a:t>XYZ</a:t>
             </a:r>
             <a:endParaRPr lang="zh-CN" altLang="en-US" sz="2000" b="1" i="1" dirty="0">
-              <a:latin typeface="微软雅黑" panose="020B0503020204020204" pitchFamily="34" charset="-122"/>
+              <a:latin typeface="Times New Roman" panose="02020603050405020304" pitchFamily="18" charset="0"/>
               <a:ea typeface="微软雅黑" panose="020B0503020204020204" pitchFamily="34" charset="-122"/>
+              <a:cs typeface="Times New Roman" panose="02020603050405020304" pitchFamily="18" charset="0"/>
             </a:endParaRPr>
           </a:p>
         </p:txBody>
@@ -5056,28 +5092,32 @@
             </a:pPr>
             <a:r>
               <a:rPr lang="en-US" altLang="zh-CN" sz="2000" b="1" i="1" dirty="0">
-                <a:latin typeface="微软雅黑" panose="020B0503020204020204" pitchFamily="34" charset="-122"/>
-                <a:ea typeface="微软雅黑" panose="020B0503020204020204" pitchFamily="34" charset="-122"/>
+                <a:latin typeface="Times New Roman" panose="02020603050405020304" pitchFamily="18" charset="0"/>
+                <a:ea typeface="微软雅黑" panose="020B0503020204020204" pitchFamily="34" charset="-122"/>
+                <a:cs typeface="Times New Roman" panose="02020603050405020304" pitchFamily="18" charset="0"/>
               </a:rPr>
               <a:t>C </a:t>
             </a:r>
             <a:r>
               <a:rPr lang="zh-CN" altLang="en-US" sz="2000" b="1" dirty="0">
-                <a:latin typeface="微软雅黑" panose="020B0503020204020204" pitchFamily="34" charset="-122"/>
-                <a:ea typeface="微软雅黑" panose="020B0503020204020204" pitchFamily="34" charset="-122"/>
+                <a:latin typeface="Times New Roman" panose="02020603050405020304" pitchFamily="18" charset="0"/>
+                <a:ea typeface="微软雅黑" panose="020B0503020204020204" pitchFamily="34" charset="-122"/>
+                <a:cs typeface="Times New Roman" panose="02020603050405020304" pitchFamily="18" charset="0"/>
               </a:rPr>
               <a:t>在 </a:t>
             </a:r>
             <a:r>
               <a:rPr lang="en-US" altLang="zh-CN" sz="2000" b="1" i="1" dirty="0">
-                <a:latin typeface="微软雅黑" panose="020B0503020204020204" pitchFamily="34" charset="-122"/>
-                <a:ea typeface="微软雅黑" panose="020B0503020204020204" pitchFamily="34" charset="-122"/>
+                <a:latin typeface="Times New Roman" panose="02020603050405020304" pitchFamily="18" charset="0"/>
+                <a:ea typeface="微软雅黑" panose="020B0503020204020204" pitchFamily="34" charset="-122"/>
+                <a:cs typeface="Times New Roman" panose="02020603050405020304" pitchFamily="18" charset="0"/>
               </a:rPr>
               <a:t>X'Y'Z'</a:t>
             </a:r>
             <a:endParaRPr lang="zh-CN" altLang="en-US" sz="2000" b="1" i="1" dirty="0">
-              <a:latin typeface="微软雅黑" panose="020B0503020204020204" pitchFamily="34" charset="-122"/>
+              <a:latin typeface="Times New Roman" panose="02020603050405020304" pitchFamily="18" charset="0"/>
               <a:ea typeface="微软雅黑" panose="020B0503020204020204" pitchFamily="34" charset="-122"/>
+              <a:cs typeface="Times New Roman" panose="02020603050405020304" pitchFamily="18" charset="0"/>
             </a:endParaRPr>
           </a:p>
         </p:txBody>
@@ -5118,6 +5158,51 @@
           </a:prstGeom>
         </p:spPr>
       </p:pic>
+      <p:sp>
+        <p:nvSpPr>
+          <p:cNvPr id="4" name="矩形 3">
+            <a:extLst>
+              <a:ext uri="{FF2B5EF4-FFF2-40B4-BE49-F238E27FC236}">
+                <a16:creationId xmlns:a16="http://schemas.microsoft.com/office/drawing/2014/main" id="{EEC70247-BB50-8281-593B-804577C243E9}"/>
+              </a:ext>
+            </a:extLst>
+          </p:cNvPr>
+          <p:cNvSpPr/>
+          <p:nvPr/>
+        </p:nvSpPr>
+        <p:spPr>
+          <a:xfrm>
+            <a:off x="1475665" y="5392810"/>
+            <a:ext cx="3659043" cy="707886"/>
+          </a:xfrm>
+          <a:prstGeom prst="rect">
+            <a:avLst/>
+          </a:prstGeom>
+        </p:spPr>
+        <p:txBody>
+          <a:bodyPr wrap="square">
+            <a:spAutoFit/>
+          </a:bodyPr>
+          <a:lstStyle/>
+          <a:p>
+            <a:pPr algn="ctr" fontAlgn="auto">
+              <a:spcBef>
+                <a:spcPts val="600"/>
+              </a:spcBef>
+              <a:spcAft>
+                <a:spcPts val="0"/>
+              </a:spcAft>
+            </a:pPr>
+            <a:r>
+              <a:rPr lang="zh-CN" altLang="en-US" sz="2000" b="1" dirty="0">
+                <a:latin typeface="微软雅黑" panose="020B0503020204020204" pitchFamily="34" charset="-122"/>
+                <a:ea typeface="微软雅黑" panose="020B0503020204020204" pitchFamily="34" charset="-122"/>
+              </a:rPr>
+              <a:t>由此式和其它角度关系可得（下页）</a:t>
+            </a:r>
+          </a:p>
+        </p:txBody>
+      </p:sp>
     </p:spTree>
     <p:extLst>
       <p:ext uri="{BB962C8B-B14F-4D97-AF65-F5344CB8AC3E}">
@@ -5128,13 +5213,13 @@
   <p:clrMapOvr>
     <a:masterClrMapping/>
   </p:clrMapOvr>
-  <mc:AlternateContent xmlns:mc="http://schemas.openxmlformats.org/markup-compatibility/2006">
-    <mc:Choice xmlns:p159="http://schemas.microsoft.com/office/powerpoint/2015/09/main" Requires="p159">
+  <mc:AlternateContent xmlns:mc="http://schemas.openxmlformats.org/markup-compatibility/2006" xmlns:p159="http://schemas.microsoft.com/office/powerpoint/2015/09/main">
+    <mc:Choice Requires="p159">
       <p:transition spd="slow">
         <p159:morph option="byObject"/>
       </p:transition>
     </mc:Choice>
-    <mc:Fallback>
+    <mc:Fallback xmlns="">
       <p:transition spd="slow">
         <p:fade/>
       </p:transition>
@@ -5407,6 +5492,41 @@
                                   </p:childTnLst>
                                 </p:cTn>
                               </p:par>
+                              <p:par>
+                                <p:cTn id="28" presetID="10" presetClass="entr" presetSubtype="0" fill="hold" grpId="0" nodeType="withEffect">
+                                  <p:stCondLst>
+                                    <p:cond delay="0"/>
+                                  </p:stCondLst>
+                                  <p:childTnLst>
+                                    <p:set>
+                                      <p:cBhvr>
+                                        <p:cTn id="29" dur="1" fill="hold">
+                                          <p:stCondLst>
+                                            <p:cond delay="0"/>
+                                          </p:stCondLst>
+                                        </p:cTn>
+                                        <p:tgtEl>
+                                          <p:spTgt spid="4"/>
+                                        </p:tgtEl>
+                                        <p:attrNameLst>
+                                          <p:attrName>style.visibility</p:attrName>
+                                        </p:attrNameLst>
+                                      </p:cBhvr>
+                                      <p:to>
+                                        <p:strVal val="visible"/>
+                                      </p:to>
+                                    </p:set>
+                                    <p:animEffect transition="in" filter="fade">
+                                      <p:cBhvr>
+                                        <p:cTn id="30" dur="500"/>
+                                        <p:tgtEl>
+                                          <p:spTgt spid="4"/>
+                                        </p:tgtEl>
+                                      </p:cBhvr>
+                                    </p:animEffect>
+                                  </p:childTnLst>
+                                </p:cTn>
+                              </p:par>
                             </p:childTnLst>
                           </p:cTn>
                         </p:par>
@@ -5437,6 +5557,7 @@
     <p:bldLst>
       <p:bldP spid="12" grpId="0"/>
       <p:bldP spid="23" grpId="0"/>
+      <p:bldP spid="4" grpId="0"/>
     </p:bldLst>
   </p:timing>
 </p:sld>
@@ -5593,186 +5714,6 @@
       </p:sp>
       <p:pic>
         <p:nvPicPr>
-          <p:cNvPr id="14" name="图片 13">
-            <a:extLst>
-              <a:ext uri="{FF2B5EF4-FFF2-40B4-BE49-F238E27FC236}">
-                <a16:creationId xmlns:a16="http://schemas.microsoft.com/office/drawing/2014/main" id="{5D036014-3F6B-324F-3913-62DE42FE38B0}"/>
-              </a:ext>
-            </a:extLst>
-          </p:cNvPr>
-          <p:cNvPicPr>
-            <a:picLocks noChangeAspect="1"/>
-          </p:cNvPicPr>
-          <p:nvPr/>
-        </p:nvPicPr>
-        <p:blipFill>
-          <a:blip r:embed="rId2"/>
-          <a:stretch>
-            <a:fillRect/>
-          </a:stretch>
-        </p:blipFill>
-        <p:spPr>
-          <a:xfrm>
-            <a:off x="1006830" y="4594684"/>
-            <a:ext cx="4448175" cy="314325"/>
-          </a:xfrm>
-          <a:prstGeom prst="rect">
-            <a:avLst/>
-          </a:prstGeom>
-        </p:spPr>
-      </p:pic>
-      <p:pic>
-        <p:nvPicPr>
-          <p:cNvPr id="16" name="图片 15">
-            <a:extLst>
-              <a:ext uri="{FF2B5EF4-FFF2-40B4-BE49-F238E27FC236}">
-                <a16:creationId xmlns:a16="http://schemas.microsoft.com/office/drawing/2014/main" id="{8D4EB408-84CD-2E7B-2620-2E618E6B28EB}"/>
-              </a:ext>
-            </a:extLst>
-          </p:cNvPr>
-          <p:cNvPicPr>
-            <a:picLocks noChangeAspect="1"/>
-          </p:cNvPicPr>
-          <p:nvPr/>
-        </p:nvPicPr>
-        <p:blipFill>
-          <a:blip r:embed="rId3"/>
-          <a:stretch>
-            <a:fillRect/>
-          </a:stretch>
-        </p:blipFill>
-        <p:spPr>
-          <a:xfrm>
-            <a:off x="2225392" y="2623229"/>
-            <a:ext cx="2057400" cy="628650"/>
-          </a:xfrm>
-          <a:prstGeom prst="rect">
-            <a:avLst/>
-          </a:prstGeom>
-        </p:spPr>
-      </p:pic>
-      <p:pic>
-        <p:nvPicPr>
-          <p:cNvPr id="18" name="图片 17">
-            <a:extLst>
-              <a:ext uri="{FF2B5EF4-FFF2-40B4-BE49-F238E27FC236}">
-                <a16:creationId xmlns:a16="http://schemas.microsoft.com/office/drawing/2014/main" id="{2C3C7854-AE24-E2DE-DFBB-6F23B33029B7}"/>
-              </a:ext>
-            </a:extLst>
-          </p:cNvPr>
-          <p:cNvPicPr>
-            <a:picLocks noChangeAspect="1"/>
-          </p:cNvPicPr>
-          <p:nvPr/>
-        </p:nvPicPr>
-        <p:blipFill>
-          <a:blip r:embed="rId4"/>
-          <a:stretch>
-            <a:fillRect/>
-          </a:stretch>
-        </p:blipFill>
-        <p:spPr>
-          <a:xfrm>
-            <a:off x="914527" y="6166385"/>
-            <a:ext cx="4972050" cy="342900"/>
-          </a:xfrm>
-          <a:prstGeom prst="rect">
-            <a:avLst/>
-          </a:prstGeom>
-        </p:spPr>
-      </p:pic>
-      <p:pic>
-        <p:nvPicPr>
-          <p:cNvPr id="20" name="图片 19">
-            <a:extLst>
-              <a:ext uri="{FF2B5EF4-FFF2-40B4-BE49-F238E27FC236}">
-                <a16:creationId xmlns:a16="http://schemas.microsoft.com/office/drawing/2014/main" id="{04DDC350-F31E-728B-4C88-7AE9518DF6C6}"/>
-              </a:ext>
-            </a:extLst>
-          </p:cNvPr>
-          <p:cNvPicPr>
-            <a:picLocks noChangeAspect="1"/>
-          </p:cNvPicPr>
-          <p:nvPr/>
-        </p:nvPicPr>
-        <p:blipFill>
-          <a:blip r:embed="rId5"/>
-          <a:stretch>
-            <a:fillRect/>
-          </a:stretch>
-        </p:blipFill>
-        <p:spPr>
-          <a:xfrm>
-            <a:off x="6539958" y="2764004"/>
-            <a:ext cx="5095875" cy="304800"/>
-          </a:xfrm>
-          <a:prstGeom prst="rect">
-            <a:avLst/>
-          </a:prstGeom>
-        </p:spPr>
-      </p:pic>
-      <p:pic>
-        <p:nvPicPr>
-          <p:cNvPr id="22" name="图片 21">
-            <a:extLst>
-              <a:ext uri="{FF2B5EF4-FFF2-40B4-BE49-F238E27FC236}">
-                <a16:creationId xmlns:a16="http://schemas.microsoft.com/office/drawing/2014/main" id="{F1738729-DB54-E135-D356-6DE29F91C68B}"/>
-              </a:ext>
-            </a:extLst>
-          </p:cNvPr>
-          <p:cNvPicPr>
-            <a:picLocks noChangeAspect="1"/>
-          </p:cNvPicPr>
-          <p:nvPr/>
-        </p:nvPicPr>
-        <p:blipFill>
-          <a:blip r:embed="rId6"/>
-          <a:stretch>
-            <a:fillRect/>
-          </a:stretch>
-        </p:blipFill>
-        <p:spPr>
-          <a:xfrm>
-            <a:off x="6430420" y="4538623"/>
-            <a:ext cx="5314950" cy="285750"/>
-          </a:xfrm>
-          <a:prstGeom prst="rect">
-            <a:avLst/>
-          </a:prstGeom>
-        </p:spPr>
-      </p:pic>
-      <p:pic>
-        <p:nvPicPr>
-          <p:cNvPr id="29" name="图片 28">
-            <a:extLst>
-              <a:ext uri="{FF2B5EF4-FFF2-40B4-BE49-F238E27FC236}">
-                <a16:creationId xmlns:a16="http://schemas.microsoft.com/office/drawing/2014/main" id="{16518604-90AC-D5C0-103A-116C8CC73287}"/>
-              </a:ext>
-            </a:extLst>
-          </p:cNvPr>
-          <p:cNvPicPr>
-            <a:picLocks noChangeAspect="1"/>
-          </p:cNvPicPr>
-          <p:nvPr/>
-        </p:nvPicPr>
-        <p:blipFill>
-          <a:blip r:embed="rId7"/>
-          <a:stretch>
-            <a:fillRect/>
-          </a:stretch>
-        </p:blipFill>
-        <p:spPr>
-          <a:xfrm>
-            <a:off x="6872102" y="6177714"/>
-            <a:ext cx="4552950" cy="304800"/>
-          </a:xfrm>
-          <a:prstGeom prst="rect">
-            <a:avLst/>
-          </a:prstGeom>
-        </p:spPr>
-      </p:pic>
-      <p:pic>
-        <p:nvPicPr>
           <p:cNvPr id="31" name="图片 30">
             <a:extLst>
               <a:ext uri="{FF2B5EF4-FFF2-40B4-BE49-F238E27FC236}">
@@ -5786,7 +5727,7 @@
           <p:nvPr/>
         </p:nvPicPr>
         <p:blipFill>
-          <a:blip r:embed="rId8"/>
+          <a:blip r:embed="rId2"/>
           <a:stretch>
             <a:fillRect/>
           </a:stretch>
@@ -5816,7 +5757,7 @@
           <p:nvPr/>
         </p:nvPicPr>
         <p:blipFill>
-          <a:blip r:embed="rId9"/>
+          <a:blip r:embed="rId3"/>
           <a:stretch>
             <a:fillRect/>
           </a:stretch>
@@ -5846,7 +5787,7 @@
           <p:nvPr/>
         </p:nvPicPr>
         <p:blipFill>
-          <a:blip r:embed="rId10"/>
+          <a:blip r:embed="rId4"/>
           <a:stretch>
             <a:fillRect/>
           </a:stretch>
@@ -5876,7 +5817,7 @@
           <p:nvPr/>
         </p:nvPicPr>
         <p:blipFill>
-          <a:blip r:embed="rId11"/>
+          <a:blip r:embed="rId5"/>
           <a:stretch>
             <a:fillRect/>
           </a:stretch>
@@ -5906,7 +5847,7 @@
           <p:nvPr/>
         </p:nvPicPr>
         <p:blipFill>
-          <a:blip r:embed="rId12"/>
+          <a:blip r:embed="rId6"/>
           <a:stretch>
             <a:fillRect/>
           </a:stretch>
@@ -5936,7 +5877,7 @@
           <p:nvPr/>
         </p:nvPicPr>
         <p:blipFill>
-          <a:blip r:embed="rId13"/>
+          <a:blip r:embed="rId7"/>
           <a:stretch>
             <a:fillRect/>
           </a:stretch>
@@ -6236,10 +6177,10 @@
           <p:nvPr/>
         </p:nvPicPr>
         <p:blipFill>
-          <a:blip r:embed="rId14">
+          <a:blip r:embed="rId8">
             <a:extLst>
               <a:ext uri="{96DAC541-7B7A-43D3-8B79-37D633B846F1}">
-                <asvg:svgBlip xmlns:asvg="http://schemas.microsoft.com/office/drawing/2016/SVG/main" r:embed="rId15"/>
+                <asvg:svgBlip xmlns:asvg="http://schemas.microsoft.com/office/drawing/2016/SVG/main" r:embed="rId9"/>
               </a:ext>
             </a:extLst>
           </a:blip>
@@ -6257,6 +6198,384 @@
           </a:prstGeom>
         </p:spPr>
       </p:pic>
+      <p:graphicFrame>
+        <p:nvGraphicFramePr>
+          <p:cNvPr id="2" name="对象 1">
+            <a:extLst>
+              <a:ext uri="{FF2B5EF4-FFF2-40B4-BE49-F238E27FC236}">
+                <a16:creationId xmlns:a16="http://schemas.microsoft.com/office/drawing/2014/main" id="{9FDA77FE-40A3-A025-7F2E-445CC2F3B91E}"/>
+              </a:ext>
+            </a:extLst>
+          </p:cNvPr>
+          <p:cNvGraphicFramePr>
+            <a:graphicFrameLocks noChangeAspect="1"/>
+          </p:cNvGraphicFramePr>
+          <p:nvPr>
+            <p:extLst>
+              <p:ext uri="{D42A27DB-BD31-4B8C-83A1-F6EECF244321}">
+                <p14:modId xmlns:p14="http://schemas.microsoft.com/office/powerpoint/2010/main" val="146886896"/>
+              </p:ext>
+            </p:extLst>
+          </p:nvPr>
+        </p:nvGraphicFramePr>
+        <p:xfrm>
+          <a:off x="2468236" y="2633829"/>
+          <a:ext cx="1641475" cy="692150"/>
+        </p:xfrm>
+        <a:graphic>
+          <a:graphicData uri="http://schemas.openxmlformats.org/presentationml/2006/ole">
+            <mc:AlternateContent xmlns:mc="http://schemas.openxmlformats.org/markup-compatibility/2006">
+              <mc:Choice xmlns:v="urn:schemas-microsoft-com:vml" Requires="v">
+                <p:oleObj name="AxMath" r:id="rId10" imgW="821520" imgH="346680" progId="Equation.AxMath">
+                  <p:embed/>
+                </p:oleObj>
+              </mc:Choice>
+              <mc:Fallback>
+                <p:oleObj name="AxMath" r:id="rId10" imgW="821520" imgH="346680" progId="Equation.AxMath">
+                  <p:embed/>
+                  <p:pic>
+                    <p:nvPicPr>
+                      <p:cNvPr id="0" name=""/>
+                      <p:cNvPicPr/>
+                      <p:nvPr/>
+                    </p:nvPicPr>
+                    <p:blipFill>
+                      <a:blip r:embed="rId11"/>
+                      <a:stretch>
+                        <a:fillRect/>
+                      </a:stretch>
+                    </p:blipFill>
+                    <p:spPr>
+                      <a:xfrm>
+                        <a:off x="2468236" y="2633829"/>
+                        <a:ext cx="1641475" cy="692150"/>
+                      </a:xfrm>
+                      <a:prstGeom prst="rect">
+                        <a:avLst/>
+                      </a:prstGeom>
+                    </p:spPr>
+                  </p:pic>
+                </p:oleObj>
+              </mc:Fallback>
+            </mc:AlternateContent>
+          </a:graphicData>
+        </a:graphic>
+      </p:graphicFrame>
+      <p:graphicFrame>
+        <p:nvGraphicFramePr>
+          <p:cNvPr id="6" name="对象 5">
+            <a:extLst>
+              <a:ext uri="{FF2B5EF4-FFF2-40B4-BE49-F238E27FC236}">
+                <a16:creationId xmlns:a16="http://schemas.microsoft.com/office/drawing/2014/main" id="{39E40712-B71A-0EEE-F353-ADE22590F1A9}"/>
+              </a:ext>
+            </a:extLst>
+          </p:cNvPr>
+          <p:cNvGraphicFramePr>
+            <a:graphicFrameLocks noChangeAspect="1"/>
+          </p:cNvGraphicFramePr>
+          <p:nvPr>
+            <p:extLst>
+              <p:ext uri="{D42A27DB-BD31-4B8C-83A1-F6EECF244321}">
+                <p14:modId xmlns:p14="http://schemas.microsoft.com/office/powerpoint/2010/main" val="3739929160"/>
+              </p:ext>
+            </p:extLst>
+          </p:nvPr>
+        </p:nvGraphicFramePr>
+        <p:xfrm>
+          <a:off x="1401435" y="4562934"/>
+          <a:ext cx="3775075" cy="377825"/>
+        </p:xfrm>
+        <a:graphic>
+          <a:graphicData uri="http://schemas.openxmlformats.org/presentationml/2006/ole">
+            <mc:AlternateContent xmlns:mc="http://schemas.openxmlformats.org/markup-compatibility/2006">
+              <mc:Choice xmlns:v="urn:schemas-microsoft-com:vml" Requires="v">
+                <p:oleObj name="AxMath" r:id="rId12" imgW="1888200" imgH="189000" progId="Equation.AxMath">
+                  <p:embed/>
+                </p:oleObj>
+              </mc:Choice>
+              <mc:Fallback>
+                <p:oleObj name="AxMath" r:id="rId12" imgW="1888200" imgH="189000" progId="Equation.AxMath">
+                  <p:embed/>
+                  <p:pic>
+                    <p:nvPicPr>
+                      <p:cNvPr id="0" name=""/>
+                      <p:cNvPicPr/>
+                      <p:nvPr/>
+                    </p:nvPicPr>
+                    <p:blipFill>
+                      <a:blip r:embed="rId13"/>
+                      <a:stretch>
+                        <a:fillRect/>
+                      </a:stretch>
+                    </p:blipFill>
+                    <p:spPr>
+                      <a:xfrm>
+                        <a:off x="1401435" y="4562934"/>
+                        <a:ext cx="3775075" cy="377825"/>
+                      </a:xfrm>
+                      <a:prstGeom prst="rect">
+                        <a:avLst/>
+                      </a:prstGeom>
+                    </p:spPr>
+                  </p:pic>
+                </p:oleObj>
+              </mc:Fallback>
+            </mc:AlternateContent>
+          </a:graphicData>
+        </a:graphic>
+      </p:graphicFrame>
+      <p:graphicFrame>
+        <p:nvGraphicFramePr>
+          <p:cNvPr id="7" name="对象 6">
+            <a:extLst>
+              <a:ext uri="{FF2B5EF4-FFF2-40B4-BE49-F238E27FC236}">
+                <a16:creationId xmlns:a16="http://schemas.microsoft.com/office/drawing/2014/main" id="{9B801D31-1A93-E7AB-14C1-8065C46C3707}"/>
+              </a:ext>
+            </a:extLst>
+          </p:cNvPr>
+          <p:cNvGraphicFramePr>
+            <a:graphicFrameLocks noChangeAspect="1"/>
+          </p:cNvGraphicFramePr>
+          <p:nvPr>
+            <p:extLst>
+              <p:ext uri="{D42A27DB-BD31-4B8C-83A1-F6EECF244321}">
+                <p14:modId xmlns:p14="http://schemas.microsoft.com/office/powerpoint/2010/main" val="3330093764"/>
+              </p:ext>
+            </p:extLst>
+          </p:nvPr>
+        </p:nvGraphicFramePr>
+        <p:xfrm>
+          <a:off x="1252711" y="6174729"/>
+          <a:ext cx="4213225" cy="377825"/>
+        </p:xfrm>
+        <a:graphic>
+          <a:graphicData uri="http://schemas.openxmlformats.org/presentationml/2006/ole">
+            <mc:AlternateContent xmlns:mc="http://schemas.openxmlformats.org/markup-compatibility/2006">
+              <mc:Choice xmlns:v="urn:schemas-microsoft-com:vml" Requires="v">
+                <p:oleObj name="AxMath" r:id="rId14" imgW="2107080" imgH="189000" progId="Equation.AxMath">
+                  <p:embed/>
+                </p:oleObj>
+              </mc:Choice>
+              <mc:Fallback>
+                <p:oleObj name="AxMath" r:id="rId14" imgW="2107080" imgH="189000" progId="Equation.AxMath">
+                  <p:embed/>
+                  <p:pic>
+                    <p:nvPicPr>
+                      <p:cNvPr id="0" name=""/>
+                      <p:cNvPicPr/>
+                      <p:nvPr/>
+                    </p:nvPicPr>
+                    <p:blipFill>
+                      <a:blip r:embed="rId15"/>
+                      <a:stretch>
+                        <a:fillRect/>
+                      </a:stretch>
+                    </p:blipFill>
+                    <p:spPr>
+                      <a:xfrm>
+                        <a:off x="1252711" y="6174729"/>
+                        <a:ext cx="4213225" cy="377825"/>
+                      </a:xfrm>
+                      <a:prstGeom prst="rect">
+                        <a:avLst/>
+                      </a:prstGeom>
+                    </p:spPr>
+                  </p:pic>
+                </p:oleObj>
+              </mc:Fallback>
+            </mc:AlternateContent>
+          </a:graphicData>
+        </a:graphic>
+      </p:graphicFrame>
+      <p:graphicFrame>
+        <p:nvGraphicFramePr>
+          <p:cNvPr id="8" name="对象 7">
+            <a:extLst>
+              <a:ext uri="{FF2B5EF4-FFF2-40B4-BE49-F238E27FC236}">
+                <a16:creationId xmlns:a16="http://schemas.microsoft.com/office/drawing/2014/main" id="{D7500910-88CF-8863-0EFB-E4AD85C71305}"/>
+              </a:ext>
+            </a:extLst>
+          </p:cNvPr>
+          <p:cNvGraphicFramePr>
+            <a:graphicFrameLocks noChangeAspect="1"/>
+          </p:cNvGraphicFramePr>
+          <p:nvPr>
+            <p:extLst>
+              <p:ext uri="{D42A27DB-BD31-4B8C-83A1-F6EECF244321}">
+                <p14:modId xmlns:p14="http://schemas.microsoft.com/office/powerpoint/2010/main" val="1287179917"/>
+              </p:ext>
+            </p:extLst>
+          </p:nvPr>
+        </p:nvGraphicFramePr>
+        <p:xfrm>
+          <a:off x="6799628" y="2800388"/>
+          <a:ext cx="4337050" cy="377825"/>
+        </p:xfrm>
+        <a:graphic>
+          <a:graphicData uri="http://schemas.openxmlformats.org/presentationml/2006/ole">
+            <mc:AlternateContent xmlns:mc="http://schemas.openxmlformats.org/markup-compatibility/2006">
+              <mc:Choice xmlns:v="urn:schemas-microsoft-com:vml" Requires="v">
+                <p:oleObj name="AxMath" r:id="rId16" imgW="2167920" imgH="189000" progId="Equation.AxMath">
+                  <p:embed/>
+                </p:oleObj>
+              </mc:Choice>
+              <mc:Fallback>
+                <p:oleObj name="AxMath" r:id="rId16" imgW="2167920" imgH="189000" progId="Equation.AxMath">
+                  <p:embed/>
+                  <p:pic>
+                    <p:nvPicPr>
+                      <p:cNvPr id="0" name=""/>
+                      <p:cNvPicPr/>
+                      <p:nvPr/>
+                    </p:nvPicPr>
+                    <p:blipFill>
+                      <a:blip r:embed="rId17"/>
+                      <a:stretch>
+                        <a:fillRect/>
+                      </a:stretch>
+                    </p:blipFill>
+                    <p:spPr>
+                      <a:xfrm>
+                        <a:off x="6799628" y="2800388"/>
+                        <a:ext cx="4337050" cy="377825"/>
+                      </a:xfrm>
+                      <a:prstGeom prst="rect">
+                        <a:avLst/>
+                      </a:prstGeom>
+                    </p:spPr>
+                  </p:pic>
+                </p:oleObj>
+              </mc:Fallback>
+            </mc:AlternateContent>
+          </a:graphicData>
+        </a:graphic>
+      </p:graphicFrame>
+      <p:graphicFrame>
+        <p:nvGraphicFramePr>
+          <p:cNvPr id="9" name="对象 8">
+            <a:extLst>
+              <a:ext uri="{FF2B5EF4-FFF2-40B4-BE49-F238E27FC236}">
+                <a16:creationId xmlns:a16="http://schemas.microsoft.com/office/drawing/2014/main" id="{C092FA83-BA13-C128-3FA7-9E0991D838C3}"/>
+              </a:ext>
+            </a:extLst>
+          </p:cNvPr>
+          <p:cNvGraphicFramePr>
+            <a:graphicFrameLocks noChangeAspect="1"/>
+          </p:cNvGraphicFramePr>
+          <p:nvPr>
+            <p:extLst>
+              <p:ext uri="{D42A27DB-BD31-4B8C-83A1-F6EECF244321}">
+                <p14:modId xmlns:p14="http://schemas.microsoft.com/office/powerpoint/2010/main" val="2584143982"/>
+              </p:ext>
+            </p:extLst>
+          </p:nvPr>
+        </p:nvGraphicFramePr>
+        <p:xfrm>
+          <a:off x="7015492" y="4578619"/>
+          <a:ext cx="4514850" cy="377825"/>
+        </p:xfrm>
+        <a:graphic>
+          <a:graphicData uri="http://schemas.openxmlformats.org/presentationml/2006/ole">
+            <mc:AlternateContent xmlns:mc="http://schemas.openxmlformats.org/markup-compatibility/2006">
+              <mc:Choice xmlns:v="urn:schemas-microsoft-com:vml" Requires="v">
+                <p:oleObj name="AxMath" r:id="rId18" imgW="2256840" imgH="189000" progId="Equation.AxMath">
+                  <p:embed/>
+                </p:oleObj>
+              </mc:Choice>
+              <mc:Fallback>
+                <p:oleObj name="AxMath" r:id="rId18" imgW="2256840" imgH="189000" progId="Equation.AxMath">
+                  <p:embed/>
+                  <p:pic>
+                    <p:nvPicPr>
+                      <p:cNvPr id="0" name=""/>
+                      <p:cNvPicPr/>
+                      <p:nvPr/>
+                    </p:nvPicPr>
+                    <p:blipFill>
+                      <a:blip r:embed="rId19"/>
+                      <a:stretch>
+                        <a:fillRect/>
+                      </a:stretch>
+                    </p:blipFill>
+                    <p:spPr>
+                      <a:xfrm>
+                        <a:off x="7015492" y="4578619"/>
+                        <a:ext cx="4514850" cy="377825"/>
+                      </a:xfrm>
+                      <a:prstGeom prst="rect">
+                        <a:avLst/>
+                      </a:prstGeom>
+                    </p:spPr>
+                  </p:pic>
+                </p:oleObj>
+              </mc:Fallback>
+            </mc:AlternateContent>
+          </a:graphicData>
+        </a:graphic>
+      </p:graphicFrame>
+      <p:graphicFrame>
+        <p:nvGraphicFramePr>
+          <p:cNvPr id="10" name="对象 9">
+            <a:extLst>
+              <a:ext uri="{FF2B5EF4-FFF2-40B4-BE49-F238E27FC236}">
+                <a16:creationId xmlns:a16="http://schemas.microsoft.com/office/drawing/2014/main" id="{4C70C3D8-BE7E-9829-2AA4-F356C5A3C15E}"/>
+              </a:ext>
+            </a:extLst>
+          </p:cNvPr>
+          <p:cNvGraphicFramePr>
+            <a:graphicFrameLocks noChangeAspect="1"/>
+          </p:cNvGraphicFramePr>
+          <p:nvPr>
+            <p:extLst>
+              <p:ext uri="{D42A27DB-BD31-4B8C-83A1-F6EECF244321}">
+                <p14:modId xmlns:p14="http://schemas.microsoft.com/office/powerpoint/2010/main" val="4206446177"/>
+              </p:ext>
+            </p:extLst>
+          </p:nvPr>
+        </p:nvGraphicFramePr>
+        <p:xfrm>
+          <a:off x="7247303" y="6189864"/>
+          <a:ext cx="3889375" cy="377825"/>
+        </p:xfrm>
+        <a:graphic>
+          <a:graphicData uri="http://schemas.openxmlformats.org/presentationml/2006/ole">
+            <mc:AlternateContent xmlns:mc="http://schemas.openxmlformats.org/markup-compatibility/2006">
+              <mc:Choice xmlns:v="urn:schemas-microsoft-com:vml" Requires="v">
+                <p:oleObj name="AxMath" r:id="rId20" imgW="1945440" imgH="189000" progId="Equation.AxMath">
+                  <p:embed/>
+                </p:oleObj>
+              </mc:Choice>
+              <mc:Fallback>
+                <p:oleObj name="AxMath" r:id="rId20" imgW="1945440" imgH="189000" progId="Equation.AxMath">
+                  <p:embed/>
+                  <p:pic>
+                    <p:nvPicPr>
+                      <p:cNvPr id="0" name=""/>
+                      <p:cNvPicPr/>
+                      <p:nvPr/>
+                    </p:nvPicPr>
+                    <p:blipFill>
+                      <a:blip r:embed="rId21"/>
+                      <a:stretch>
+                        <a:fillRect/>
+                      </a:stretch>
+                    </p:blipFill>
+                    <p:spPr>
+                      <a:xfrm>
+                        <a:off x="7247303" y="6189864"/>
+                        <a:ext cx="3889375" cy="377825"/>
+                      </a:xfrm>
+                      <a:prstGeom prst="rect">
+                        <a:avLst/>
+                      </a:prstGeom>
+                    </p:spPr>
+                  </p:pic>
+                </p:oleObj>
+              </mc:Fallback>
+            </mc:AlternateContent>
+          </a:graphicData>
+        </a:graphic>
+      </p:graphicFrame>
     </p:spTree>
     <p:extLst>
       <p:ext uri="{BB962C8B-B14F-4D97-AF65-F5344CB8AC3E}">
@@ -6267,13 +6586,13 @@
   <p:clrMapOvr>
     <a:masterClrMapping/>
   </p:clrMapOvr>
-  <mc:AlternateContent xmlns:mc="http://schemas.openxmlformats.org/markup-compatibility/2006">
-    <mc:Choice xmlns:p159="http://schemas.microsoft.com/office/powerpoint/2015/09/main" Requires="p159">
+  <mc:AlternateContent xmlns:mc="http://schemas.openxmlformats.org/markup-compatibility/2006" xmlns:p159="http://schemas.microsoft.com/office/powerpoint/2015/09/main">
+    <mc:Choice Requires="p159">
       <p:transition spd="slow">
         <p159:morph option="byObject"/>
       </p:transition>
     </mc:Choice>
-    <mc:Fallback>
+    <mc:Fallback xmlns="">
       <p:transition spd="slow">
         <p:fade/>
       </p:transition>
@@ -6491,36 +6810,6 @@
           </a:prstGeom>
         </p:spPr>
       </p:pic>
-      <p:pic>
-        <p:nvPicPr>
-          <p:cNvPr id="27" name="图片 26">
-            <a:extLst>
-              <a:ext uri="{FF2B5EF4-FFF2-40B4-BE49-F238E27FC236}">
-                <a16:creationId xmlns:a16="http://schemas.microsoft.com/office/drawing/2014/main" id="{AE55F416-FEAD-E61F-8B17-52360F0EC4B4}"/>
-              </a:ext>
-            </a:extLst>
-          </p:cNvPr>
-          <p:cNvPicPr>
-            <a:picLocks noChangeAspect="1"/>
-          </p:cNvPicPr>
-          <p:nvPr/>
-        </p:nvPicPr>
-        <p:blipFill>
-          <a:blip r:embed="rId4"/>
-          <a:stretch>
-            <a:fillRect/>
-          </a:stretch>
-        </p:blipFill>
-        <p:spPr>
-          <a:xfrm>
-            <a:off x="1183731" y="5443221"/>
-            <a:ext cx="5126613" cy="362266"/>
-          </a:xfrm>
-          <a:prstGeom prst="rect">
-            <a:avLst/>
-          </a:prstGeom>
-        </p:spPr>
-      </p:pic>
       <p:sp>
         <p:nvSpPr>
           <p:cNvPr id="29" name="矩形 28">
@@ -6563,296 +6852,6 @@
               </a:rPr>
               <a:t>边的余弦公式</a:t>
             </a:r>
-          </a:p>
-        </p:txBody>
-      </p:sp>
-      <p:sp>
-        <p:nvSpPr>
-          <p:cNvPr id="30" name="矩形 29">
-            <a:extLst>
-              <a:ext uri="{FF2B5EF4-FFF2-40B4-BE49-F238E27FC236}">
-                <a16:creationId xmlns:a16="http://schemas.microsoft.com/office/drawing/2014/main" id="{12FBB107-F082-7AA7-6824-6DA9ED2422B0}"/>
-              </a:ext>
-            </a:extLst>
-          </p:cNvPr>
-          <p:cNvSpPr/>
-          <p:nvPr/>
-        </p:nvSpPr>
-        <p:spPr>
-          <a:xfrm>
-            <a:off x="1277290" y="2650681"/>
-            <a:ext cx="1868635" cy="461665"/>
-          </a:xfrm>
-          <a:prstGeom prst="rect">
-            <a:avLst/>
-          </a:prstGeom>
-        </p:spPr>
-        <p:txBody>
-          <a:bodyPr wrap="square">
-            <a:spAutoFit/>
-          </a:bodyPr>
-          <a:lstStyle/>
-          <a:p>
-            <a:pPr algn="ctr" fontAlgn="auto">
-              <a:spcBef>
-                <a:spcPts val="600"/>
-              </a:spcBef>
-              <a:spcAft>
-                <a:spcPts val="0"/>
-              </a:spcAft>
-            </a:pPr>
-            <a:r>
-              <a:rPr lang="en-US" altLang="zh-CN" sz="2400" i="1" dirty="0">
-                <a:solidFill>
-                  <a:srgbClr val="0000FF"/>
-                </a:solidFill>
-                <a:latin typeface="微软雅黑" panose="020B0503020204020204" pitchFamily="34" charset="-122"/>
-                <a:ea typeface="微软雅黑" panose="020B0503020204020204" pitchFamily="34" charset="-122"/>
-              </a:rPr>
-              <a:t>π</a:t>
-            </a:r>
-            <a:r>
-              <a:rPr lang="en-US" altLang="zh-CN" sz="2400" dirty="0">
-                <a:solidFill>
-                  <a:srgbClr val="0000FF"/>
-                </a:solidFill>
-                <a:latin typeface="微软雅黑" panose="020B0503020204020204" pitchFamily="34" charset="-122"/>
-                <a:ea typeface="微软雅黑" panose="020B0503020204020204" pitchFamily="34" charset="-122"/>
-              </a:rPr>
-              <a:t>/2 </a:t>
-            </a:r>
-            <a:r>
-              <a:rPr lang="en-US" altLang="zh-CN" sz="2400" dirty="0">
-                <a:solidFill>
-                  <a:srgbClr val="0000FF"/>
-                </a:solidFill>
-                <a:latin typeface="Times New Roman" panose="02020603050405020304" pitchFamily="18" charset="0"/>
-                <a:ea typeface="微软雅黑" panose="020B0503020204020204" pitchFamily="34" charset="-122"/>
-                <a:cs typeface="Times New Roman" panose="02020603050405020304" pitchFamily="18" charset="0"/>
-              </a:rPr>
-              <a:t>–</a:t>
-            </a:r>
-            <a:r>
-              <a:rPr lang="en-US" altLang="zh-CN" sz="2400" dirty="0">
-                <a:solidFill>
-                  <a:srgbClr val="0000FF"/>
-                </a:solidFill>
-                <a:latin typeface="微软雅黑" panose="020B0503020204020204" pitchFamily="34" charset="-122"/>
-                <a:ea typeface="微软雅黑" panose="020B0503020204020204" pitchFamily="34" charset="-122"/>
-              </a:rPr>
-              <a:t> </a:t>
-            </a:r>
-            <a:r>
-              <a:rPr lang="en-US" altLang="zh-CN" sz="2400" i="1" dirty="0">
-                <a:solidFill>
-                  <a:srgbClr val="0000FF"/>
-                </a:solidFill>
-                <a:latin typeface="微软雅黑" panose="020B0503020204020204" pitchFamily="34" charset="-122"/>
-                <a:ea typeface="微软雅黑" panose="020B0503020204020204" pitchFamily="34" charset="-122"/>
-              </a:rPr>
-              <a:t>δ</a:t>
-            </a:r>
-            <a:endParaRPr lang="zh-CN" altLang="en-US" sz="2400" i="1" dirty="0">
-              <a:solidFill>
-                <a:srgbClr val="0000FF"/>
-              </a:solidFill>
-              <a:latin typeface="微软雅黑" panose="020B0503020204020204" pitchFamily="34" charset="-122"/>
-              <a:ea typeface="微软雅黑" panose="020B0503020204020204" pitchFamily="34" charset="-122"/>
-            </a:endParaRPr>
-          </a:p>
-        </p:txBody>
-      </p:sp>
-      <p:sp>
-        <p:nvSpPr>
-          <p:cNvPr id="31" name="矩形 30">
-            <a:extLst>
-              <a:ext uri="{FF2B5EF4-FFF2-40B4-BE49-F238E27FC236}">
-                <a16:creationId xmlns:a16="http://schemas.microsoft.com/office/drawing/2014/main" id="{146262B2-513E-9061-DE8F-8C5524E6C3D0}"/>
-              </a:ext>
-            </a:extLst>
-          </p:cNvPr>
-          <p:cNvSpPr/>
-          <p:nvPr/>
-        </p:nvSpPr>
-        <p:spPr>
-          <a:xfrm>
-            <a:off x="4225142" y="2539542"/>
-            <a:ext cx="1868635" cy="461665"/>
-          </a:xfrm>
-          <a:prstGeom prst="rect">
-            <a:avLst/>
-          </a:prstGeom>
-        </p:spPr>
-        <p:txBody>
-          <a:bodyPr wrap="square">
-            <a:spAutoFit/>
-          </a:bodyPr>
-          <a:lstStyle/>
-          <a:p>
-            <a:pPr algn="ctr" fontAlgn="auto">
-              <a:spcBef>
-                <a:spcPts val="600"/>
-              </a:spcBef>
-              <a:spcAft>
-                <a:spcPts val="0"/>
-              </a:spcAft>
-            </a:pPr>
-            <a:r>
-              <a:rPr lang="en-US" altLang="zh-CN" sz="2400" i="1" dirty="0">
-                <a:solidFill>
-                  <a:srgbClr val="0000FF"/>
-                </a:solidFill>
-                <a:latin typeface="微软雅黑" panose="020B0503020204020204" pitchFamily="34" charset="-122"/>
-                <a:ea typeface="微软雅黑" panose="020B0503020204020204" pitchFamily="34" charset="-122"/>
-              </a:rPr>
-              <a:t>π</a:t>
-            </a:r>
-            <a:r>
-              <a:rPr lang="en-US" altLang="zh-CN" sz="2400" dirty="0">
-                <a:solidFill>
-                  <a:srgbClr val="0000FF"/>
-                </a:solidFill>
-                <a:latin typeface="微软雅黑" panose="020B0503020204020204" pitchFamily="34" charset="-122"/>
-                <a:ea typeface="微软雅黑" panose="020B0503020204020204" pitchFamily="34" charset="-122"/>
-              </a:rPr>
-              <a:t>/2 </a:t>
-            </a:r>
-            <a:r>
-              <a:rPr lang="en-US" altLang="zh-CN" sz="2400" dirty="0">
-                <a:solidFill>
-                  <a:srgbClr val="0000FF"/>
-                </a:solidFill>
-                <a:latin typeface="Times New Roman" panose="02020603050405020304" pitchFamily="18" charset="0"/>
-                <a:ea typeface="微软雅黑" panose="020B0503020204020204" pitchFamily="34" charset="-122"/>
-                <a:cs typeface="Times New Roman" panose="02020603050405020304" pitchFamily="18" charset="0"/>
-              </a:rPr>
-              <a:t>–</a:t>
-            </a:r>
-            <a:r>
-              <a:rPr lang="en-US" altLang="zh-CN" sz="2400" dirty="0">
-                <a:solidFill>
-                  <a:srgbClr val="0000FF"/>
-                </a:solidFill>
-                <a:latin typeface="微软雅黑" panose="020B0503020204020204" pitchFamily="34" charset="-122"/>
-                <a:ea typeface="微软雅黑" panose="020B0503020204020204" pitchFamily="34" charset="-122"/>
-              </a:rPr>
-              <a:t> </a:t>
-            </a:r>
-            <a:r>
-              <a:rPr lang="en-US" altLang="zh-CN" sz="2400" i="1" dirty="0">
-                <a:solidFill>
-                  <a:srgbClr val="0000FF"/>
-                </a:solidFill>
-                <a:latin typeface="微软雅黑" panose="020B0503020204020204" pitchFamily="34" charset="-122"/>
-                <a:ea typeface="微软雅黑" panose="020B0503020204020204" pitchFamily="34" charset="-122"/>
-              </a:rPr>
-              <a:t>δ'</a:t>
-            </a:r>
-            <a:endParaRPr lang="zh-CN" altLang="en-US" sz="2400" i="1" dirty="0">
-              <a:solidFill>
-                <a:srgbClr val="0000FF"/>
-              </a:solidFill>
-              <a:latin typeface="微软雅黑" panose="020B0503020204020204" pitchFamily="34" charset="-122"/>
-              <a:ea typeface="微软雅黑" panose="020B0503020204020204" pitchFamily="34" charset="-122"/>
-            </a:endParaRPr>
-          </a:p>
-        </p:txBody>
-      </p:sp>
-      <p:sp>
-        <p:nvSpPr>
-          <p:cNvPr id="32" name="矩形 31">
-            <a:extLst>
-              <a:ext uri="{FF2B5EF4-FFF2-40B4-BE49-F238E27FC236}">
-                <a16:creationId xmlns:a16="http://schemas.microsoft.com/office/drawing/2014/main" id="{E4F9863D-E71E-146E-66CA-3CA7B27170F2}"/>
-              </a:ext>
-            </a:extLst>
-          </p:cNvPr>
-          <p:cNvSpPr/>
-          <p:nvPr/>
-        </p:nvSpPr>
-        <p:spPr>
-          <a:xfrm>
-            <a:off x="2812721" y="1916718"/>
-            <a:ext cx="1868635" cy="461665"/>
-          </a:xfrm>
-          <a:prstGeom prst="rect">
-            <a:avLst/>
-          </a:prstGeom>
-        </p:spPr>
-        <p:txBody>
-          <a:bodyPr wrap="square">
-            <a:spAutoFit/>
-          </a:bodyPr>
-          <a:lstStyle/>
-          <a:p>
-            <a:pPr algn="ctr" fontAlgn="auto">
-              <a:spcBef>
-                <a:spcPts val="600"/>
-              </a:spcBef>
-              <a:spcAft>
-                <a:spcPts val="0"/>
-              </a:spcAft>
-            </a:pPr>
-            <a:r>
-              <a:rPr lang="en-US" altLang="zh-CN" sz="2400" i="1" dirty="0">
-                <a:solidFill>
-                  <a:srgbClr val="0000FF"/>
-                </a:solidFill>
-                <a:latin typeface="Times New Roman" panose="02020603050405020304" pitchFamily="18" charset="0"/>
-                <a:ea typeface="微软雅黑" panose="020B0503020204020204" pitchFamily="34" charset="-122"/>
-                <a:cs typeface="Times New Roman" panose="02020603050405020304" pitchFamily="18" charset="0"/>
-              </a:rPr>
-              <a:t>α</a:t>
-            </a:r>
-            <a:r>
-              <a:rPr lang="en-US" altLang="zh-CN" sz="2400" i="1" dirty="0">
-                <a:solidFill>
-                  <a:srgbClr val="0000FF"/>
-                </a:solidFill>
-                <a:latin typeface="微软雅黑" panose="020B0503020204020204" pitchFamily="34" charset="-122"/>
-                <a:ea typeface="微软雅黑" panose="020B0503020204020204" pitchFamily="34" charset="-122"/>
-              </a:rPr>
-              <a:t>'</a:t>
-            </a:r>
-            <a:r>
-              <a:rPr lang="en-US" altLang="zh-CN" sz="2400" dirty="0">
-                <a:solidFill>
-                  <a:srgbClr val="0000FF"/>
-                </a:solidFill>
-                <a:latin typeface="Times New Roman" panose="02020603050405020304" pitchFamily="18" charset="0"/>
-                <a:ea typeface="微软雅黑" panose="020B0503020204020204" pitchFamily="34" charset="-122"/>
-                <a:cs typeface="Times New Roman" panose="02020603050405020304" pitchFamily="18" charset="0"/>
-              </a:rPr>
-              <a:t> –</a:t>
-            </a:r>
-            <a:r>
-              <a:rPr lang="en-US" altLang="zh-CN" sz="2400" dirty="0">
-                <a:solidFill>
-                  <a:srgbClr val="0000FF"/>
-                </a:solidFill>
-                <a:latin typeface="微软雅黑" panose="020B0503020204020204" pitchFamily="34" charset="-122"/>
-                <a:ea typeface="微软雅黑" panose="020B0503020204020204" pitchFamily="34" charset="-122"/>
-              </a:rPr>
-              <a:t> </a:t>
-            </a:r>
-            <a:r>
-              <a:rPr lang="en-US" altLang="zh-CN" sz="2400" i="1" dirty="0">
-                <a:solidFill>
-                  <a:srgbClr val="0000FF"/>
-                </a:solidFill>
-                <a:latin typeface="Times New Roman" panose="02020603050405020304" pitchFamily="18" charset="0"/>
-                <a:ea typeface="微软雅黑" panose="020B0503020204020204" pitchFamily="34" charset="-122"/>
-                <a:cs typeface="Times New Roman" panose="02020603050405020304" pitchFamily="18" charset="0"/>
-              </a:rPr>
-              <a:t>α</a:t>
-            </a:r>
-            <a:endParaRPr lang="zh-CN" altLang="en-US" sz="2400" i="1" dirty="0">
-              <a:solidFill>
-                <a:srgbClr val="0000FF"/>
-              </a:solidFill>
-              <a:latin typeface="微软雅黑" panose="020B0503020204020204" pitchFamily="34" charset="-122"/>
-              <a:ea typeface="微软雅黑" panose="020B0503020204020204" pitchFamily="34" charset="-122"/>
-            </a:endParaRPr>
           </a:p>
         </p:txBody>
       </p:sp>
@@ -6926,10 +6925,10 @@
           <p:nvPr/>
         </p:nvPicPr>
         <p:blipFill>
-          <a:blip r:embed="rId5">
+          <a:blip r:embed="rId4">
             <a:extLst>
               <a:ext uri="{96DAC541-7B7A-43D3-8B79-37D633B846F1}">
-                <asvg:svgBlip xmlns:asvg="http://schemas.microsoft.com/office/drawing/2016/SVG/main" r:embed="rId6"/>
+                <asvg:svgBlip xmlns:asvg="http://schemas.microsoft.com/office/drawing/2016/SVG/main" r:embed="rId5"/>
               </a:ext>
             </a:extLst>
           </a:blip>
@@ -6947,6 +6946,270 @@
           </a:prstGeom>
         </p:spPr>
       </p:pic>
+      <p:graphicFrame>
+        <p:nvGraphicFramePr>
+          <p:cNvPr id="4" name="对象 3">
+            <a:extLst>
+              <a:ext uri="{FF2B5EF4-FFF2-40B4-BE49-F238E27FC236}">
+                <a16:creationId xmlns:a16="http://schemas.microsoft.com/office/drawing/2014/main" id="{4C79EA12-94E6-2B63-FD4B-4C78E5109911}"/>
+              </a:ext>
+            </a:extLst>
+          </p:cNvPr>
+          <p:cNvGraphicFramePr>
+            <a:graphicFrameLocks noChangeAspect="1"/>
+          </p:cNvGraphicFramePr>
+          <p:nvPr>
+            <p:extLst>
+              <p:ext uri="{D42A27DB-BD31-4B8C-83A1-F6EECF244321}">
+                <p14:modId xmlns:p14="http://schemas.microsoft.com/office/powerpoint/2010/main" val="3178761725"/>
+              </p:ext>
+            </p:extLst>
+          </p:nvPr>
+        </p:nvGraphicFramePr>
+        <p:xfrm>
+          <a:off x="3366037" y="1981979"/>
+          <a:ext cx="762000" cy="377825"/>
+        </p:xfrm>
+        <a:graphic>
+          <a:graphicData uri="http://schemas.openxmlformats.org/presentationml/2006/ole">
+            <mc:AlternateContent xmlns:mc="http://schemas.openxmlformats.org/markup-compatibility/2006">
+              <mc:Choice xmlns:v="urn:schemas-microsoft-com:vml" Requires="v">
+                <p:oleObj name="AxMath" r:id="rId6" imgW="381600" imgH="189000" progId="Equation.AxMath">
+                  <p:embed/>
+                </p:oleObj>
+              </mc:Choice>
+              <mc:Fallback>
+                <p:oleObj name="AxMath" r:id="rId6" imgW="381600" imgH="189000" progId="Equation.AxMath">
+                  <p:embed/>
+                  <p:pic>
+                    <p:nvPicPr>
+                      <p:cNvPr id="0" name=""/>
+                      <p:cNvPicPr/>
+                      <p:nvPr/>
+                    </p:nvPicPr>
+                    <p:blipFill>
+                      <a:blip r:embed="rId7"/>
+                      <a:stretch>
+                        <a:fillRect/>
+                      </a:stretch>
+                    </p:blipFill>
+                    <p:spPr>
+                      <a:xfrm>
+                        <a:off x="3366037" y="1981979"/>
+                        <a:ext cx="762000" cy="377825"/>
+                      </a:xfrm>
+                      <a:prstGeom prst="rect">
+                        <a:avLst/>
+                      </a:prstGeom>
+                    </p:spPr>
+                  </p:pic>
+                </p:oleObj>
+              </mc:Fallback>
+            </mc:AlternateContent>
+          </a:graphicData>
+        </a:graphic>
+      </p:graphicFrame>
+      <p:graphicFrame>
+        <p:nvGraphicFramePr>
+          <p:cNvPr id="6" name="对象 5">
+            <a:extLst>
+              <a:ext uri="{FF2B5EF4-FFF2-40B4-BE49-F238E27FC236}">
+                <a16:creationId xmlns:a16="http://schemas.microsoft.com/office/drawing/2014/main" id="{6BEF8C49-F339-9D72-0571-5778E6ECE63B}"/>
+              </a:ext>
+            </a:extLst>
+          </p:cNvPr>
+          <p:cNvGraphicFramePr>
+            <a:graphicFrameLocks noChangeAspect="1"/>
+          </p:cNvGraphicFramePr>
+          <p:nvPr>
+            <p:extLst>
+              <p:ext uri="{D42A27DB-BD31-4B8C-83A1-F6EECF244321}">
+                <p14:modId xmlns:p14="http://schemas.microsoft.com/office/powerpoint/2010/main" val="2879952654"/>
+              </p:ext>
+            </p:extLst>
+          </p:nvPr>
+        </p:nvGraphicFramePr>
+        <p:xfrm>
+          <a:off x="4750904" y="2420196"/>
+          <a:ext cx="828675" cy="692150"/>
+        </p:xfrm>
+        <a:graphic>
+          <a:graphicData uri="http://schemas.openxmlformats.org/presentationml/2006/ole">
+            <mc:AlternateContent xmlns:mc="http://schemas.openxmlformats.org/markup-compatibility/2006">
+              <mc:Choice xmlns:v="urn:schemas-microsoft-com:vml" Requires="v">
+                <p:oleObj name="AxMath" r:id="rId8" imgW="414720" imgH="346680" progId="Equation.AxMath">
+                  <p:embed/>
+                </p:oleObj>
+              </mc:Choice>
+              <mc:Fallback>
+                <p:oleObj name="AxMath" r:id="rId8" imgW="414720" imgH="346680" progId="Equation.AxMath">
+                  <p:embed/>
+                  <p:pic>
+                    <p:nvPicPr>
+                      <p:cNvPr id="0" name=""/>
+                      <p:cNvPicPr/>
+                      <p:nvPr/>
+                    </p:nvPicPr>
+                    <p:blipFill>
+                      <a:blip r:embed="rId9"/>
+                      <a:stretch>
+                        <a:fillRect/>
+                      </a:stretch>
+                    </p:blipFill>
+                    <p:spPr>
+                      <a:xfrm>
+                        <a:off x="4750904" y="2420196"/>
+                        <a:ext cx="828675" cy="692150"/>
+                      </a:xfrm>
+                      <a:prstGeom prst="rect">
+                        <a:avLst/>
+                      </a:prstGeom>
+                    </p:spPr>
+                  </p:pic>
+                </p:oleObj>
+              </mc:Fallback>
+            </mc:AlternateContent>
+          </a:graphicData>
+        </a:graphic>
+      </p:graphicFrame>
+      <p:graphicFrame>
+        <p:nvGraphicFramePr>
+          <p:cNvPr id="7" name="对象 6">
+            <a:extLst>
+              <a:ext uri="{FF2B5EF4-FFF2-40B4-BE49-F238E27FC236}">
+                <a16:creationId xmlns:a16="http://schemas.microsoft.com/office/drawing/2014/main" id="{11620A21-D6DA-474B-E2A2-547C20B3E81C}"/>
+              </a:ext>
+            </a:extLst>
+          </p:cNvPr>
+          <p:cNvGraphicFramePr>
+            <a:graphicFrameLocks noChangeAspect="1"/>
+          </p:cNvGraphicFramePr>
+          <p:nvPr>
+            <p:extLst>
+              <p:ext uri="{D42A27DB-BD31-4B8C-83A1-F6EECF244321}">
+                <p14:modId xmlns:p14="http://schemas.microsoft.com/office/powerpoint/2010/main" val="2838034443"/>
+              </p:ext>
+            </p:extLst>
+          </p:nvPr>
+        </p:nvGraphicFramePr>
+        <p:xfrm>
+          <a:off x="1989138" y="2557463"/>
+          <a:ext cx="768350" cy="692150"/>
+        </p:xfrm>
+        <a:graphic>
+          <a:graphicData uri="http://schemas.openxmlformats.org/presentationml/2006/ole">
+            <mc:AlternateContent xmlns:mc="http://schemas.openxmlformats.org/markup-compatibility/2006">
+              <mc:Choice xmlns:v="urn:schemas-microsoft-com:vml" Requires="v">
+                <p:oleObj name="AxMath" r:id="rId10" imgW="384840" imgH="346680" progId="Equation.AxMath">
+                  <p:embed/>
+                </p:oleObj>
+              </mc:Choice>
+              <mc:Fallback>
+                <p:oleObj name="AxMath" r:id="rId10" imgW="384840" imgH="346680" progId="Equation.AxMath">
+                  <p:embed/>
+                  <p:pic>
+                    <p:nvPicPr>
+                      <p:cNvPr id="6" name="对象 5">
+                        <a:extLst>
+                          <a:ext uri="{FF2B5EF4-FFF2-40B4-BE49-F238E27FC236}">
+                            <a16:creationId xmlns:a16="http://schemas.microsoft.com/office/drawing/2014/main" id="{6BEF8C49-F339-9D72-0571-5778E6ECE63B}"/>
+                          </a:ext>
+                        </a:extLst>
+                      </p:cNvPr>
+                      <p:cNvPicPr/>
+                      <p:nvPr/>
+                    </p:nvPicPr>
+                    <p:blipFill>
+                      <a:blip r:embed="rId11"/>
+                      <a:stretch>
+                        <a:fillRect/>
+                      </a:stretch>
+                    </p:blipFill>
+                    <p:spPr>
+                      <a:xfrm>
+                        <a:off x="1989138" y="2557463"/>
+                        <a:ext cx="768350" cy="692150"/>
+                      </a:xfrm>
+                      <a:prstGeom prst="rect">
+                        <a:avLst/>
+                      </a:prstGeom>
+                    </p:spPr>
+                  </p:pic>
+                </p:oleObj>
+              </mc:Fallback>
+            </mc:AlternateContent>
+          </a:graphicData>
+        </a:graphic>
+      </p:graphicFrame>
+      <p:graphicFrame>
+        <p:nvGraphicFramePr>
+          <p:cNvPr id="8" name="对象 7">
+            <a:extLst>
+              <a:ext uri="{FF2B5EF4-FFF2-40B4-BE49-F238E27FC236}">
+                <a16:creationId xmlns:a16="http://schemas.microsoft.com/office/drawing/2014/main" id="{287EE052-CE6A-F7AE-884C-E0DD3393F5F5}"/>
+              </a:ext>
+            </a:extLst>
+          </p:cNvPr>
+          <p:cNvGraphicFramePr>
+            <a:graphicFrameLocks noChangeAspect="1"/>
+          </p:cNvGraphicFramePr>
+          <p:nvPr>
+            <p:extLst>
+              <p:ext uri="{D42A27DB-BD31-4B8C-83A1-F6EECF244321}">
+                <p14:modId xmlns:p14="http://schemas.microsoft.com/office/powerpoint/2010/main" val="3565373984"/>
+              </p:ext>
+            </p:extLst>
+          </p:nvPr>
+        </p:nvGraphicFramePr>
+        <p:xfrm>
+          <a:off x="1401435" y="5412338"/>
+          <a:ext cx="4612770" cy="461665"/>
+        </p:xfrm>
+        <a:graphic>
+          <a:graphicData uri="http://schemas.openxmlformats.org/presentationml/2006/ole">
+            <mc:AlternateContent xmlns:mc="http://schemas.openxmlformats.org/markup-compatibility/2006">
+              <mc:Choice xmlns:v="urn:schemas-microsoft-com:vml" Requires="v">
+                <p:oleObj name="AxMath" r:id="rId12" imgW="1888200" imgH="189000" progId="Equation.AxMath">
+                  <p:embed/>
+                </p:oleObj>
+              </mc:Choice>
+              <mc:Fallback>
+                <p:oleObj name="AxMath" r:id="rId12" imgW="1888200" imgH="189000" progId="Equation.AxMath">
+                  <p:embed/>
+                  <p:pic>
+                    <p:nvPicPr>
+                      <p:cNvPr id="6" name="对象 5">
+                        <a:extLst>
+                          <a:ext uri="{FF2B5EF4-FFF2-40B4-BE49-F238E27FC236}">
+                            <a16:creationId xmlns:a16="http://schemas.microsoft.com/office/drawing/2014/main" id="{39E40712-B71A-0EEE-F353-ADE22590F1A9}"/>
+                          </a:ext>
+                        </a:extLst>
+                      </p:cNvPr>
+                      <p:cNvPicPr/>
+                      <p:nvPr/>
+                    </p:nvPicPr>
+                    <p:blipFill>
+                      <a:blip r:embed="rId13"/>
+                      <a:stretch>
+                        <a:fillRect/>
+                      </a:stretch>
+                    </p:blipFill>
+                    <p:spPr>
+                      <a:xfrm>
+                        <a:off x="1401435" y="5412338"/>
+                        <a:ext cx="4612770" cy="461665"/>
+                      </a:xfrm>
+                      <a:prstGeom prst="rect">
+                        <a:avLst/>
+                      </a:prstGeom>
+                    </p:spPr>
+                  </p:pic>
+                </p:oleObj>
+              </mc:Fallback>
+            </mc:AlternateContent>
+          </a:graphicData>
+        </a:graphic>
+      </p:graphicFrame>
     </p:spTree>
     <p:extLst>
       <p:ext uri="{BB962C8B-B14F-4D97-AF65-F5344CB8AC3E}">
@@ -6957,13 +7220,13 @@
   <p:clrMapOvr>
     <a:masterClrMapping/>
   </p:clrMapOvr>
-  <mc:AlternateContent xmlns:mc="http://schemas.openxmlformats.org/markup-compatibility/2006">
-    <mc:Choice xmlns:p159="http://schemas.microsoft.com/office/powerpoint/2015/09/main" Requires="p159">
+  <mc:AlternateContent xmlns:mc="http://schemas.openxmlformats.org/markup-compatibility/2006" xmlns:p159="http://schemas.microsoft.com/office/powerpoint/2015/09/main">
+    <mc:Choice Requires="p159">
       <p:transition spd="slow">
         <p159:morph option="byObject"/>
       </p:transition>
     </mc:Choice>
-    <mc:Fallback>
+    <mc:Fallback xmlns="">
       <p:transition spd="slow">
         <p:fade/>
       </p:transition>
@@ -6981,6 +7244,9 @@
                     <p:cTn id="3" fill="hold">
                       <p:stCondLst>
                         <p:cond delay="indefinite"/>
+                        <p:cond evt="onBegin" delay="0">
+                          <p:tn val="2"/>
+                        </p:cond>
                       </p:stCondLst>
                       <p:childTnLst>
                         <p:par>
@@ -6990,7 +7256,7 @@
                             </p:stCondLst>
                             <p:childTnLst>
                               <p:par>
-                                <p:cTn id="5" presetID="10" presetClass="entr" presetSubtype="0" fill="hold" nodeType="clickEffect">
+                                <p:cTn id="5" presetID="10" presetClass="entr" presetSubtype="0" fill="hold" grpId="0" nodeType="withEffect">
                                   <p:stCondLst>
                                     <p:cond delay="0"/>
                                   </p:stCondLst>
@@ -7003,7 +7269,7 @@
                                           </p:stCondLst>
                                         </p:cTn>
                                         <p:tgtEl>
-                                          <p:spTgt spid="27"/>
+                                          <p:spTgt spid="29"/>
                                         </p:tgtEl>
                                         <p:attrNameLst>
                                           <p:attrName>style.visibility</p:attrName>
@@ -7017,7 +7283,7 @@
                                       <p:cBhvr>
                                         <p:cTn id="7" dur="500"/>
                                         <p:tgtEl>
-                                          <p:spTgt spid="27"/>
+                                          <p:spTgt spid="29"/>
                                         </p:tgtEl>
                                       </p:cBhvr>
                                     </p:animEffect>
@@ -7038,7 +7304,7 @@
                                           </p:stCondLst>
                                         </p:cTn>
                                         <p:tgtEl>
-                                          <p:spTgt spid="29"/>
+                                          <p:spTgt spid="35"/>
                                         </p:tgtEl>
                                         <p:attrNameLst>
                                           <p:attrName>style.visibility</p:attrName>
@@ -7052,146 +7318,6 @@
                                       <p:cBhvr>
                                         <p:cTn id="10" dur="500"/>
                                         <p:tgtEl>
-                                          <p:spTgt spid="29"/>
-                                        </p:tgtEl>
-                                      </p:cBhvr>
-                                    </p:animEffect>
-                                  </p:childTnLst>
-                                </p:cTn>
-                              </p:par>
-                              <p:par>
-                                <p:cTn id="11" presetID="10" presetClass="entr" presetSubtype="0" fill="hold" grpId="0" nodeType="withEffect">
-                                  <p:stCondLst>
-                                    <p:cond delay="0"/>
-                                  </p:stCondLst>
-                                  <p:childTnLst>
-                                    <p:set>
-                                      <p:cBhvr>
-                                        <p:cTn id="12" dur="1" fill="hold">
-                                          <p:stCondLst>
-                                            <p:cond delay="0"/>
-                                          </p:stCondLst>
-                                        </p:cTn>
-                                        <p:tgtEl>
-                                          <p:spTgt spid="30"/>
-                                        </p:tgtEl>
-                                        <p:attrNameLst>
-                                          <p:attrName>style.visibility</p:attrName>
-                                        </p:attrNameLst>
-                                      </p:cBhvr>
-                                      <p:to>
-                                        <p:strVal val="visible"/>
-                                      </p:to>
-                                    </p:set>
-                                    <p:animEffect transition="in" filter="fade">
-                                      <p:cBhvr>
-                                        <p:cTn id="13" dur="500"/>
-                                        <p:tgtEl>
-                                          <p:spTgt spid="30"/>
-                                        </p:tgtEl>
-                                      </p:cBhvr>
-                                    </p:animEffect>
-                                  </p:childTnLst>
-                                </p:cTn>
-                              </p:par>
-                              <p:par>
-                                <p:cTn id="14" presetID="10" presetClass="entr" presetSubtype="0" fill="hold" grpId="0" nodeType="withEffect">
-                                  <p:stCondLst>
-                                    <p:cond delay="0"/>
-                                  </p:stCondLst>
-                                  <p:childTnLst>
-                                    <p:set>
-                                      <p:cBhvr>
-                                        <p:cTn id="15" dur="1" fill="hold">
-                                          <p:stCondLst>
-                                            <p:cond delay="0"/>
-                                          </p:stCondLst>
-                                        </p:cTn>
-                                        <p:tgtEl>
-                                          <p:spTgt spid="31"/>
-                                        </p:tgtEl>
-                                        <p:attrNameLst>
-                                          <p:attrName>style.visibility</p:attrName>
-                                        </p:attrNameLst>
-                                      </p:cBhvr>
-                                      <p:to>
-                                        <p:strVal val="visible"/>
-                                      </p:to>
-                                    </p:set>
-                                    <p:animEffect transition="in" filter="fade">
-                                      <p:cBhvr>
-                                        <p:cTn id="16" dur="500"/>
-                                        <p:tgtEl>
-                                          <p:spTgt spid="31"/>
-                                        </p:tgtEl>
-                                      </p:cBhvr>
-                                    </p:animEffect>
-                                  </p:childTnLst>
-                                </p:cTn>
-                              </p:par>
-                              <p:par>
-                                <p:cTn id="17" presetID="10" presetClass="entr" presetSubtype="0" fill="hold" grpId="0" nodeType="withEffect">
-                                  <p:stCondLst>
-                                    <p:cond delay="0"/>
-                                  </p:stCondLst>
-                                  <p:childTnLst>
-                                    <p:set>
-                                      <p:cBhvr>
-                                        <p:cTn id="18" dur="1" fill="hold">
-                                          <p:stCondLst>
-                                            <p:cond delay="0"/>
-                                          </p:stCondLst>
-                                        </p:cTn>
-                                        <p:tgtEl>
-                                          <p:spTgt spid="32"/>
-                                        </p:tgtEl>
-                                        <p:attrNameLst>
-                                          <p:attrName>style.visibility</p:attrName>
-                                        </p:attrNameLst>
-                                      </p:cBhvr>
-                                      <p:to>
-                                        <p:strVal val="visible"/>
-                                      </p:to>
-                                    </p:set>
-                                    <p:animEffect transition="in" filter="fade">
-                                      <p:cBhvr>
-                                        <p:cTn id="19" dur="500"/>
-                                        <p:tgtEl>
-                                          <p:spTgt spid="32"/>
-                                        </p:tgtEl>
-                                      </p:cBhvr>
-                                    </p:animEffect>
-                                  </p:childTnLst>
-                                </p:cTn>
-                              </p:par>
-                              <p:par>
-                                <p:cTn id="20" presetID="10" presetClass="entr" presetSubtype="0" fill="hold" grpId="0" nodeType="withEffect">
-                                  <p:stCondLst>
-                                    <p:cond delay="0"/>
-                                  </p:stCondLst>
-                                  <p:childTnLst>
-                                    <p:set>
-                                      <p:cBhvr>
-                                        <p:cTn id="21" dur="1" fill="hold">
-                                          <p:stCondLst>
-                                            <p:cond delay="0"/>
-                                          </p:stCondLst>
-                                        </p:cTn>
-                                        <p:tgtEl>
-                                          <p:spTgt spid="35"/>
-                                        </p:tgtEl>
-                                        <p:attrNameLst>
-                                          <p:attrName>style.visibility</p:attrName>
-                                        </p:attrNameLst>
-                                      </p:cBhvr>
-                                      <p:to>
-                                        <p:strVal val="visible"/>
-                                      </p:to>
-                                    </p:set>
-                                    <p:animEffect transition="in" filter="fade">
-                                      <p:cBhvr>
-                                        <p:cTn id="22" dur="500"/>
-                                        <p:tgtEl>
                                           <p:spTgt spid="35"/>
                                         </p:tgtEl>
                                       </p:cBhvr>
@@ -7200,14 +7326,14 @@
                                 </p:cTn>
                               </p:par>
                               <p:par>
-                                <p:cTn id="23" presetID="10" presetClass="entr" presetSubtype="0" fill="hold" nodeType="withEffect">
+                                <p:cTn id="11" presetID="10" presetClass="entr" presetSubtype="0" fill="hold" nodeType="withEffect">
                                   <p:stCondLst>
                                     <p:cond delay="0"/>
                                   </p:stCondLst>
                                   <p:childTnLst>
                                     <p:set>
                                       <p:cBhvr>
-                                        <p:cTn id="24" dur="1" fill="hold">
+                                        <p:cTn id="12" dur="1" fill="hold">
                                           <p:stCondLst>
                                             <p:cond delay="0"/>
                                           </p:stCondLst>
@@ -7225,7 +7351,7 @@
                                     </p:set>
                                     <p:animEffect transition="in" filter="fade">
                                       <p:cBhvr>
-                                        <p:cTn id="25" dur="500"/>
+                                        <p:cTn id="13" dur="500"/>
                                         <p:tgtEl>
                                           <p:spTgt spid="28"/>
                                         </p:tgtEl>
@@ -7263,9 +7389,6 @@
     </p:tnLst>
     <p:bldLst>
       <p:bldP spid="29" grpId="0"/>
-      <p:bldP spid="30" grpId="0"/>
-      <p:bldP spid="31" grpId="0"/>
-      <p:bldP spid="32" grpId="0"/>
       <p:bldP spid="35" grpId="0"/>
     </p:bldLst>
   </p:timing>
@@ -7322,8 +7445,9 @@
                 <a:solidFill>
                   <a:srgbClr val="FF0000"/>
                 </a:solidFill>
-                <a:latin typeface="微软雅黑" panose="020B0503020204020204" pitchFamily="34" charset="-122"/>
-                <a:ea typeface="微软雅黑" panose="020B0503020204020204" pitchFamily="34" charset="-122"/>
+                <a:latin typeface="Times New Roman" panose="02020603050405020304" pitchFamily="18" charset="0"/>
+                <a:ea typeface="微软雅黑" panose="020B0503020204020204" pitchFamily="34" charset="-122"/>
+                <a:cs typeface="Times New Roman" panose="02020603050405020304" pitchFamily="18" charset="0"/>
                 <a:sym typeface="+mn-ea"/>
               </a:rPr>
               <a:t>时刻（历元）</a:t>
@@ -7333,8 +7457,9 @@
                 <a:solidFill>
                   <a:srgbClr val="0000FF"/>
                 </a:solidFill>
-                <a:latin typeface="微软雅黑" panose="020B0503020204020204" pitchFamily="34" charset="-122"/>
-                <a:ea typeface="微软雅黑" panose="020B0503020204020204" pitchFamily="34" charset="-122"/>
+                <a:latin typeface="Times New Roman" panose="02020603050405020304" pitchFamily="18" charset="0"/>
+                <a:ea typeface="微软雅黑" panose="020B0503020204020204" pitchFamily="34" charset="-122"/>
+                <a:cs typeface="Times New Roman" panose="02020603050405020304" pitchFamily="18" charset="0"/>
                 <a:sym typeface="+mn-ea"/>
               </a:rPr>
               <a:t>：方便计算时间间隔</a:t>
@@ -7343,8 +7468,9 @@
               <a:solidFill>
                 <a:srgbClr val="0000FF"/>
               </a:solidFill>
-              <a:latin typeface="微软雅黑" panose="020B0503020204020204" pitchFamily="34" charset="-122"/>
+              <a:latin typeface="Times New Roman" panose="02020603050405020304" pitchFamily="18" charset="0"/>
               <a:ea typeface="微软雅黑" panose="020B0503020204020204" pitchFamily="34" charset="-122"/>
+              <a:cs typeface="Times New Roman" panose="02020603050405020304" pitchFamily="18" charset="0"/>
               <a:sym typeface="+mn-ea"/>
             </a:endParaRPr>
           </a:p>
@@ -7358,31 +7484,35 @@
             </a:pPr>
             <a:r>
               <a:rPr lang="zh-CN" altLang="en-US" sz="2400" b="1" dirty="0">
-                <a:latin typeface="微软雅黑" panose="020B0503020204020204" pitchFamily="34" charset="-122"/>
-                <a:ea typeface="微软雅黑" panose="020B0503020204020204" pitchFamily="34" charset="-122"/>
+                <a:latin typeface="Times New Roman" panose="02020603050405020304" pitchFamily="18" charset="0"/>
+                <a:ea typeface="微软雅黑" panose="020B0503020204020204" pitchFamily="34" charset="-122"/>
+                <a:cs typeface="Times New Roman" panose="02020603050405020304" pitchFamily="18" charset="0"/>
                 <a:sym typeface="+mn-ea"/>
               </a:rPr>
               <a:t>贝塞尔历元 （</a:t>
             </a:r>
             <a:r>
               <a:rPr lang="en-US" altLang="zh-CN" sz="2400" b="1" dirty="0">
-                <a:latin typeface="微软雅黑" panose="020B0503020204020204" pitchFamily="34" charset="-122"/>
-                <a:ea typeface="微软雅黑" panose="020B0503020204020204" pitchFamily="34" charset="-122"/>
+                <a:latin typeface="Times New Roman" panose="02020603050405020304" pitchFamily="18" charset="0"/>
+                <a:ea typeface="微软雅黑" panose="020B0503020204020204" pitchFamily="34" charset="-122"/>
+                <a:cs typeface="Times New Roman" panose="02020603050405020304" pitchFamily="18" charset="0"/>
                 <a:sym typeface="+mn-ea"/>
               </a:rPr>
               <a:t>B1950.0</a:t>
             </a:r>
             <a:r>
               <a:rPr lang="zh-CN" altLang="en-US" sz="2400" b="1" dirty="0">
-                <a:latin typeface="微软雅黑" panose="020B0503020204020204" pitchFamily="34" charset="-122"/>
-                <a:ea typeface="微软雅黑" panose="020B0503020204020204" pitchFamily="34" charset="-122"/>
+                <a:latin typeface="Times New Roman" panose="02020603050405020304" pitchFamily="18" charset="0"/>
+                <a:ea typeface="微软雅黑" panose="020B0503020204020204" pitchFamily="34" charset="-122"/>
+                <a:cs typeface="Times New Roman" panose="02020603050405020304" pitchFamily="18" charset="0"/>
                 <a:sym typeface="+mn-ea"/>
               </a:rPr>
               <a:t>）</a:t>
             </a:r>
             <a:endParaRPr lang="en-US" altLang="zh-CN" sz="2400" b="1" dirty="0">
-              <a:latin typeface="微软雅黑" panose="020B0503020204020204" pitchFamily="34" charset="-122"/>
+              <a:latin typeface="Times New Roman" panose="02020603050405020304" pitchFamily="18" charset="0"/>
               <a:ea typeface="微软雅黑" panose="020B0503020204020204" pitchFamily="34" charset="-122"/>
+              <a:cs typeface="Times New Roman" panose="02020603050405020304" pitchFamily="18" charset="0"/>
               <a:sym typeface="+mn-ea"/>
             </a:endParaRPr>
           </a:p>
@@ -7396,31 +7526,35 @@
             </a:pPr>
             <a:r>
               <a:rPr lang="en-US" altLang="zh-CN" sz="2000" b="1" dirty="0">
-                <a:latin typeface="微软雅黑" panose="020B0503020204020204" pitchFamily="34" charset="-122"/>
-                <a:ea typeface="微软雅黑" panose="020B0503020204020204" pitchFamily="34" charset="-122"/>
+                <a:latin typeface="Times New Roman" panose="02020603050405020304" pitchFamily="18" charset="0"/>
+                <a:ea typeface="微软雅黑" panose="020B0503020204020204" pitchFamily="34" charset="-122"/>
+                <a:cs typeface="Times New Roman" panose="02020603050405020304" pitchFamily="18" charset="0"/>
                 <a:sym typeface="+mn-ea"/>
               </a:rPr>
               <a:t>1 </a:t>
             </a:r>
             <a:r>
               <a:rPr lang="en-US" altLang="zh-CN" sz="2000" b="1" dirty="0" err="1">
-                <a:latin typeface="微软雅黑" panose="020B0503020204020204" pitchFamily="34" charset="-122"/>
-                <a:ea typeface="微软雅黑" panose="020B0503020204020204" pitchFamily="34" charset="-122"/>
+                <a:latin typeface="Times New Roman" panose="02020603050405020304" pitchFamily="18" charset="0"/>
+                <a:ea typeface="微软雅黑" panose="020B0503020204020204" pitchFamily="34" charset="-122"/>
+                <a:cs typeface="Times New Roman" panose="02020603050405020304" pitchFamily="18" charset="0"/>
                 <a:sym typeface="+mn-ea"/>
               </a:rPr>
               <a:t>yr</a:t>
             </a:r>
             <a:r>
               <a:rPr lang="en-US" altLang="zh-CN" sz="2000" b="1" dirty="0">
-                <a:latin typeface="微软雅黑" panose="020B0503020204020204" pitchFamily="34" charset="-122"/>
-                <a:ea typeface="微软雅黑" panose="020B0503020204020204" pitchFamily="34" charset="-122"/>
+                <a:latin typeface="Times New Roman" panose="02020603050405020304" pitchFamily="18" charset="0"/>
+                <a:ea typeface="微软雅黑" panose="020B0503020204020204" pitchFamily="34" charset="-122"/>
+                <a:cs typeface="Times New Roman" panose="02020603050405020304" pitchFamily="18" charset="0"/>
                 <a:sym typeface="+mn-ea"/>
               </a:rPr>
               <a:t> = 365.2421988 d</a:t>
             </a:r>
             <a:endParaRPr lang="en-US" altLang="zh-CN" sz="2400" b="1" dirty="0">
-              <a:latin typeface="微软雅黑" panose="020B0503020204020204" pitchFamily="34" charset="-122"/>
+              <a:latin typeface="Times New Roman" panose="02020603050405020304" pitchFamily="18" charset="0"/>
               <a:ea typeface="微软雅黑" panose="020B0503020204020204" pitchFamily="34" charset="-122"/>
+              <a:cs typeface="Times New Roman" panose="02020603050405020304" pitchFamily="18" charset="0"/>
               <a:sym typeface="+mn-ea"/>
             </a:endParaRPr>
           </a:p>
@@ -7434,24 +7568,27 @@
             </a:pPr>
             <a:r>
               <a:rPr lang="zh-CN" altLang="en-US" sz="2400" b="1" dirty="0">
-                <a:latin typeface="微软雅黑" panose="020B0503020204020204" pitchFamily="34" charset="-122"/>
-                <a:ea typeface="微软雅黑" panose="020B0503020204020204" pitchFamily="34" charset="-122"/>
+                <a:latin typeface="Times New Roman" panose="02020603050405020304" pitchFamily="18" charset="0"/>
+                <a:ea typeface="微软雅黑" panose="020B0503020204020204" pitchFamily="34" charset="-122"/>
+                <a:cs typeface="Times New Roman" panose="02020603050405020304" pitchFamily="18" charset="0"/>
                 <a:sym typeface="+mn-ea"/>
               </a:rPr>
               <a:t>儒略历元 （</a:t>
             </a:r>
             <a:r>
               <a:rPr lang="en-US" altLang="zh-CN" sz="2400" b="1" dirty="0">
-                <a:latin typeface="微软雅黑" panose="020B0503020204020204" pitchFamily="34" charset="-122"/>
-                <a:ea typeface="微软雅黑" panose="020B0503020204020204" pitchFamily="34" charset="-122"/>
+                <a:latin typeface="Times New Roman" panose="02020603050405020304" pitchFamily="18" charset="0"/>
+                <a:ea typeface="微软雅黑" panose="020B0503020204020204" pitchFamily="34" charset="-122"/>
+                <a:cs typeface="Times New Roman" panose="02020603050405020304" pitchFamily="18" charset="0"/>
                 <a:sym typeface="+mn-ea"/>
               </a:rPr>
               <a:t>J2000.0</a:t>
             </a:r>
             <a:r>
               <a:rPr lang="zh-CN" altLang="en-US" sz="2400" b="1" dirty="0">
-                <a:latin typeface="微软雅黑" panose="020B0503020204020204" pitchFamily="34" charset="-122"/>
-                <a:ea typeface="微软雅黑" panose="020B0503020204020204" pitchFamily="34" charset="-122"/>
+                <a:latin typeface="Times New Roman" panose="02020603050405020304" pitchFamily="18" charset="0"/>
+                <a:ea typeface="微软雅黑" panose="020B0503020204020204" pitchFamily="34" charset="-122"/>
+                <a:cs typeface="Times New Roman" panose="02020603050405020304" pitchFamily="18" charset="0"/>
                 <a:sym typeface="+mn-ea"/>
               </a:rPr>
               <a:t>）</a:t>
@@ -7461,15 +7598,17 @@
                 <a:solidFill>
                   <a:srgbClr val="0000FF"/>
                 </a:solidFill>
-                <a:latin typeface="微软雅黑" panose="020B0503020204020204" pitchFamily="34" charset="-122"/>
-                <a:ea typeface="微软雅黑" panose="020B0503020204020204" pitchFamily="34" charset="-122"/>
+                <a:latin typeface="Times New Roman" panose="02020603050405020304" pitchFamily="18" charset="0"/>
+                <a:ea typeface="微软雅黑" panose="020B0503020204020204" pitchFamily="34" charset="-122"/>
+                <a:cs typeface="Times New Roman" panose="02020603050405020304" pitchFamily="18" charset="0"/>
                 <a:sym typeface="+mn-ea"/>
               </a:rPr>
               <a:t>JD = 2451545.0</a:t>
             </a:r>
             <a:endParaRPr lang="en-US" altLang="zh-CN" sz="2400" b="1" dirty="0">
-              <a:latin typeface="微软雅黑" panose="020B0503020204020204" pitchFamily="34" charset="-122"/>
+              <a:latin typeface="Times New Roman" panose="02020603050405020304" pitchFamily="18" charset="0"/>
               <a:ea typeface="微软雅黑" panose="020B0503020204020204" pitchFamily="34" charset="-122"/>
+              <a:cs typeface="Times New Roman" panose="02020603050405020304" pitchFamily="18" charset="0"/>
               <a:sym typeface="+mn-ea"/>
             </a:endParaRPr>
           </a:p>
@@ -7486,8 +7625,9 @@
                 <a:solidFill>
                   <a:schemeClr val="tx1"/>
                 </a:solidFill>
-                <a:latin typeface="微软雅黑" panose="020B0503020204020204" pitchFamily="34" charset="-122"/>
-                <a:ea typeface="微软雅黑" panose="020B0503020204020204" pitchFamily="34" charset="-122"/>
+                <a:latin typeface="Times New Roman" panose="02020603050405020304" pitchFamily="18" charset="0"/>
+                <a:ea typeface="微软雅黑" panose="020B0503020204020204" pitchFamily="34" charset="-122"/>
+                <a:cs typeface="Times New Roman" panose="02020603050405020304" pitchFamily="18" charset="0"/>
                 <a:sym typeface="+mn-ea"/>
               </a:rPr>
               <a:t>1 </a:t>
@@ -7497,8 +7637,9 @@
                 <a:solidFill>
                   <a:schemeClr val="tx1"/>
                 </a:solidFill>
-                <a:latin typeface="微软雅黑" panose="020B0503020204020204" pitchFamily="34" charset="-122"/>
-                <a:ea typeface="微软雅黑" panose="020B0503020204020204" pitchFamily="34" charset="-122"/>
+                <a:latin typeface="Times New Roman" panose="02020603050405020304" pitchFamily="18" charset="0"/>
+                <a:ea typeface="微软雅黑" panose="020B0503020204020204" pitchFamily="34" charset="-122"/>
+                <a:cs typeface="Times New Roman" panose="02020603050405020304" pitchFamily="18" charset="0"/>
                 <a:sym typeface="+mn-ea"/>
               </a:rPr>
               <a:t>yr</a:t>
@@ -7508,8 +7649,9 @@
                 <a:solidFill>
                   <a:schemeClr val="tx1"/>
                 </a:solidFill>
-                <a:latin typeface="微软雅黑" panose="020B0503020204020204" pitchFamily="34" charset="-122"/>
-                <a:ea typeface="微软雅黑" panose="020B0503020204020204" pitchFamily="34" charset="-122"/>
+                <a:latin typeface="Times New Roman" panose="02020603050405020304" pitchFamily="18" charset="0"/>
+                <a:ea typeface="微软雅黑" panose="020B0503020204020204" pitchFamily="34" charset="-122"/>
+                <a:cs typeface="Times New Roman" panose="02020603050405020304" pitchFamily="18" charset="0"/>
                 <a:sym typeface="+mn-ea"/>
               </a:rPr>
               <a:t> = 365.25 d</a:t>
@@ -7525,40 +7667,45 @@
             </a:pPr>
             <a:r>
               <a:rPr lang="en-US" altLang="zh-CN" sz="2000" b="1" dirty="0">
-                <a:latin typeface="微软雅黑" panose="020B0503020204020204" pitchFamily="34" charset="-122"/>
-                <a:ea typeface="微软雅黑" panose="020B0503020204020204" pitchFamily="34" charset="-122"/>
+                <a:latin typeface="Times New Roman" panose="02020603050405020304" pitchFamily="18" charset="0"/>
+                <a:ea typeface="微软雅黑" panose="020B0503020204020204" pitchFamily="34" charset="-122"/>
+                <a:cs typeface="Times New Roman" panose="02020603050405020304" pitchFamily="18" charset="0"/>
                 <a:sym typeface="+mn-ea"/>
               </a:rPr>
               <a:t>1 </a:t>
             </a:r>
             <a:r>
               <a:rPr lang="en-US" altLang="zh-CN" sz="2000" b="1" dirty="0" err="1">
-                <a:latin typeface="微软雅黑" panose="020B0503020204020204" pitchFamily="34" charset="-122"/>
-                <a:ea typeface="微软雅黑" panose="020B0503020204020204" pitchFamily="34" charset="-122"/>
+                <a:latin typeface="Times New Roman" panose="02020603050405020304" pitchFamily="18" charset="0"/>
+                <a:ea typeface="微软雅黑" panose="020B0503020204020204" pitchFamily="34" charset="-122"/>
+                <a:cs typeface="Times New Roman" panose="02020603050405020304" pitchFamily="18" charset="0"/>
                 <a:sym typeface="+mn-ea"/>
               </a:rPr>
               <a:t>jc</a:t>
             </a:r>
             <a:r>
               <a:rPr lang="en-US" altLang="zh-CN" sz="2000" b="1" dirty="0">
-                <a:latin typeface="微软雅黑" panose="020B0503020204020204" pitchFamily="34" charset="-122"/>
-                <a:ea typeface="微软雅黑" panose="020B0503020204020204" pitchFamily="34" charset="-122"/>
+                <a:latin typeface="Times New Roman" panose="02020603050405020304" pitchFamily="18" charset="0"/>
+                <a:ea typeface="微软雅黑" panose="020B0503020204020204" pitchFamily="34" charset="-122"/>
+                <a:cs typeface="Times New Roman" panose="02020603050405020304" pitchFamily="18" charset="0"/>
                 <a:sym typeface="+mn-ea"/>
               </a:rPr>
               <a:t> = 100 </a:t>
             </a:r>
             <a:r>
               <a:rPr lang="en-US" altLang="zh-CN" sz="2000" b="1" dirty="0" err="1">
-                <a:latin typeface="微软雅黑" panose="020B0503020204020204" pitchFamily="34" charset="-122"/>
-                <a:ea typeface="微软雅黑" panose="020B0503020204020204" pitchFamily="34" charset="-122"/>
+                <a:latin typeface="Times New Roman" panose="02020603050405020304" pitchFamily="18" charset="0"/>
+                <a:ea typeface="微软雅黑" panose="020B0503020204020204" pitchFamily="34" charset="-122"/>
+                <a:cs typeface="Times New Roman" panose="02020603050405020304" pitchFamily="18" charset="0"/>
                 <a:sym typeface="+mn-ea"/>
               </a:rPr>
               <a:t>yr</a:t>
             </a:r>
             <a:r>
               <a:rPr lang="en-US" altLang="zh-CN" sz="2000" b="1" dirty="0">
-                <a:latin typeface="微软雅黑" panose="020B0503020204020204" pitchFamily="34" charset="-122"/>
-                <a:ea typeface="微软雅黑" panose="020B0503020204020204" pitchFamily="34" charset="-122"/>
+                <a:latin typeface="Times New Roman" panose="02020603050405020304" pitchFamily="18" charset="0"/>
+                <a:ea typeface="微软雅黑" panose="020B0503020204020204" pitchFamily="34" charset="-122"/>
+                <a:cs typeface="Times New Roman" panose="02020603050405020304" pitchFamily="18" charset="0"/>
                 <a:sym typeface="+mn-ea"/>
               </a:rPr>
               <a:t> = 36525 d</a:t>
@@ -7574,31 +7721,35 @@
             </a:pPr>
             <a:r>
               <a:rPr lang="zh-CN" altLang="en-US" sz="2000" b="1" dirty="0">
-                <a:latin typeface="微软雅黑" panose="020B0503020204020204" pitchFamily="34" charset="-122"/>
-                <a:ea typeface="微软雅黑" panose="020B0503020204020204" pitchFamily="34" charset="-122"/>
+                <a:latin typeface="Times New Roman" panose="02020603050405020304" pitchFamily="18" charset="0"/>
+                <a:ea typeface="微软雅黑" panose="020B0503020204020204" pitchFamily="34" charset="-122"/>
+                <a:cs typeface="Times New Roman" panose="02020603050405020304" pitchFamily="18" charset="0"/>
                 <a:sym typeface="+mn-ea"/>
               </a:rPr>
               <a:t>约简儒略日（</a:t>
             </a:r>
             <a:r>
               <a:rPr lang="en-US" altLang="zh-CN" sz="2000" b="1" dirty="0">
-                <a:latin typeface="微软雅黑" panose="020B0503020204020204" pitchFamily="34" charset="-122"/>
-                <a:ea typeface="微软雅黑" panose="020B0503020204020204" pitchFamily="34" charset="-122"/>
+                <a:latin typeface="Times New Roman" panose="02020603050405020304" pitchFamily="18" charset="0"/>
+                <a:ea typeface="微软雅黑" panose="020B0503020204020204" pitchFamily="34" charset="-122"/>
+                <a:cs typeface="Times New Roman" panose="02020603050405020304" pitchFamily="18" charset="0"/>
                 <a:sym typeface="+mn-ea"/>
               </a:rPr>
               <a:t>Modified Julian Day</a:t>
             </a:r>
             <a:r>
               <a:rPr lang="zh-CN" altLang="en-US" sz="2000" b="1" dirty="0">
-                <a:latin typeface="微软雅黑" panose="020B0503020204020204" pitchFamily="34" charset="-122"/>
-                <a:ea typeface="微软雅黑" panose="020B0503020204020204" pitchFamily="34" charset="-122"/>
+                <a:latin typeface="Times New Roman" panose="02020603050405020304" pitchFamily="18" charset="0"/>
+                <a:ea typeface="微软雅黑" panose="020B0503020204020204" pitchFamily="34" charset="-122"/>
+                <a:cs typeface="Times New Roman" panose="02020603050405020304" pitchFamily="18" charset="0"/>
                 <a:sym typeface="+mn-ea"/>
               </a:rPr>
               <a:t>）</a:t>
             </a:r>
             <a:endParaRPr lang="en-US" altLang="zh-CN" sz="2000" b="1" dirty="0">
-              <a:latin typeface="微软雅黑" panose="020B0503020204020204" pitchFamily="34" charset="-122"/>
+              <a:latin typeface="Times New Roman" panose="02020603050405020304" pitchFamily="18" charset="0"/>
               <a:ea typeface="微软雅黑" panose="020B0503020204020204" pitchFamily="34" charset="-122"/>
+              <a:cs typeface="Times New Roman" panose="02020603050405020304" pitchFamily="18" charset="0"/>
               <a:sym typeface="+mn-ea"/>
             </a:endParaRPr>
           </a:p>
@@ -7614,8 +7765,9 @@
               <a:buChar char="•"/>
             </a:pPr>
             <a:endParaRPr lang="en-US" altLang="zh-CN" sz="2400" b="1" dirty="0">
-              <a:latin typeface="微软雅黑" panose="020B0503020204020204" pitchFamily="34" charset="-122"/>
+              <a:latin typeface="Times New Roman" panose="02020603050405020304" pitchFamily="18" charset="0"/>
               <a:ea typeface="微软雅黑" panose="020B0503020204020204" pitchFamily="34" charset="-122"/>
+              <a:cs typeface="Times New Roman" panose="02020603050405020304" pitchFamily="18" charset="0"/>
               <a:sym typeface="+mn-ea"/>
             </a:endParaRPr>
           </a:p>
@@ -7631,8 +7783,9 @@
               <a:solidFill>
                 <a:srgbClr val="FF0000"/>
               </a:solidFill>
-              <a:latin typeface="微软雅黑" panose="020B0503020204020204" pitchFamily="34" charset="-122"/>
+              <a:latin typeface="Times New Roman" panose="02020603050405020304" pitchFamily="18" charset="0"/>
               <a:ea typeface="微软雅黑" panose="020B0503020204020204" pitchFamily="34" charset="-122"/>
+              <a:cs typeface="Times New Roman" panose="02020603050405020304" pitchFamily="18" charset="0"/>
             </a:endParaRPr>
           </a:p>
           <a:p>
@@ -7648,14 +7801,16 @@
                 <a:solidFill>
                   <a:srgbClr val="FF0000"/>
                 </a:solidFill>
-                <a:latin typeface="微软雅黑" panose="020B0503020204020204" pitchFamily="34" charset="-122"/>
-                <a:ea typeface="微软雅黑" panose="020B0503020204020204" pitchFamily="34" charset="-122"/>
+                <a:latin typeface="Times New Roman" panose="02020603050405020304" pitchFamily="18" charset="0"/>
+                <a:ea typeface="微软雅黑" panose="020B0503020204020204" pitchFamily="34" charset="-122"/>
+                <a:cs typeface="Times New Roman" panose="02020603050405020304" pitchFamily="18" charset="0"/>
               </a:rPr>
               <a:t>时间间隔</a:t>
             </a:r>
             <a:endParaRPr lang="en-US" altLang="zh-CN" sz="3200" b="1" dirty="0">
-              <a:latin typeface="微软雅黑" panose="020B0503020204020204" pitchFamily="34" charset="-122"/>
+              <a:latin typeface="Times New Roman" panose="02020603050405020304" pitchFamily="18" charset="0"/>
               <a:ea typeface="微软雅黑" panose="020B0503020204020204" pitchFamily="34" charset="-122"/>
+              <a:cs typeface="Times New Roman" panose="02020603050405020304" pitchFamily="18" charset="0"/>
               <a:sym typeface="+mn-ea"/>
             </a:endParaRPr>
           </a:p>
@@ -7777,8 +7932,9 @@
                 <a:solidFill>
                   <a:srgbClr val="0000FF"/>
                 </a:solidFill>
-                <a:latin typeface="微软雅黑" panose="020B0503020204020204" pitchFamily="34" charset="-122"/>
-                <a:ea typeface="微软雅黑" panose="020B0503020204020204" pitchFamily="34" charset="-122"/>
+                <a:latin typeface="Times New Roman" panose="02020603050405020304" pitchFamily="18" charset="0"/>
+                <a:ea typeface="微软雅黑" panose="020B0503020204020204" pitchFamily="34" charset="-122"/>
+                <a:cs typeface="Times New Roman" panose="02020603050405020304" pitchFamily="18" charset="0"/>
                 <a:sym typeface="+mn-ea"/>
               </a:rPr>
               <a:t>MJD = JD </a:t>
@@ -7799,8 +7955,9 @@
                 <a:solidFill>
                   <a:srgbClr val="0000FF"/>
                 </a:solidFill>
-                <a:latin typeface="微软雅黑" panose="020B0503020204020204" pitchFamily="34" charset="-122"/>
-                <a:ea typeface="微软雅黑" panose="020B0503020204020204" pitchFamily="34" charset="-122"/>
+                <a:latin typeface="Times New Roman" panose="02020603050405020304" pitchFamily="18" charset="0"/>
+                <a:ea typeface="微软雅黑" panose="020B0503020204020204" pitchFamily="34" charset="-122"/>
+                <a:cs typeface="Times New Roman" panose="02020603050405020304" pitchFamily="18" charset="0"/>
                 <a:sym typeface="+mn-ea"/>
               </a:rPr>
               <a:t> 2400000.5</a:t>
@@ -7817,8 +7974,9 @@
                 <a:solidFill>
                   <a:srgbClr val="0000FF"/>
                 </a:solidFill>
-                <a:latin typeface="微软雅黑" panose="020B0503020204020204" pitchFamily="34" charset="-122"/>
-                <a:ea typeface="微软雅黑" panose="020B0503020204020204" pitchFamily="34" charset="-122"/>
+                <a:latin typeface="Times New Roman" panose="02020603050405020304" pitchFamily="18" charset="0"/>
+                <a:ea typeface="微软雅黑" panose="020B0503020204020204" pitchFamily="34" charset="-122"/>
+                <a:cs typeface="Times New Roman" panose="02020603050405020304" pitchFamily="18" charset="0"/>
                 <a:sym typeface="+mn-ea"/>
               </a:rPr>
               <a:t>J2000.0</a:t>
@@ -7828,8 +7986,9 @@
                 <a:solidFill>
                   <a:srgbClr val="0000FF"/>
                 </a:solidFill>
-                <a:latin typeface="微软雅黑" panose="020B0503020204020204" pitchFamily="34" charset="-122"/>
-                <a:ea typeface="微软雅黑" panose="020B0503020204020204" pitchFamily="34" charset="-122"/>
+                <a:latin typeface="Times New Roman" panose="02020603050405020304" pitchFamily="18" charset="0"/>
+                <a:ea typeface="微软雅黑" panose="020B0503020204020204" pitchFamily="34" charset="-122"/>
+                <a:cs typeface="Times New Roman" panose="02020603050405020304" pitchFamily="18" charset="0"/>
                 <a:sym typeface="+mn-ea"/>
               </a:rPr>
               <a:t>： </a:t>
@@ -7839,18 +7998,20 @@
                 <a:solidFill>
                   <a:srgbClr val="0000FF"/>
                 </a:solidFill>
-                <a:latin typeface="微软雅黑" panose="020B0503020204020204" pitchFamily="34" charset="-122"/>
-                <a:ea typeface="微软雅黑" panose="020B0503020204020204" pitchFamily="34" charset="-122"/>
-                <a:sym typeface="+mn-ea"/>
-              </a:rPr>
-              <a:t>MJD=51544.5</a:t>
+                <a:latin typeface="Times New Roman" panose="02020603050405020304" pitchFamily="18" charset="0"/>
+                <a:ea typeface="微软雅黑" panose="020B0503020204020204" pitchFamily="34" charset="-122"/>
+                <a:cs typeface="Times New Roman" panose="02020603050405020304" pitchFamily="18" charset="0"/>
+                <a:sym typeface="+mn-ea"/>
+              </a:rPr>
+              <a:t>MJD = 51544.5</a:t>
             </a:r>
             <a:endParaRPr lang="zh-CN" sz="2000" b="1" dirty="0">
               <a:solidFill>
                 <a:srgbClr val="0000FF"/>
               </a:solidFill>
-              <a:latin typeface="微软雅黑" panose="020B0503020204020204" pitchFamily="34" charset="-122"/>
+              <a:latin typeface="Times New Roman" panose="02020603050405020304" pitchFamily="18" charset="0"/>
               <a:ea typeface="微软雅黑" panose="020B0503020204020204" pitchFamily="34" charset="-122"/>
+              <a:cs typeface="Times New Roman" panose="02020603050405020304" pitchFamily="18" charset="0"/>
             </a:endParaRPr>
           </a:p>
         </p:txBody>
@@ -8249,13 +8410,13 @@
   <p:clrMapOvr>
     <a:masterClrMapping/>
   </p:clrMapOvr>
-  <mc:AlternateContent xmlns:mc="http://schemas.openxmlformats.org/markup-compatibility/2006">
-    <mc:Choice xmlns:p159="http://schemas.microsoft.com/office/powerpoint/2015/09/main" Requires="p159">
+  <mc:AlternateContent xmlns:mc="http://schemas.openxmlformats.org/markup-compatibility/2006" xmlns:p159="http://schemas.microsoft.com/office/powerpoint/2015/09/main">
+    <mc:Choice Requires="p159">
       <p:transition spd="slow">
         <p159:morph option="byObject"/>
       </p:transition>
     </mc:Choice>
-    <mc:Fallback>
+    <mc:Fallback xmlns="">
       <p:transition spd="slow">
         <p:fade/>
       </p:transition>
@@ -8787,219 +8948,166 @@
           <a:chExt cx="0" cy="0"/>
         </a:xfrm>
       </p:grpSpPr>
-      <mc:AlternateContent xmlns:mc="http://schemas.openxmlformats.org/markup-compatibility/2006" xmlns:a14="http://schemas.microsoft.com/office/drawing/2010/main">
-        <mc:Choice Requires="a14">
-          <p:sp>
-            <p:nvSpPr>
-              <p:cNvPr id="3" name="矩形 2"/>
-              <p:cNvSpPr/>
-              <p:nvPr/>
-            </p:nvSpPr>
-            <p:spPr>
-              <a:xfrm>
-                <a:off x="407987" y="1052513"/>
-                <a:ext cx="11376025" cy="3063211"/>
-              </a:xfrm>
-              <a:prstGeom prst="rect">
-                <a:avLst/>
-              </a:prstGeom>
-            </p:spPr>
-            <p:txBody>
-              <a:bodyPr wrap="square">
-                <a:spAutoFit/>
-              </a:bodyPr>
-              <a:lstStyle/>
-              <a:p>
-                <a:pPr marL="342900" indent="-342900" fontAlgn="auto">
-                  <a:lnSpc>
-                    <a:spcPct val="150000"/>
-                  </a:lnSpc>
-                  <a:spcAft>
-                    <a:spcPts val="0"/>
-                  </a:spcAft>
-                  <a:buFont typeface="Arial" panose="020B0604020202020204" pitchFamily="34" charset="0"/>
-                  <a:buChar char="•"/>
-                </a:pPr>
-                <a:r>
-                  <a:rPr lang="zh-CN" altLang="en-US" sz="2800" b="1" dirty="0">
-                    <a:latin typeface="微软雅黑" panose="020B0503020204020204" pitchFamily="34" charset="-122"/>
-                    <a:ea typeface="微软雅黑" panose="020B0503020204020204" pitchFamily="34" charset="-122"/>
-                    <a:sym typeface="+mn-ea"/>
-                  </a:rPr>
-                  <a:t>恒星时 </a:t>
-                </a:r>
-                <a:r>
-                  <a:rPr lang="en-US" altLang="zh-CN" sz="2800" b="1" i="1" dirty="0">
-                    <a:latin typeface="微软雅黑" panose="020B0503020204020204" pitchFamily="34" charset="-122"/>
-                    <a:ea typeface="微软雅黑" panose="020B0503020204020204" pitchFamily="34" charset="-122"/>
-                    <a:sym typeface="+mn-ea"/>
-                  </a:rPr>
-                  <a:t>S</a:t>
-                </a:r>
-              </a:p>
-              <a:p>
-                <a:pPr marL="800100" lvl="1" indent="-342900">
-                  <a:lnSpc>
-                    <a:spcPct val="150000"/>
-                  </a:lnSpc>
-                  <a:buFont typeface="Arial" panose="020B0604020202020204" pitchFamily="34" charset="0"/>
-                  <a:buChar char="•"/>
-                </a:pPr>
-                <a:r>
-                  <a:rPr lang="zh-CN" altLang="en-US" sz="2400" b="1" dirty="0">
-                    <a:solidFill>
-                      <a:schemeClr val="tx1"/>
-                    </a:solidFill>
-                    <a:latin typeface="微软雅黑" panose="020B0503020204020204" pitchFamily="34" charset="-122"/>
-                    <a:ea typeface="微软雅黑" panose="020B0503020204020204" pitchFamily="34" charset="-122"/>
-                    <a:sym typeface="+mn-ea"/>
-                  </a:rPr>
-                  <a:t>起量点：春分点的上中天时刻</a:t>
-                </a:r>
-                <a:endParaRPr lang="en-US" altLang="zh-CN" sz="2400" b="1" dirty="0">
-                  <a:solidFill>
-                    <a:schemeClr val="tx1"/>
-                  </a:solidFill>
-                  <a:latin typeface="微软雅黑" panose="020B0503020204020204" pitchFamily="34" charset="-122"/>
-                  <a:ea typeface="微软雅黑" panose="020B0503020204020204" pitchFamily="34" charset="-122"/>
-                  <a:sym typeface="+mn-ea"/>
-                </a:endParaRPr>
-              </a:p>
-              <a:p>
-                <a:pPr marL="800100" lvl="1" indent="-342900">
-                  <a:lnSpc>
-                    <a:spcPct val="150000"/>
-                  </a:lnSpc>
-                  <a:buFont typeface="Arial" panose="020B0604020202020204" pitchFamily="34" charset="0"/>
-                  <a:buChar char="•"/>
-                </a:pPr>
-                <a:r>
-                  <a:rPr lang="zh-CN" altLang="en-US" sz="2400" b="1" dirty="0">
-                    <a:solidFill>
-                      <a:schemeClr val="tx1"/>
-                    </a:solidFill>
-                    <a:latin typeface="微软雅黑" panose="020B0503020204020204" pitchFamily="34" charset="-122"/>
-                    <a:ea typeface="微软雅黑" panose="020B0503020204020204" pitchFamily="34" charset="-122"/>
-                    <a:sym typeface="+mn-ea"/>
-                  </a:rPr>
-                  <a:t>度量：春分点的时角 </a:t>
-                </a:r>
-                <a:r>
-                  <a:rPr lang="en-US" altLang="zh-CN" sz="2400" b="1" i="1" dirty="0">
-                    <a:solidFill>
-                      <a:schemeClr val="tx1"/>
-                    </a:solidFill>
-                    <a:latin typeface="微软雅黑" panose="020B0503020204020204" pitchFamily="34" charset="-122"/>
-                    <a:ea typeface="微软雅黑" panose="020B0503020204020204" pitchFamily="34" charset="-122"/>
-                    <a:sym typeface="+mn-ea"/>
-                  </a:rPr>
-                  <a:t>t</a:t>
-                </a:r>
-                <a:r>
-                  <a:rPr lang="en-US" altLang="zh-CN" sz="2400" baseline="-25000" dirty="0"/>
-                  <a:t> </a:t>
-                </a:r>
-                <a14:m>
-                  <m:oMath xmlns:m="http://schemas.openxmlformats.org/officeDocument/2006/math">
-                    <m:r>
-                      <m:rPr>
-                        <m:sty m:val="p"/>
-                      </m:rPr>
-                      <a:rPr lang="en-US" altLang="zh-CN" sz="2400" i="0" baseline="-25000" dirty="0">
-                        <a:latin typeface="Cambria Math" panose="02040503050406030204" pitchFamily="18" charset="0"/>
-                      </a:rPr>
-                      <m:t>ϒ</m:t>
-                    </m:r>
-                  </m:oMath>
-                </a14:m>
-                <a:endParaRPr lang="en-US" altLang="zh-CN" sz="2800" b="1" baseline="-25000" dirty="0">
-                  <a:solidFill>
-                    <a:schemeClr val="tx1"/>
-                  </a:solidFill>
-                  <a:latin typeface="微软雅黑" panose="020B0503020204020204" pitchFamily="34" charset="-122"/>
-                  <a:ea typeface="微软雅黑" panose="020B0503020204020204" pitchFamily="34" charset="-122"/>
-                  <a:sym typeface="+mn-ea"/>
-                </a:endParaRPr>
-              </a:p>
-              <a:p>
-                <a:pPr marL="342900" indent="-342900" fontAlgn="auto">
-                  <a:lnSpc>
-                    <a:spcPct val="150000"/>
-                  </a:lnSpc>
-                  <a:spcAft>
-                    <a:spcPts val="0"/>
-                  </a:spcAft>
-                  <a:buFont typeface="Arial" panose="020B0604020202020204" pitchFamily="34" charset="0"/>
-                  <a:buChar char="•"/>
-                </a:pPr>
-                <a:endParaRPr lang="en-US" altLang="zh-CN" sz="2800" b="1" dirty="0">
-                  <a:latin typeface="微软雅黑" panose="020B0503020204020204" pitchFamily="34" charset="-122"/>
-                  <a:ea typeface="微软雅黑" panose="020B0503020204020204" pitchFamily="34" charset="-122"/>
-                  <a:sym typeface="+mn-ea"/>
-                </a:endParaRPr>
-              </a:p>
-              <a:p>
-                <a:pPr marL="342900" indent="-342900" fontAlgn="auto">
-                  <a:lnSpc>
-                    <a:spcPct val="150000"/>
-                  </a:lnSpc>
-                  <a:spcAft>
-                    <a:spcPts val="0"/>
-                  </a:spcAft>
-                  <a:buFont typeface="Arial" panose="020B0604020202020204" pitchFamily="34" charset="0"/>
-                  <a:buChar char="•"/>
-                </a:pPr>
-                <a:endParaRPr lang="en-US" altLang="zh-CN" sz="2800" b="1" dirty="0">
-                  <a:solidFill>
-                    <a:schemeClr val="tx1"/>
-                  </a:solidFill>
-                  <a:latin typeface="微软雅黑" panose="020B0503020204020204" pitchFamily="34" charset="-122"/>
-                  <a:ea typeface="微软雅黑" panose="020B0503020204020204" pitchFamily="34" charset="-122"/>
-                  <a:sym typeface="+mn-ea"/>
-                </a:endParaRPr>
-              </a:p>
-            </p:txBody>
-          </p:sp>
-        </mc:Choice>
-        <mc:Fallback xmlns="">
-          <p:sp>
-            <p:nvSpPr>
-              <p:cNvPr id="3" name="矩形 2"/>
-              <p:cNvSpPr>
-                <a:spLocks noRot="1" noChangeAspect="1" noMove="1" noResize="1" noEditPoints="1" noAdjustHandles="1" noChangeArrowheads="1" noChangeShapeType="1" noTextEdit="1"/>
-              </p:cNvSpPr>
-              <p:nvPr/>
-            </p:nvSpPr>
-            <p:spPr>
-              <a:xfrm>
-                <a:off x="407987" y="1052513"/>
-                <a:ext cx="11376025" cy="3063211"/>
-              </a:xfrm>
-              <a:prstGeom prst="rect">
-                <a:avLst/>
-              </a:prstGeom>
-              <a:blipFill>
-                <a:blip r:embed="rId2"/>
-                <a:stretch>
-                  <a:fillRect l="-965"/>
-                </a:stretch>
-              </a:blipFill>
-            </p:spPr>
-            <p:txBody>
-              <a:bodyPr/>
-              <a:lstStyle/>
-              <a:p>
-                <a:r>
-                  <a:rPr lang="zh-CN" altLang="en-US">
-                    <a:noFill/>
-                  </a:rPr>
-                  <a:t> </a:t>
-                </a:r>
-              </a:p>
-            </p:txBody>
-          </p:sp>
-        </mc:Fallback>
-      </mc:AlternateContent>
+      <p:sp>
+        <p:nvSpPr>
+          <p:cNvPr id="3" name="矩形 2"/>
+          <p:cNvSpPr/>
+          <p:nvPr/>
+        </p:nvSpPr>
+        <p:spPr>
+          <a:xfrm>
+            <a:off x="407987" y="1052513"/>
+            <a:ext cx="11376025" cy="3063211"/>
+          </a:xfrm>
+          <a:prstGeom prst="rect">
+            <a:avLst/>
+          </a:prstGeom>
+        </p:spPr>
+        <p:txBody>
+          <a:bodyPr wrap="square">
+            <a:spAutoFit/>
+          </a:bodyPr>
+          <a:lstStyle/>
+          <a:p>
+            <a:pPr marL="342900" indent="-342900" fontAlgn="auto">
+              <a:lnSpc>
+                <a:spcPct val="150000"/>
+              </a:lnSpc>
+              <a:spcAft>
+                <a:spcPts val="0"/>
+              </a:spcAft>
+              <a:buFont typeface="Arial" panose="020B0604020202020204" pitchFamily="34" charset="0"/>
+              <a:buChar char="•"/>
+            </a:pPr>
+            <a:r>
+              <a:rPr lang="zh-CN" altLang="en-US" sz="2800" b="1" dirty="0">
+                <a:latin typeface="Times New Roman" panose="02020603050405020304" pitchFamily="18" charset="0"/>
+                <a:ea typeface="微软雅黑" panose="020B0503020204020204" pitchFamily="34" charset="-122"/>
+                <a:cs typeface="Times New Roman" panose="02020603050405020304" pitchFamily="18" charset="0"/>
+                <a:sym typeface="+mn-ea"/>
+              </a:rPr>
+              <a:t>恒星时</a:t>
+            </a:r>
+            <a:r>
+              <a:rPr lang="zh-CN" altLang="en-US" sz="2800" dirty="0">
+                <a:latin typeface="Times New Roman" panose="02020603050405020304" pitchFamily="18" charset="0"/>
+                <a:ea typeface="微软雅黑" panose="020B0503020204020204" pitchFamily="34" charset="-122"/>
+                <a:cs typeface="Times New Roman" panose="02020603050405020304" pitchFamily="18" charset="0"/>
+                <a:sym typeface="+mn-ea"/>
+              </a:rPr>
+              <a:t> </a:t>
+            </a:r>
+            <a:r>
+              <a:rPr lang="en-US" altLang="zh-CN" sz="2800" i="1" dirty="0">
+                <a:latin typeface="Times New Roman" panose="02020603050405020304" pitchFamily="18" charset="0"/>
+                <a:ea typeface="微软雅黑" panose="020B0503020204020204" pitchFamily="34" charset="-122"/>
+                <a:cs typeface="Times New Roman" panose="02020603050405020304" pitchFamily="18" charset="0"/>
+                <a:sym typeface="+mn-ea"/>
+              </a:rPr>
+              <a:t>S</a:t>
+            </a:r>
+          </a:p>
+          <a:p>
+            <a:pPr marL="800100" lvl="1" indent="-342900">
+              <a:lnSpc>
+                <a:spcPct val="150000"/>
+              </a:lnSpc>
+              <a:buFont typeface="Arial" panose="020B0604020202020204" pitchFamily="34" charset="0"/>
+              <a:buChar char="•"/>
+            </a:pPr>
+            <a:r>
+              <a:rPr lang="zh-CN" altLang="en-US" sz="2400" b="1" dirty="0">
+                <a:solidFill>
+                  <a:schemeClr val="tx1"/>
+                </a:solidFill>
+                <a:latin typeface="Times New Roman" panose="02020603050405020304" pitchFamily="18" charset="0"/>
+                <a:ea typeface="微软雅黑" panose="020B0503020204020204" pitchFamily="34" charset="-122"/>
+                <a:cs typeface="Times New Roman" panose="02020603050405020304" pitchFamily="18" charset="0"/>
+                <a:sym typeface="+mn-ea"/>
+              </a:rPr>
+              <a:t>起量点：春分点的上中天时刻</a:t>
+            </a:r>
+            <a:endParaRPr lang="en-US" altLang="zh-CN" sz="2400" b="1" dirty="0">
+              <a:solidFill>
+                <a:schemeClr val="tx1"/>
+              </a:solidFill>
+              <a:latin typeface="Times New Roman" panose="02020603050405020304" pitchFamily="18" charset="0"/>
+              <a:ea typeface="微软雅黑" panose="020B0503020204020204" pitchFamily="34" charset="-122"/>
+              <a:cs typeface="Times New Roman" panose="02020603050405020304" pitchFamily="18" charset="0"/>
+              <a:sym typeface="+mn-ea"/>
+            </a:endParaRPr>
+          </a:p>
+          <a:p>
+            <a:pPr marL="800100" lvl="1" indent="-342900">
+              <a:lnSpc>
+                <a:spcPct val="150000"/>
+              </a:lnSpc>
+              <a:buFont typeface="Arial" panose="020B0604020202020204" pitchFamily="34" charset="0"/>
+              <a:buChar char="•"/>
+            </a:pPr>
+            <a:r>
+              <a:rPr lang="zh-CN" altLang="en-US" sz="2400" b="1" dirty="0">
+                <a:solidFill>
+                  <a:schemeClr val="tx1"/>
+                </a:solidFill>
+                <a:latin typeface="Times New Roman" panose="02020603050405020304" pitchFamily="18" charset="0"/>
+                <a:ea typeface="微软雅黑" panose="020B0503020204020204" pitchFamily="34" charset="-122"/>
+                <a:cs typeface="Times New Roman" panose="02020603050405020304" pitchFamily="18" charset="0"/>
+                <a:sym typeface="+mn-ea"/>
+              </a:rPr>
+              <a:t>度量：春分点的时角</a:t>
+            </a:r>
+            <a:endParaRPr lang="en-US" altLang="zh-CN" sz="2800" b="1" baseline="-25000" dirty="0">
+              <a:solidFill>
+                <a:schemeClr val="tx1"/>
+              </a:solidFill>
+              <a:latin typeface="Times New Roman" panose="02020603050405020304" pitchFamily="18" charset="0"/>
+              <a:ea typeface="微软雅黑" panose="020B0503020204020204" pitchFamily="34" charset="-122"/>
+              <a:cs typeface="Times New Roman" panose="02020603050405020304" pitchFamily="18" charset="0"/>
+              <a:sym typeface="+mn-ea"/>
+            </a:endParaRPr>
+          </a:p>
+          <a:p>
+            <a:pPr marL="342900" indent="-342900" fontAlgn="auto">
+              <a:lnSpc>
+                <a:spcPct val="150000"/>
+              </a:lnSpc>
+              <a:spcAft>
+                <a:spcPts val="0"/>
+              </a:spcAft>
+              <a:buFont typeface="Arial" panose="020B0604020202020204" pitchFamily="34" charset="0"/>
+              <a:buChar char="•"/>
+            </a:pPr>
+            <a:endParaRPr lang="en-US" altLang="zh-CN" sz="2800" b="1" dirty="0">
+              <a:latin typeface="Times New Roman" panose="02020603050405020304" pitchFamily="18" charset="0"/>
+              <a:ea typeface="微软雅黑" panose="020B0503020204020204" pitchFamily="34" charset="-122"/>
+              <a:cs typeface="Times New Roman" panose="02020603050405020304" pitchFamily="18" charset="0"/>
+              <a:sym typeface="+mn-ea"/>
+            </a:endParaRPr>
+          </a:p>
+          <a:p>
+            <a:pPr marL="342900" indent="-342900" fontAlgn="auto">
+              <a:lnSpc>
+                <a:spcPct val="150000"/>
+              </a:lnSpc>
+              <a:spcAft>
+                <a:spcPts val="0"/>
+              </a:spcAft>
+              <a:buFont typeface="Arial" panose="020B0604020202020204" pitchFamily="34" charset="0"/>
+              <a:buChar char="•"/>
+            </a:pPr>
+            <a:endParaRPr lang="en-US" altLang="zh-CN" sz="2800" b="1" dirty="0">
+              <a:solidFill>
+                <a:schemeClr val="tx1"/>
+              </a:solidFill>
+              <a:latin typeface="Times New Roman" panose="02020603050405020304" pitchFamily="18" charset="0"/>
+              <a:ea typeface="微软雅黑" panose="020B0503020204020204" pitchFamily="34" charset="-122"/>
+              <a:cs typeface="Times New Roman" panose="02020603050405020304" pitchFamily="18" charset="0"/>
+              <a:sym typeface="+mn-ea"/>
+            </a:endParaRPr>
+          </a:p>
+        </p:txBody>
+      </p:sp>
       <p:sp>
         <p:nvSpPr>
           <p:cNvPr id="5" name="灯片编号占位符 4"/>
@@ -9094,7 +9202,7 @@
           <p:nvPr/>
         </p:nvPicPr>
         <p:blipFill>
-          <a:blip r:embed="rId3"/>
+          <a:blip r:embed="rId2"/>
           <a:stretch>
             <a:fillRect/>
           </a:stretch>
@@ -9303,194 +9411,6 @@
           </a:prstGeom>
         </p:spPr>
       </p:pic>
-      <mc:AlternateContent xmlns:mc="http://schemas.openxmlformats.org/markup-compatibility/2006" xmlns:a14="http://schemas.microsoft.com/office/drawing/2010/main">
-        <mc:Choice Requires="a14">
-          <p:sp>
-            <p:nvSpPr>
-              <p:cNvPr id="8" name="文本框 7">
-                <a:extLst>
-                  <a:ext uri="{FF2B5EF4-FFF2-40B4-BE49-F238E27FC236}">
-                    <a16:creationId xmlns:a16="http://schemas.microsoft.com/office/drawing/2014/main" id="{BBA5C3A6-B980-B258-BE62-EBF4EE9C173A}"/>
-                  </a:ext>
-                </a:extLst>
-              </p:cNvPr>
-              <p:cNvSpPr txBox="1"/>
-              <p:nvPr/>
-            </p:nvSpPr>
-            <p:spPr>
-              <a:xfrm>
-                <a:off x="1789370" y="5823896"/>
-                <a:ext cx="3186770" cy="369332"/>
-              </a:xfrm>
-              <a:prstGeom prst="rect">
-                <a:avLst/>
-              </a:prstGeom>
-              <a:noFill/>
-            </p:spPr>
-            <p:txBody>
-              <a:bodyPr wrap="none" lIns="0" tIns="0" rIns="0" bIns="0" rtlCol="0">
-                <a:spAutoFit/>
-              </a:bodyPr>
-              <a:lstStyle/>
-              <a:p>
-                <a14:m>
-                  <m:oMath xmlns:m="http://schemas.openxmlformats.org/officeDocument/2006/math">
-                    <m:r>
-                      <a:rPr lang="en-US" altLang="zh-CN" sz="2400" b="0" i="1" smtClean="0">
-                        <a:latin typeface="Cambria Math" panose="02040503050406030204" pitchFamily="18" charset="0"/>
-                      </a:rPr>
-                      <m:t>𝑆</m:t>
-                    </m:r>
-                    <m:r>
-                      <a:rPr lang="en-GB" altLang="zh-CN" sz="2400" i="1" smtClean="0">
-                        <a:latin typeface="Cambria Math" panose="02040503050406030204" pitchFamily="18" charset="0"/>
-                      </a:rPr>
-                      <m:t>=</m:t>
-                    </m:r>
-                    <m:sSub>
-                      <m:sSubPr>
-                        <m:ctrlPr>
-                          <a:rPr lang="en-GB" altLang="zh-CN" sz="2400" i="1" smtClean="0">
-                            <a:latin typeface="Cambria Math" panose="02040503050406030204" pitchFamily="18" charset="0"/>
-                          </a:rPr>
-                        </m:ctrlPr>
-                      </m:sSubPr>
-                      <m:e>
-                        <m:r>
-                          <a:rPr lang="en-US" altLang="zh-CN" sz="2400" i="1">
-                            <a:latin typeface="Cambria Math" panose="02040503050406030204" pitchFamily="18" charset="0"/>
-                          </a:rPr>
-                          <m:t>𝑡</m:t>
-                        </m:r>
-                      </m:e>
-                      <m:sub>
-                        <m:r>
-                          <m:rPr>
-                            <m:sty m:val="p"/>
-                          </m:rPr>
-                          <a:rPr lang="en-US" altLang="zh-CN" sz="2400" dirty="0">
-                            <a:latin typeface="Cambria Math" panose="02040503050406030204" pitchFamily="18" charset="0"/>
-                          </a:rPr>
-                          <m:t>ϒ</m:t>
-                        </m:r>
-                      </m:sub>
-                    </m:sSub>
-                    <m:r>
-                      <a:rPr lang="en-US" altLang="zh-CN" sz="2400" b="0" i="1" smtClean="0">
-                        <a:latin typeface="Cambria Math" panose="02040503050406030204" pitchFamily="18" charset="0"/>
-                      </a:rPr>
-                      <m:t>=</m:t>
-                    </m:r>
-                    <m:r>
-                      <a:rPr lang="en-US" altLang="zh-CN" sz="2400" b="0" i="1" smtClean="0">
-                        <a:latin typeface="Cambria Math" panose="02040503050406030204" pitchFamily="18" charset="0"/>
-                      </a:rPr>
-                      <m:t>𝑡</m:t>
-                    </m:r>
-                    <m:r>
-                      <a:rPr lang="en-US" altLang="zh-CN" sz="2400" b="0" i="1" smtClean="0">
-                        <a:latin typeface="Cambria Math" panose="02040503050406030204" pitchFamily="18" charset="0"/>
-                      </a:rPr>
-                      <m:t>+</m:t>
-                    </m:r>
-                    <m:r>
-                      <m:rPr>
-                        <m:sty m:val="p"/>
-                      </m:rPr>
-                      <a:rPr lang="el-GR" altLang="zh-CN" sz="2400" i="1" dirty="0">
-                        <a:latin typeface="Cambria Math" panose="02040503050406030204" pitchFamily="18" charset="0"/>
-                      </a:rPr>
-                      <m:t>α</m:t>
-                    </m:r>
-                    <m:r>
-                      <a:rPr lang="en-US" altLang="zh-CN" sz="2400" i="1">
-                        <a:latin typeface="Cambria Math" panose="02040503050406030204" pitchFamily="18" charset="0"/>
-                      </a:rPr>
-                      <m:t>=</m:t>
-                    </m:r>
-                    <m:r>
-                      <a:rPr lang="en-US" altLang="zh-CN" sz="2400" b="0" i="1" smtClean="0">
-                        <a:latin typeface="Cambria Math" panose="02040503050406030204" pitchFamily="18" charset="0"/>
-                      </a:rPr>
-                      <m:t>𝑆</m:t>
-                    </m:r>
-                    <m:r>
-                      <m:rPr>
-                        <m:sty m:val="p"/>
-                      </m:rPr>
-                      <a:rPr lang="en-US" altLang="zh-CN" sz="2400" b="0" i="0" baseline="-25000" smtClean="0">
-                        <a:latin typeface="Cambria Math" panose="02040503050406030204" pitchFamily="18" charset="0"/>
-                      </a:rPr>
-                      <m:t>G</m:t>
-                    </m:r>
-                    <m:r>
-                      <a:rPr lang="en-US" altLang="zh-CN" sz="2400" i="1">
-                        <a:latin typeface="Cambria Math" panose="02040503050406030204" pitchFamily="18" charset="0"/>
-                      </a:rPr>
-                      <m:t>+</m:t>
-                    </m:r>
-                    <m:r>
-                      <a:rPr lang="en-US" altLang="zh-CN" sz="2400" b="0" i="1" smtClean="0">
-                        <a:latin typeface="Cambria Math" panose="02040503050406030204" pitchFamily="18" charset="0"/>
-                      </a:rPr>
-                      <m:t> </m:t>
-                    </m:r>
-                  </m:oMath>
-                </a14:m>
-                <a:r>
-                  <a:rPr lang="en-US" altLang="zh-CN" sz="2400" i="1" dirty="0"/>
-                  <a:t>λ</a:t>
-                </a:r>
-                <a:endParaRPr lang="zh-CN" altLang="en-US" sz="2400" i="1" dirty="0"/>
-              </a:p>
-            </p:txBody>
-          </p:sp>
-        </mc:Choice>
-        <mc:Fallback xmlns="">
-          <p:sp>
-            <p:nvSpPr>
-              <p:cNvPr id="8" name="文本框 7">
-                <a:extLst>
-                  <a:ext uri="{FF2B5EF4-FFF2-40B4-BE49-F238E27FC236}">
-                    <a16:creationId xmlns:a16="http://schemas.microsoft.com/office/drawing/2014/main" id="{BBA5C3A6-B980-B258-BE62-EBF4EE9C173A}"/>
-                  </a:ext>
-                </a:extLst>
-              </p:cNvPr>
-              <p:cNvSpPr txBox="1">
-                <a:spLocks noRot="1" noChangeAspect="1" noMove="1" noResize="1" noEditPoints="1" noAdjustHandles="1" noChangeArrowheads="1" noChangeShapeType="1" noTextEdit="1"/>
-              </p:cNvSpPr>
-              <p:nvPr/>
-            </p:nvSpPr>
-            <p:spPr>
-              <a:xfrm>
-                <a:off x="1789370" y="5823896"/>
-                <a:ext cx="3186770" cy="369332"/>
-              </a:xfrm>
-              <a:prstGeom prst="rect">
-                <a:avLst/>
-              </a:prstGeom>
-              <a:blipFill>
-                <a:blip r:embed="rId6"/>
-                <a:stretch>
-                  <a:fillRect l="-3448" t="-24590" r="-2299" b="-49180"/>
-                </a:stretch>
-              </a:blipFill>
-            </p:spPr>
-            <p:txBody>
-              <a:bodyPr/>
-              <a:lstStyle/>
-              <a:p>
-                <a:r>
-                  <a:rPr lang="zh-CN" altLang="en-US">
-                    <a:noFill/>
-                  </a:rPr>
-                  <a:t> </a:t>
-                </a:r>
-              </a:p>
-            </p:txBody>
-          </p:sp>
-        </mc:Fallback>
-      </mc:AlternateContent>
       <p:sp>
         <p:nvSpPr>
           <p:cNvPr id="9" name="矩形 8">
@@ -9785,10 +9705,10 @@
           <p:nvPr/>
         </p:nvPicPr>
         <p:blipFill>
-          <a:blip r:embed="rId7">
+          <a:blip r:embed="rId6">
             <a:extLst>
               <a:ext uri="{96DAC541-7B7A-43D3-8B79-37D633B846F1}">
-                <asvg:svgBlip xmlns:asvg="http://schemas.microsoft.com/office/drawing/2016/SVG/main" r:embed="rId8"/>
+                <asvg:svgBlip xmlns:asvg="http://schemas.microsoft.com/office/drawing/2016/SVG/main" r:embed="rId7"/>
               </a:ext>
             </a:extLst>
           </a:blip>
@@ -9806,6 +9726,138 @@
           </a:prstGeom>
         </p:spPr>
       </p:pic>
+      <p:graphicFrame>
+        <p:nvGraphicFramePr>
+          <p:cNvPr id="11" name="对象 10">
+            <a:extLst>
+              <a:ext uri="{FF2B5EF4-FFF2-40B4-BE49-F238E27FC236}">
+                <a16:creationId xmlns:a16="http://schemas.microsoft.com/office/drawing/2014/main" id="{956210FE-DFF3-215F-14BB-A24A1A465A28}"/>
+              </a:ext>
+            </a:extLst>
+          </p:cNvPr>
+          <p:cNvGraphicFramePr>
+            <a:graphicFrameLocks noChangeAspect="1"/>
+          </p:cNvGraphicFramePr>
+          <p:nvPr>
+            <p:extLst>
+              <p:ext uri="{D42A27DB-BD31-4B8C-83A1-F6EECF244321}">
+                <p14:modId xmlns:p14="http://schemas.microsoft.com/office/powerpoint/2010/main" val="3517822705"/>
+              </p:ext>
+            </p:extLst>
+          </p:nvPr>
+        </p:nvGraphicFramePr>
+        <p:xfrm>
+          <a:off x="1945550" y="5842110"/>
+          <a:ext cx="2827924" cy="401124"/>
+        </p:xfrm>
+        <a:graphic>
+          <a:graphicData uri="http://schemas.openxmlformats.org/presentationml/2006/ole">
+            <mc:AlternateContent xmlns:mc="http://schemas.openxmlformats.org/markup-compatibility/2006">
+              <mc:Choice xmlns:v="urn:schemas-microsoft-com:vml" Requires="v">
+                <p:oleObj name="AxMath" r:id="rId8" imgW="1342800" imgH="190440" progId="Equation.AxMath">
+                  <p:embed/>
+                </p:oleObj>
+              </mc:Choice>
+              <mc:Fallback>
+                <p:oleObj name="AxMath" r:id="rId8" imgW="1342800" imgH="190440" progId="Equation.AxMath">
+                  <p:embed/>
+                  <p:pic>
+                    <p:nvPicPr>
+                      <p:cNvPr id="0" name=""/>
+                      <p:cNvPicPr/>
+                      <p:nvPr/>
+                    </p:nvPicPr>
+                    <p:blipFill>
+                      <a:blip r:embed="rId9"/>
+                      <a:stretch>
+                        <a:fillRect/>
+                      </a:stretch>
+                    </p:blipFill>
+                    <p:spPr>
+                      <a:xfrm>
+                        <a:off x="1945550" y="5842110"/>
+                        <a:ext cx="2827924" cy="401124"/>
+                      </a:xfrm>
+                      <a:prstGeom prst="rect">
+                        <a:avLst/>
+                      </a:prstGeom>
+                    </p:spPr>
+                  </p:pic>
+                </p:oleObj>
+              </mc:Fallback>
+            </mc:AlternateContent>
+          </a:graphicData>
+        </a:graphic>
+      </p:graphicFrame>
+      <p:graphicFrame>
+        <p:nvGraphicFramePr>
+          <p:cNvPr id="14" name="对象 13">
+            <a:extLst>
+              <a:ext uri="{FF2B5EF4-FFF2-40B4-BE49-F238E27FC236}">
+                <a16:creationId xmlns:a16="http://schemas.microsoft.com/office/drawing/2014/main" id="{5C640AD9-A79B-A67D-0A1F-D76C644936B2}"/>
+              </a:ext>
+            </a:extLst>
+          </p:cNvPr>
+          <p:cNvGraphicFramePr>
+            <a:graphicFrameLocks noChangeAspect="1"/>
+          </p:cNvGraphicFramePr>
+          <p:nvPr>
+            <p:extLst>
+              <p:ext uri="{D42A27DB-BD31-4B8C-83A1-F6EECF244321}">
+                <p14:modId xmlns:p14="http://schemas.microsoft.com/office/powerpoint/2010/main" val="3267803859"/>
+              </p:ext>
+            </p:extLst>
+          </p:nvPr>
+        </p:nvGraphicFramePr>
+        <p:xfrm>
+          <a:off x="4127735" y="2437586"/>
+          <a:ext cx="284162" cy="401638"/>
+        </p:xfrm>
+        <a:graphic>
+          <a:graphicData uri="http://schemas.openxmlformats.org/presentationml/2006/ole">
+            <mc:AlternateContent xmlns:mc="http://schemas.openxmlformats.org/markup-compatibility/2006">
+              <mc:Choice xmlns:v="urn:schemas-microsoft-com:vml" Requires="v">
+                <p:oleObj name="AxMath" r:id="rId10" imgW="135360" imgH="190440" progId="Equation.AxMath">
+                  <p:embed/>
+                </p:oleObj>
+              </mc:Choice>
+              <mc:Fallback>
+                <p:oleObj name="AxMath" r:id="rId10" imgW="135360" imgH="190440" progId="Equation.AxMath">
+                  <p:embed/>
+                  <p:pic>
+                    <p:nvPicPr>
+                      <p:cNvPr id="11" name="对象 10">
+                        <a:extLst>
+                          <a:ext uri="{FF2B5EF4-FFF2-40B4-BE49-F238E27FC236}">
+                            <a16:creationId xmlns:a16="http://schemas.microsoft.com/office/drawing/2014/main" id="{956210FE-DFF3-215F-14BB-A24A1A465A28}"/>
+                          </a:ext>
+                        </a:extLst>
+                      </p:cNvPr>
+                      <p:cNvPicPr/>
+                      <p:nvPr/>
+                    </p:nvPicPr>
+                    <p:blipFill>
+                      <a:blip r:embed="rId11"/>
+                      <a:stretch>
+                        <a:fillRect/>
+                      </a:stretch>
+                    </p:blipFill>
+                    <p:spPr>
+                      <a:xfrm>
+                        <a:off x="4127735" y="2437586"/>
+                        <a:ext cx="284162" cy="401638"/>
+                      </a:xfrm>
+                      <a:prstGeom prst="rect">
+                        <a:avLst/>
+                      </a:prstGeom>
+                    </p:spPr>
+                  </p:pic>
+                </p:oleObj>
+              </mc:Fallback>
+            </mc:AlternateContent>
+          </a:graphicData>
+        </a:graphic>
+      </p:graphicFrame>
     </p:spTree>
     <p:extLst>
       <p:ext uri="{BB962C8B-B14F-4D97-AF65-F5344CB8AC3E}">
@@ -9816,13 +9868,13 @@
   <p:clrMapOvr>
     <a:masterClrMapping/>
   </p:clrMapOvr>
-  <mc:AlternateContent xmlns:mc="http://schemas.openxmlformats.org/markup-compatibility/2006">
-    <mc:Choice xmlns:p159="http://schemas.microsoft.com/office/powerpoint/2015/09/main" Requires="p159">
+  <mc:AlternateContent xmlns:mc="http://schemas.openxmlformats.org/markup-compatibility/2006" xmlns:p159="http://schemas.microsoft.com/office/powerpoint/2015/09/main">
+    <mc:Choice Requires="p159">
       <p:transition spd="slow">
         <p159:morph option="byObject"/>
       </p:transition>
     </mc:Choice>
-    <mc:Fallback>
+    <mc:Fallback xmlns="">
       <p:transition spd="slow">
         <p:fade/>
       </p:transition>
@@ -9857,7 +9909,7 @@
         <p:spPr>
           <a:xfrm>
             <a:off x="407987" y="921884"/>
-            <a:ext cx="11376025" cy="5417893"/>
+            <a:ext cx="11376025" cy="5630003"/>
           </a:xfrm>
           <a:prstGeom prst="rect">
             <a:avLst/>
@@ -10212,7 +10264,15 @@
                 <a:ea typeface="微软雅黑" panose="020B0503020204020204" pitchFamily="34" charset="-122"/>
                 <a:sym typeface="+mn-ea"/>
               </a:rPr>
-              <a:t>平太阳时从下中天时刻起算，连续两次下中天的间隔为一个平太阳日</a:t>
+              <a:t>平太阳时从下中天时刻起算，连续两次下中天的间隔为一个</a:t>
+            </a:r>
+            <a:r>
+              <a:rPr lang="zh-CN" altLang="en-US" sz="2000" b="1" dirty="0">
+                <a:latin typeface="微软雅黑" panose="020B0503020204020204" pitchFamily="34" charset="-122"/>
+                <a:ea typeface="微软雅黑" panose="020B0503020204020204" pitchFamily="34" charset="-122"/>
+                <a:sym typeface="+mn-ea"/>
+              </a:rPr>
+              <a:t>平太阳日</a:t>
             </a:r>
             <a:endParaRPr lang="en-US" altLang="zh-CN" sz="2000" b="1" dirty="0">
               <a:solidFill>
@@ -10335,8 +10395,8 @@
           </a:p>
         </p:txBody>
       </p:sp>
-      <mc:AlternateContent xmlns:mc="http://schemas.openxmlformats.org/markup-compatibility/2006" xmlns:a14="http://schemas.microsoft.com/office/drawing/2010/main">
-        <mc:Choice Requires="a14">
+      <mc:AlternateContent xmlns:mc="http://schemas.openxmlformats.org/markup-compatibility/2006">
+        <mc:Choice xmlns:a14="http://schemas.microsoft.com/office/drawing/2010/main" Requires="a14">
           <p:sp>
             <p:nvSpPr>
               <p:cNvPr id="2" name="文本框 1">
@@ -10366,28 +10426,21 @@
               <a:lstStyle/>
               <a:p>
                 <a:pPr algn="ctr"/>
+                <a:r>
+                  <a:rPr lang="zh-CN" altLang="en-US" sz="2000" b="1" dirty="0">
+                    <a:solidFill>
+                      <a:srgbClr val="0000FF"/>
+                    </a:solidFill>
+                    <a:latin typeface="微软雅黑" panose="020B0503020204020204" pitchFamily="34" charset="-122"/>
+                    <a:ea typeface="微软雅黑" panose="020B0503020204020204" pitchFamily="34" charset="-122"/>
+                    <a:sym typeface="+mn-ea"/>
+                  </a:rPr>
+                  <a:t>𝟏 恒星日</a:t>
+                </a:r>
                 <a14:m>
                   <m:oMath xmlns:m="http://schemas.openxmlformats.org/officeDocument/2006/math">
                     <m:r>
-                      <a:rPr lang="en-US" altLang="zh-CN" sz="2000" b="1" i="1" smtClean="0">
-                        <a:solidFill>
-                          <a:srgbClr val="0000FF"/>
-                        </a:solidFill>
-                        <a:latin typeface="Cambria Math" panose="02040503050406030204" pitchFamily="18" charset="0"/>
-                      </a:rPr>
-                      <m:t>𝟏</m:t>
-                    </m:r>
-                    <m:r>
                       <a:rPr lang="zh-CN" altLang="en-US" sz="2000" b="1" i="1">
-                        <a:solidFill>
-                          <a:srgbClr val="0000FF"/>
-                        </a:solidFill>
-                        <a:latin typeface="Cambria Math" panose="02040503050406030204" pitchFamily="18" charset="0"/>
-                      </a:rPr>
-                      <m:t>恒星日</m:t>
-                    </m:r>
-                    <m:r>
-                      <a:rPr lang="zh-CN" altLang="en-US" sz="2000" b="1" i="1" smtClean="0">
                         <a:solidFill>
                           <a:srgbClr val="0000FF"/>
                         </a:solidFill>
@@ -10398,7 +10451,7 @@
                     <m:f>
                       <m:fPr>
                         <m:ctrlPr>
-                          <a:rPr lang="en-US" altLang="zh-CN" sz="2000" b="1" i="1" smtClean="0">
+                          <a:rPr lang="en-US" altLang="zh-CN" sz="2000" b="1" i="1">
                             <a:solidFill>
                               <a:srgbClr val="0000FF"/>
                             </a:solidFill>
@@ -10408,7 +10461,7 @@
                       </m:fPr>
                       <m:num>
                         <m:r>
-                          <a:rPr lang="en-US" altLang="zh-CN" sz="2000" b="1" i="1" smtClean="0">
+                          <a:rPr lang="en-US" altLang="zh-CN" sz="2000" b="1" i="1">
                             <a:solidFill>
                               <a:srgbClr val="0000FF"/>
                             </a:solidFill>
@@ -10417,7 +10470,7 @@
                           <m:t>𝟑𝟔𝟓</m:t>
                         </m:r>
                         <m:r>
-                          <a:rPr lang="en-US" altLang="zh-CN" sz="2000" b="1" i="1" smtClean="0">
+                          <a:rPr lang="en-US" altLang="zh-CN" sz="2000" b="1" i="1">
                             <a:solidFill>
                               <a:srgbClr val="0000FF"/>
                             </a:solidFill>
@@ -10426,7 +10479,7 @@
                           <m:t>.</m:t>
                         </m:r>
                         <m:r>
-                          <a:rPr lang="en-US" altLang="zh-CN" sz="2000" b="1" i="1" smtClean="0">
+                          <a:rPr lang="en-US" altLang="zh-CN" sz="2000" b="1" i="1">
                             <a:solidFill>
                               <a:srgbClr val="0000FF"/>
                             </a:solidFill>
@@ -10437,7 +10490,7 @@
                       </m:num>
                       <m:den>
                         <m:r>
-                          <a:rPr lang="en-US" altLang="zh-CN" sz="2000" b="1" i="1" smtClean="0">
+                          <a:rPr lang="en-US" altLang="zh-CN" sz="2000" b="1" i="1">
                             <a:solidFill>
                               <a:srgbClr val="0000FF"/>
                             </a:solidFill>
@@ -10446,7 +10499,7 @@
                           <m:t>𝟑𝟔𝟔</m:t>
                         </m:r>
                         <m:r>
-                          <a:rPr lang="en-US" altLang="zh-CN" sz="2000" b="1" i="1" smtClean="0">
+                          <a:rPr lang="en-US" altLang="zh-CN" sz="2000" b="1" i="1">
                             <a:solidFill>
                               <a:srgbClr val="0000FF"/>
                             </a:solidFill>
@@ -10455,7 +10508,7 @@
                           <m:t>.</m:t>
                         </m:r>
                         <m:r>
-                          <a:rPr lang="en-US" altLang="zh-CN" sz="2000" b="1" i="1" smtClean="0">
+                          <a:rPr lang="en-US" altLang="zh-CN" sz="2000" b="1" i="1">
                             <a:solidFill>
                               <a:srgbClr val="0000FF"/>
                             </a:solidFill>
@@ -10472,6 +10525,8 @@
                     <a:solidFill>
                       <a:srgbClr val="0000FF"/>
                     </a:solidFill>
+                    <a:latin typeface="微软雅黑" panose="020B0503020204020204" pitchFamily="34" charset="-122"/>
+                    <a:ea typeface="微软雅黑" panose="020B0503020204020204" pitchFamily="34" charset="-122"/>
                   </a:rPr>
                   <a:t> 平太阳日</a:t>
                 </a:r>
@@ -10479,7 +10534,7 @@
             </p:txBody>
           </p:sp>
         </mc:Choice>
-        <mc:Fallback xmlns="">
+        <mc:Fallback>
           <p:sp>
             <p:nvSpPr>
               <p:cNvPr id="2" name="文本框 1">
@@ -10505,7 +10560,7 @@
               <a:blipFill>
                 <a:blip r:embed="rId2"/>
                 <a:stretch>
-                  <a:fillRect b="-20548"/>
+                  <a:fillRect t="-2740" b="-19178"/>
                 </a:stretch>
               </a:blipFill>
             </p:spPr>
@@ -10570,13 +10625,13 @@
   <p:clrMapOvr>
     <a:masterClrMapping/>
   </p:clrMapOvr>
-  <mc:AlternateContent xmlns:mc="http://schemas.openxmlformats.org/markup-compatibility/2006">
-    <mc:Choice xmlns:p159="http://schemas.microsoft.com/office/powerpoint/2015/09/main" Requires="p159">
+  <mc:AlternateContent xmlns:mc="http://schemas.openxmlformats.org/markup-compatibility/2006" xmlns:p159="http://schemas.microsoft.com/office/powerpoint/2015/09/main">
+    <mc:Choice Requires="p159">
       <p:transition spd="slow">
         <p159:morph option="byObject"/>
       </p:transition>
     </mc:Choice>
-    <mc:Fallback>
+    <mc:Fallback xmlns="">
       <p:transition spd="slow">
         <p:fade/>
       </p:transition>
@@ -11245,13 +11300,13 @@
   <p:clrMapOvr>
     <a:masterClrMapping/>
   </p:clrMapOvr>
-  <mc:AlternateContent xmlns:mc="http://schemas.openxmlformats.org/markup-compatibility/2006">
-    <mc:Choice xmlns:p159="http://schemas.microsoft.com/office/powerpoint/2015/09/main" Requires="p159">
+  <mc:AlternateContent xmlns:mc="http://schemas.openxmlformats.org/markup-compatibility/2006" xmlns:p159="http://schemas.microsoft.com/office/powerpoint/2015/09/main">
+    <mc:Choice Requires="p159">
       <p:transition spd="slow">
         <p159:morph option="byObject"/>
       </p:transition>
     </mc:Choice>
-    <mc:Fallback>
+    <mc:Fallback xmlns="">
       <p:transition spd="slow">
         <p:fade/>
       </p:transition>
@@ -11641,13 +11696,13 @@
   <p:clrMapOvr>
     <a:masterClrMapping/>
   </p:clrMapOvr>
-  <mc:AlternateContent xmlns:mc="http://schemas.openxmlformats.org/markup-compatibility/2006">
-    <mc:Choice xmlns:p159="http://schemas.microsoft.com/office/powerpoint/2015/09/main" Requires="p159">
+  <mc:AlternateContent xmlns:mc="http://schemas.openxmlformats.org/markup-compatibility/2006" xmlns:p159="http://schemas.microsoft.com/office/powerpoint/2015/09/main">
+    <mc:Choice Requires="p159">
       <p:transition spd="slow">
         <p159:morph option="byObject"/>
       </p:transition>
     </mc:Choice>
-    <mc:Fallback>
+    <mc:Fallback xmlns="">
       <p:transition spd="slow">
         <p:fade/>
       </p:transition>
@@ -11962,7 +12017,7 @@
               <a:t>各天文台根据测时结果计算的世界时：</a:t>
             </a:r>
             <a:r>
-              <a:rPr lang="en-US" altLang="zh-CN" sz="2800" b="1" dirty="0">
+              <a:rPr lang="en-US" altLang="zh-CN" sz="2800" dirty="0">
                 <a:solidFill>
                   <a:schemeClr val="tx1"/>
                 </a:solidFill>
@@ -12479,13 +12534,13 @@
   <p:clrMapOvr>
     <a:masterClrMapping/>
   </p:clrMapOvr>
-  <mc:AlternateContent xmlns:mc="http://schemas.openxmlformats.org/markup-compatibility/2006">
-    <mc:Choice xmlns:p159="http://schemas.microsoft.com/office/powerpoint/2015/09/main" Requires="p159">
+  <mc:AlternateContent xmlns:mc="http://schemas.openxmlformats.org/markup-compatibility/2006" xmlns:p159="http://schemas.microsoft.com/office/powerpoint/2015/09/main">
+    <mc:Choice Requires="p159">
       <p:transition spd="slow">
         <p159:morph option="byObject"/>
       </p:transition>
     </mc:Choice>
-    <mc:Fallback>
+    <mc:Fallback xmlns="">
       <p:transition spd="slow">
         <p:fade/>
       </p:transition>
@@ -13056,13 +13111,13 @@
   <p:clrMapOvr>
     <a:masterClrMapping/>
   </p:clrMapOvr>
-  <mc:AlternateContent xmlns:mc="http://schemas.openxmlformats.org/markup-compatibility/2006">
-    <mc:Choice xmlns:p159="http://schemas.microsoft.com/office/powerpoint/2015/09/main" Requires="p159">
+  <mc:AlternateContent xmlns:mc="http://schemas.openxmlformats.org/markup-compatibility/2006" xmlns:p159="http://schemas.microsoft.com/office/powerpoint/2015/09/main">
+    <mc:Choice Requires="p159">
       <p:transition spd="slow">
         <p159:morph option="byObject"/>
       </p:transition>
     </mc:Choice>
-    <mc:Fallback>
+    <mc:Fallback xmlns="">
       <p:transition spd="slow">
         <p:fade/>
       </p:transition>
@@ -13662,13 +13717,13 @@
   <p:clrMapOvr>
     <a:masterClrMapping/>
   </p:clrMapOvr>
-  <mc:AlternateContent xmlns:mc="http://schemas.openxmlformats.org/markup-compatibility/2006">
-    <mc:Choice xmlns:p159="http://schemas.microsoft.com/office/powerpoint/2015/09/main" Requires="p159">
+  <mc:AlternateContent xmlns:mc="http://schemas.openxmlformats.org/markup-compatibility/2006" xmlns:p159="http://schemas.microsoft.com/office/powerpoint/2015/09/main">
+    <mc:Choice Requires="p159">
       <p:transition spd="slow">
         <p159:morph option="byObject"/>
       </p:transition>
     </mc:Choice>
-    <mc:Fallback>
+    <mc:Fallback xmlns="">
       <p:transition spd="slow">
         <p:fade/>
       </p:transition>
@@ -14443,13 +14498,13 @@
   <p:clrMapOvr>
     <a:masterClrMapping/>
   </p:clrMapOvr>
-  <mc:AlternateContent xmlns:mc="http://schemas.openxmlformats.org/markup-compatibility/2006">
-    <mc:Choice xmlns:p159="http://schemas.microsoft.com/office/powerpoint/2015/09/main" Requires="p159">
+  <mc:AlternateContent xmlns:mc="http://schemas.openxmlformats.org/markup-compatibility/2006" xmlns:p159="http://schemas.microsoft.com/office/powerpoint/2015/09/main">
+    <mc:Choice Requires="p159">
       <p:transition spd="slow">
         <p159:morph option="byObject"/>
       </p:transition>
     </mc:Choice>
-    <mc:Fallback>
+    <mc:Fallback xmlns="">
       <p:transition spd="slow">
         <p:fade/>
       </p:transition>
@@ -15430,13 +15485,13 @@
   <p:clrMapOvr>
     <a:masterClrMapping/>
   </p:clrMapOvr>
-  <mc:AlternateContent xmlns:mc="http://schemas.openxmlformats.org/markup-compatibility/2006">
-    <mc:Choice xmlns:p159="http://schemas.microsoft.com/office/powerpoint/2015/09/main" Requires="p159">
+  <mc:AlternateContent xmlns:mc="http://schemas.openxmlformats.org/markup-compatibility/2006" xmlns:p159="http://schemas.microsoft.com/office/powerpoint/2015/09/main">
+    <mc:Choice Requires="p159">
       <p:transition spd="slow">
         <p159:morph option="byObject"/>
       </p:transition>
     </mc:Choice>
-    <mc:Fallback>
+    <mc:Fallback xmlns="">
       <p:transition spd="slow">
         <p:fade/>
       </p:transition>
@@ -15918,13 +15973,13 @@
   <p:clrMapOvr>
     <a:masterClrMapping/>
   </p:clrMapOvr>
-  <mc:AlternateContent xmlns:mc="http://schemas.openxmlformats.org/markup-compatibility/2006">
-    <mc:Choice xmlns:p159="http://schemas.microsoft.com/office/powerpoint/2015/09/main" Requires="p159">
+  <mc:AlternateContent xmlns:mc="http://schemas.openxmlformats.org/markup-compatibility/2006" xmlns:p159="http://schemas.microsoft.com/office/powerpoint/2015/09/main">
+    <mc:Choice Requires="p159">
       <p:transition spd="slow">
         <p159:morph option="byObject"/>
       </p:transition>
     </mc:Choice>
-    <mc:Fallback>
+    <mc:Fallback xmlns="">
       <p:transition spd="slow">
         <p:fade/>
       </p:transition>
@@ -16652,13 +16707,13 @@
   <p:clrMapOvr>
     <a:masterClrMapping/>
   </p:clrMapOvr>
-  <mc:AlternateContent xmlns:mc="http://schemas.openxmlformats.org/markup-compatibility/2006">
-    <mc:Choice xmlns:p159="http://schemas.microsoft.com/office/powerpoint/2015/09/main" Requires="p159">
+  <mc:AlternateContent xmlns:mc="http://schemas.openxmlformats.org/markup-compatibility/2006" xmlns:p159="http://schemas.microsoft.com/office/powerpoint/2015/09/main">
+    <mc:Choice Requires="p159">
       <p:transition spd="slow">
         <p159:morph option="byObject"/>
       </p:transition>
     </mc:Choice>
-    <mc:Fallback>
+    <mc:Fallback xmlns="">
       <p:transition spd="slow">
         <p:fade/>
       </p:transition>
@@ -17818,13 +17873,13 @@
   <p:clrMapOvr>
     <a:masterClrMapping/>
   </p:clrMapOvr>
-  <mc:AlternateContent xmlns:mc="http://schemas.openxmlformats.org/markup-compatibility/2006">
-    <mc:Choice xmlns:p159="http://schemas.microsoft.com/office/powerpoint/2015/09/main" Requires="p159">
+  <mc:AlternateContent xmlns:mc="http://schemas.openxmlformats.org/markup-compatibility/2006" xmlns:p159="http://schemas.microsoft.com/office/powerpoint/2015/09/main">
+    <mc:Choice Requires="p159">
       <p:transition spd="slow">
         <p159:morph option="byObject"/>
       </p:transition>
     </mc:Choice>
-    <mc:Fallback>
+    <mc:Fallback xmlns="">
       <p:transition spd="slow">
         <p:fade/>
       </p:transition>
@@ -18162,8 +18217,9 @@
                 <a:solidFill>
                   <a:schemeClr val="tx1"/>
                 </a:solidFill>
-                <a:latin typeface="微软雅黑" panose="020B0503020204020204" pitchFamily="34" charset="-122"/>
-                <a:ea typeface="微软雅黑" panose="020B0503020204020204" pitchFamily="34" charset="-122"/>
+                <a:latin typeface="Times New Roman" panose="02020603050405020304" pitchFamily="18" charset="0"/>
+                <a:ea typeface="微软雅黑" panose="020B0503020204020204" pitchFamily="34" charset="-122"/>
+                <a:cs typeface="Times New Roman" panose="02020603050405020304" pitchFamily="18" charset="0"/>
                 <a:sym typeface="+mn-ea"/>
               </a:rPr>
               <a:t>作不同时间系统的演化图（总成绩比例：</a:t>
@@ -18173,8 +18229,9 @@
                 <a:solidFill>
                   <a:schemeClr val="tx1"/>
                 </a:solidFill>
-                <a:latin typeface="微软雅黑" panose="020B0503020204020204" pitchFamily="34" charset="-122"/>
-                <a:ea typeface="微软雅黑" panose="020B0503020204020204" pitchFamily="34" charset="-122"/>
+                <a:latin typeface="Times New Roman" panose="02020603050405020304" pitchFamily="18" charset="0"/>
+                <a:ea typeface="微软雅黑" panose="020B0503020204020204" pitchFamily="34" charset="-122"/>
+                <a:cs typeface="Times New Roman" panose="02020603050405020304" pitchFamily="18" charset="0"/>
                 <a:sym typeface="+mn-ea"/>
               </a:rPr>
               <a:t>5%</a:t>
@@ -18184,8 +18241,9 @@
                 <a:solidFill>
                   <a:schemeClr val="tx1"/>
                 </a:solidFill>
-                <a:latin typeface="微软雅黑" panose="020B0503020204020204" pitchFamily="34" charset="-122"/>
-                <a:ea typeface="微软雅黑" panose="020B0503020204020204" pitchFamily="34" charset="-122"/>
+                <a:latin typeface="Times New Roman" panose="02020603050405020304" pitchFamily="18" charset="0"/>
+                <a:ea typeface="微软雅黑" panose="020B0503020204020204" pitchFamily="34" charset="-122"/>
+                <a:cs typeface="Times New Roman" panose="02020603050405020304" pitchFamily="18" charset="0"/>
                 <a:sym typeface="+mn-ea"/>
               </a:rPr>
               <a:t>）</a:t>
@@ -18194,8 +18252,9 @@
               <a:solidFill>
                 <a:schemeClr val="tx1"/>
               </a:solidFill>
-              <a:latin typeface="微软雅黑" panose="020B0503020204020204" pitchFamily="34" charset="-122"/>
+              <a:latin typeface="Times New Roman" panose="02020603050405020304" pitchFamily="18" charset="0"/>
               <a:ea typeface="微软雅黑" panose="020B0503020204020204" pitchFamily="34" charset="-122"/>
+              <a:cs typeface="Times New Roman" panose="02020603050405020304" pitchFamily="18" charset="0"/>
               <a:sym typeface="+mn-ea"/>
             </a:endParaRPr>
           </a:p>
@@ -18209,31 +18268,35 @@
             </a:pPr>
             <a:r>
               <a:rPr lang="zh-CN" altLang="en-US" sz="2400" b="1" dirty="0">
-                <a:latin typeface="微软雅黑" panose="020B0503020204020204" pitchFamily="34" charset="-122"/>
-                <a:ea typeface="微软雅黑" panose="020B0503020204020204" pitchFamily="34" charset="-122"/>
+                <a:latin typeface="Times New Roman" panose="02020603050405020304" pitchFamily="18" charset="0"/>
+                <a:ea typeface="微软雅黑" panose="020B0503020204020204" pitchFamily="34" charset="-122"/>
+                <a:cs typeface="Times New Roman" panose="02020603050405020304" pitchFamily="18" charset="0"/>
                 <a:sym typeface="+mn-ea"/>
               </a:rPr>
               <a:t>横坐标：</a:t>
             </a:r>
             <a:r>
               <a:rPr lang="en-US" altLang="zh-CN" sz="2400" b="1" dirty="0">
-                <a:latin typeface="微软雅黑" panose="020B0503020204020204" pitchFamily="34" charset="-122"/>
-                <a:ea typeface="微软雅黑" panose="020B0503020204020204" pitchFamily="34" charset="-122"/>
+                <a:latin typeface="Times New Roman" panose="02020603050405020304" pitchFamily="18" charset="0"/>
+                <a:ea typeface="微软雅黑" panose="020B0503020204020204" pitchFamily="34" charset="-122"/>
+                <a:cs typeface="Times New Roman" panose="02020603050405020304" pitchFamily="18" charset="0"/>
                 <a:sym typeface="+mn-ea"/>
               </a:rPr>
               <a:t>TAI</a:t>
             </a:r>
             <a:r>
               <a:rPr lang="zh-CN" altLang="en-US" sz="2400" b="1" dirty="0">
-                <a:latin typeface="微软雅黑" panose="020B0503020204020204" pitchFamily="34" charset="-122"/>
-                <a:ea typeface="微软雅黑" panose="020B0503020204020204" pitchFamily="34" charset="-122"/>
+                <a:latin typeface="Times New Roman" panose="02020603050405020304" pitchFamily="18" charset="0"/>
+                <a:ea typeface="微软雅黑" panose="020B0503020204020204" pitchFamily="34" charset="-122"/>
+                <a:cs typeface="Times New Roman" panose="02020603050405020304" pitchFamily="18" charset="0"/>
                 <a:sym typeface="+mn-ea"/>
               </a:rPr>
               <a:t>时间</a:t>
             </a:r>
             <a:endParaRPr lang="en-US" altLang="zh-CN" sz="2400" b="1" dirty="0">
-              <a:latin typeface="微软雅黑" panose="020B0503020204020204" pitchFamily="34" charset="-122"/>
+              <a:latin typeface="Times New Roman" panose="02020603050405020304" pitchFamily="18" charset="0"/>
               <a:ea typeface="微软雅黑" panose="020B0503020204020204" pitchFamily="34" charset="-122"/>
+              <a:cs typeface="Times New Roman" panose="02020603050405020304" pitchFamily="18" charset="0"/>
               <a:sym typeface="+mn-ea"/>
             </a:endParaRPr>
           </a:p>
@@ -18247,24 +18310,27 @@
             </a:pPr>
             <a:r>
               <a:rPr lang="zh-CN" altLang="en-US" sz="2400" b="1" dirty="0">
-                <a:latin typeface="微软雅黑" panose="020B0503020204020204" pitchFamily="34" charset="-122"/>
-                <a:ea typeface="微软雅黑" panose="020B0503020204020204" pitchFamily="34" charset="-122"/>
-                <a:sym typeface="+mn-ea"/>
-              </a:rPr>
-              <a:t>纵坐标：时间差</a:t>
-            </a:r>
-            <a:r>
-              <a:rPr lang="en-US" altLang="zh-CN" sz="2400" b="1" dirty="0">
-                <a:latin typeface="微软雅黑" panose="020B0503020204020204" pitchFamily="34" charset="-122"/>
-                <a:ea typeface="微软雅黑" panose="020B0503020204020204" pitchFamily="34" charset="-122"/>
+                <a:latin typeface="Times New Roman" panose="02020603050405020304" pitchFamily="18" charset="0"/>
+                <a:ea typeface="微软雅黑" panose="020B0503020204020204" pitchFamily="34" charset="-122"/>
+                <a:cs typeface="Times New Roman" panose="02020603050405020304" pitchFamily="18" charset="0"/>
+                <a:sym typeface="+mn-ea"/>
+              </a:rPr>
+              <a:t>纵坐标：时间差 </a:t>
+            </a:r>
+            <a:r>
+              <a:rPr lang="en-US" altLang="zh-CN" sz="2400" dirty="0">
+                <a:latin typeface="Times New Roman" panose="02020603050405020304" pitchFamily="18" charset="0"/>
+                <a:ea typeface="微软雅黑" panose="020B0503020204020204" pitchFamily="34" charset="-122"/>
+                <a:cs typeface="Times New Roman" panose="02020603050405020304" pitchFamily="18" charset="0"/>
                 <a:sym typeface="+mn-ea"/>
               </a:rPr>
               <a:t>d</a:t>
             </a:r>
             <a:r>
-              <a:rPr lang="en-US" altLang="zh-CN" sz="2400" b="1" i="1" dirty="0">
-                <a:latin typeface="微软雅黑" panose="020B0503020204020204" pitchFamily="34" charset="-122"/>
-                <a:ea typeface="微软雅黑" panose="020B0503020204020204" pitchFamily="34" charset="-122"/>
+              <a:rPr lang="en-US" altLang="zh-CN" sz="2400" i="1" dirty="0">
+                <a:latin typeface="Times New Roman" panose="02020603050405020304" pitchFamily="18" charset="0"/>
+                <a:ea typeface="微软雅黑" panose="020B0503020204020204" pitchFamily="34" charset="-122"/>
+                <a:cs typeface="Times New Roman" panose="02020603050405020304" pitchFamily="18" charset="0"/>
                 <a:sym typeface="+mn-ea"/>
               </a:rPr>
               <a:t>t</a:t>
@@ -18283,8 +18349,9 @@
                 <a:solidFill>
                   <a:schemeClr val="tx1"/>
                 </a:solidFill>
-                <a:latin typeface="微软雅黑" panose="020B0503020204020204" pitchFamily="34" charset="-122"/>
-                <a:ea typeface="微软雅黑" panose="020B0503020204020204" pitchFamily="34" charset="-122"/>
+                <a:latin typeface="Times New Roman" panose="02020603050405020304" pitchFamily="18" charset="0"/>
+                <a:ea typeface="微软雅黑" panose="020B0503020204020204" pitchFamily="34" charset="-122"/>
+                <a:cs typeface="Times New Roman" panose="02020603050405020304" pitchFamily="18" charset="0"/>
                 <a:sym typeface="+mn-ea"/>
               </a:rPr>
               <a:t>在图中画出：</a:t>
@@ -18293,8 +18360,9 @@
               <a:solidFill>
                 <a:schemeClr val="tx1"/>
               </a:solidFill>
-              <a:latin typeface="微软雅黑" panose="020B0503020204020204" pitchFamily="34" charset="-122"/>
+              <a:latin typeface="Times New Roman" panose="02020603050405020304" pitchFamily="18" charset="0"/>
               <a:ea typeface="微软雅黑" panose="020B0503020204020204" pitchFamily="34" charset="-122"/>
+              <a:cs typeface="Times New Roman" panose="02020603050405020304" pitchFamily="18" charset="0"/>
               <a:sym typeface="+mn-ea"/>
             </a:endParaRPr>
           </a:p>
@@ -18311,8 +18379,9 @@
                 <a:solidFill>
                   <a:schemeClr val="tx1"/>
                 </a:solidFill>
-                <a:latin typeface="微软雅黑" panose="020B0503020204020204" pitchFamily="34" charset="-122"/>
-                <a:ea typeface="微软雅黑" panose="020B0503020204020204" pitchFamily="34" charset="-122"/>
+                <a:latin typeface="Times New Roman" panose="02020603050405020304" pitchFamily="18" charset="0"/>
+                <a:ea typeface="微软雅黑" panose="020B0503020204020204" pitchFamily="34" charset="-122"/>
+                <a:cs typeface="Times New Roman" panose="02020603050405020304" pitchFamily="18" charset="0"/>
                 <a:sym typeface="+mn-ea"/>
               </a:rPr>
               <a:t>UT1</a:t>
@@ -18328,39 +18397,44 @@
             </a:pPr>
             <a:r>
               <a:rPr lang="en-US" altLang="zh-CN" sz="2000" b="1" dirty="0">
-                <a:latin typeface="微软雅黑" panose="020B0503020204020204" pitchFamily="34" charset="-122"/>
-                <a:ea typeface="微软雅黑" panose="020B0503020204020204" pitchFamily="34" charset="-122"/>
+                <a:latin typeface="Times New Roman" panose="02020603050405020304" pitchFamily="18" charset="0"/>
+                <a:ea typeface="微软雅黑" panose="020B0503020204020204" pitchFamily="34" charset="-122"/>
+                <a:cs typeface="Times New Roman" panose="02020603050405020304" pitchFamily="18" charset="0"/>
                 <a:sym typeface="+mn-ea"/>
               </a:rPr>
               <a:t>UTC</a:t>
             </a:r>
             <a:r>
               <a:rPr lang="zh-CN" altLang="en-US" sz="2000" b="1" dirty="0">
-                <a:latin typeface="微软雅黑" panose="020B0503020204020204" pitchFamily="34" charset="-122"/>
-                <a:ea typeface="微软雅黑" panose="020B0503020204020204" pitchFamily="34" charset="-122"/>
+                <a:latin typeface="Times New Roman" panose="02020603050405020304" pitchFamily="18" charset="0"/>
+                <a:ea typeface="微软雅黑" panose="020B0503020204020204" pitchFamily="34" charset="-122"/>
+                <a:cs typeface="Times New Roman" panose="02020603050405020304" pitchFamily="18" charset="0"/>
                 <a:sym typeface="+mn-ea"/>
               </a:rPr>
               <a:t>（</a:t>
             </a:r>
             <a:r>
               <a:rPr lang="en-US" altLang="zh-CN" sz="2000" b="1" dirty="0">
-                <a:latin typeface="微软雅黑" panose="020B0503020204020204" pitchFamily="34" charset="-122"/>
-                <a:ea typeface="微软雅黑" panose="020B0503020204020204" pitchFamily="34" charset="-122"/>
+                <a:latin typeface="Times New Roman" panose="02020603050405020304" pitchFamily="18" charset="0"/>
+                <a:ea typeface="微软雅黑" panose="020B0503020204020204" pitchFamily="34" charset="-122"/>
+                <a:cs typeface="Times New Roman" panose="02020603050405020304" pitchFamily="18" charset="0"/>
                 <a:sym typeface="+mn-ea"/>
               </a:rPr>
               <a:t>from 1972</a:t>
             </a:r>
             <a:r>
               <a:rPr lang="zh-CN" altLang="en-US" sz="2000" b="1" dirty="0">
-                <a:latin typeface="微软雅黑" panose="020B0503020204020204" pitchFamily="34" charset="-122"/>
-                <a:ea typeface="微软雅黑" panose="020B0503020204020204" pitchFamily="34" charset="-122"/>
+                <a:latin typeface="Times New Roman" panose="02020603050405020304" pitchFamily="18" charset="0"/>
+                <a:ea typeface="微软雅黑" panose="020B0503020204020204" pitchFamily="34" charset="-122"/>
+                <a:cs typeface="Times New Roman" panose="02020603050405020304" pitchFamily="18" charset="0"/>
                 <a:sym typeface="+mn-ea"/>
               </a:rPr>
               <a:t>）</a:t>
             </a:r>
             <a:endParaRPr lang="en-US" altLang="zh-CN" sz="2000" b="1" dirty="0">
-              <a:latin typeface="微软雅黑" panose="020B0503020204020204" pitchFamily="34" charset="-122"/>
+              <a:latin typeface="Times New Roman" panose="02020603050405020304" pitchFamily="18" charset="0"/>
               <a:ea typeface="微软雅黑" panose="020B0503020204020204" pitchFamily="34" charset="-122"/>
+              <a:cs typeface="Times New Roman" panose="02020603050405020304" pitchFamily="18" charset="0"/>
               <a:sym typeface="+mn-ea"/>
             </a:endParaRPr>
           </a:p>
@@ -18377,8 +18451,9 @@
                 <a:solidFill>
                   <a:schemeClr val="tx1"/>
                 </a:solidFill>
-                <a:latin typeface="微软雅黑" panose="020B0503020204020204" pitchFamily="34" charset="-122"/>
-                <a:ea typeface="微软雅黑" panose="020B0503020204020204" pitchFamily="34" charset="-122"/>
+                <a:latin typeface="Times New Roman" panose="02020603050405020304" pitchFamily="18" charset="0"/>
+                <a:ea typeface="微软雅黑" panose="020B0503020204020204" pitchFamily="34" charset="-122"/>
+                <a:cs typeface="Times New Roman" panose="02020603050405020304" pitchFamily="18" charset="0"/>
                 <a:sym typeface="+mn-ea"/>
               </a:rPr>
               <a:t>TT</a:t>
@@ -18394,8 +18469,9 @@
             </a:pPr>
             <a:r>
               <a:rPr lang="en-US" altLang="zh-CN" sz="2000" b="1" dirty="0">
-                <a:latin typeface="微软雅黑" panose="020B0503020204020204" pitchFamily="34" charset="-122"/>
-                <a:ea typeface="微软雅黑" panose="020B0503020204020204" pitchFamily="34" charset="-122"/>
+                <a:latin typeface="Times New Roman" panose="02020603050405020304" pitchFamily="18" charset="0"/>
+                <a:ea typeface="微软雅黑" panose="020B0503020204020204" pitchFamily="34" charset="-122"/>
+                <a:cs typeface="Times New Roman" panose="02020603050405020304" pitchFamily="18" charset="0"/>
                 <a:sym typeface="+mn-ea"/>
               </a:rPr>
               <a:t>TDB</a:t>
@@ -18414,8 +18490,9 @@
                 <a:solidFill>
                   <a:schemeClr val="tx1"/>
                 </a:solidFill>
-                <a:latin typeface="微软雅黑" panose="020B0503020204020204" pitchFamily="34" charset="-122"/>
-                <a:ea typeface="微软雅黑" panose="020B0503020204020204" pitchFamily="34" charset="-122"/>
+                <a:latin typeface="Times New Roman" panose="02020603050405020304" pitchFamily="18" charset="0"/>
+                <a:ea typeface="微软雅黑" panose="020B0503020204020204" pitchFamily="34" charset="-122"/>
+                <a:cs typeface="Times New Roman" panose="02020603050405020304" pitchFamily="18" charset="0"/>
                 <a:sym typeface="+mn-ea"/>
               </a:rPr>
               <a:t>GPS</a:t>
@@ -18424,8 +18501,9 @@
               <a:solidFill>
                 <a:schemeClr val="tx1"/>
               </a:solidFill>
-              <a:latin typeface="微软雅黑" panose="020B0503020204020204" pitchFamily="34" charset="-122"/>
+              <a:latin typeface="Times New Roman" panose="02020603050405020304" pitchFamily="18" charset="0"/>
               <a:ea typeface="微软雅黑" panose="020B0503020204020204" pitchFamily="34" charset="-122"/>
+              <a:cs typeface="Times New Roman" panose="02020603050405020304" pitchFamily="18" charset="0"/>
               <a:sym typeface="+mn-ea"/>
             </a:endParaRPr>
           </a:p>
@@ -18607,13 +18685,13 @@
   <p:clrMapOvr>
     <a:masterClrMapping/>
   </p:clrMapOvr>
-  <mc:AlternateContent xmlns:mc="http://schemas.openxmlformats.org/markup-compatibility/2006">
-    <mc:Choice xmlns:p159="http://schemas.microsoft.com/office/powerpoint/2015/09/main" Requires="p159">
+  <mc:AlternateContent xmlns:mc="http://schemas.openxmlformats.org/markup-compatibility/2006" xmlns:p159="http://schemas.microsoft.com/office/powerpoint/2015/09/main">
+    <mc:Choice Requires="p159">
       <p:transition spd="slow">
         <p159:morph option="byObject"/>
       </p:transition>
     </mc:Choice>
-    <mc:Fallback>
+    <mc:Fallback xmlns="">
       <p:transition spd="slow">
         <p:fade/>
       </p:transition>
@@ -18914,13 +18992,13 @@
   <p:clrMapOvr>
     <a:masterClrMapping/>
   </p:clrMapOvr>
-  <mc:AlternateContent xmlns:mc="http://schemas.openxmlformats.org/markup-compatibility/2006">
-    <mc:Choice xmlns:p159="http://schemas.microsoft.com/office/powerpoint/2015/09/main" Requires="p159">
+  <mc:AlternateContent xmlns:mc="http://schemas.openxmlformats.org/markup-compatibility/2006" xmlns:p159="http://schemas.microsoft.com/office/powerpoint/2015/09/main">
+    <mc:Choice Requires="p159">
       <p:transition spd="slow">
         <p159:morph option="byObject"/>
       </p:transition>
     </mc:Choice>
-    <mc:Fallback>
+    <mc:Fallback xmlns="">
       <p:transition spd="slow">
         <p:fade/>
       </p:transition>
@@ -20398,13 +20476,13 @@
   <p:clrMapOvr>
     <a:masterClrMapping/>
   </p:clrMapOvr>
-  <mc:AlternateContent xmlns:mc="http://schemas.openxmlformats.org/markup-compatibility/2006">
-    <mc:Choice xmlns:p159="http://schemas.microsoft.com/office/powerpoint/2015/09/main" Requires="p159">
+  <mc:AlternateContent xmlns:mc="http://schemas.openxmlformats.org/markup-compatibility/2006" xmlns:p159="http://schemas.microsoft.com/office/powerpoint/2015/09/main">
+    <mc:Choice Requires="p159">
       <p:transition spd="slow">
         <p159:morph option="byObject"/>
       </p:transition>
     </mc:Choice>
-    <mc:Fallback>
+    <mc:Fallback xmlns="">
       <p:transition spd="slow">
         <p:fade/>
       </p:transition>
@@ -22175,13 +22253,13 @@
   <p:clrMapOvr>
     <a:masterClrMapping/>
   </p:clrMapOvr>
-  <mc:AlternateContent xmlns:mc="http://schemas.openxmlformats.org/markup-compatibility/2006">
-    <mc:Choice xmlns:p159="http://schemas.microsoft.com/office/powerpoint/2015/09/main" Requires="p159">
+  <mc:AlternateContent xmlns:mc="http://schemas.openxmlformats.org/markup-compatibility/2006" xmlns:p159="http://schemas.microsoft.com/office/powerpoint/2015/09/main">
+    <mc:Choice Requires="p159">
       <p:transition spd="slow">
         <p159:morph option="byObject"/>
       </p:transition>
     </mc:Choice>
-    <mc:Fallback>
+    <mc:Fallback xmlns="">
       <p:transition spd="slow">
         <p:fade/>
       </p:transition>
@@ -22460,110 +22538,6 @@
                 <a:ea typeface="微软雅黑" panose="020B0503020204020204" pitchFamily="34" charset="-122"/>
               </a:rPr>
               <a:t>赤道坐标系</a:t>
-            </a:r>
-          </a:p>
-        </p:txBody>
-      </p:sp>
-      <p:sp>
-        <p:nvSpPr>
-          <p:cNvPr id="16" name="矩形 15">
-            <a:extLst>
-              <a:ext uri="{FF2B5EF4-FFF2-40B4-BE49-F238E27FC236}">
-                <a16:creationId xmlns:a16="http://schemas.microsoft.com/office/drawing/2014/main" id="{9598849D-A5AA-2A40-C130-5CD786C07BCE}"/>
-              </a:ext>
-            </a:extLst>
-          </p:cNvPr>
-          <p:cNvSpPr/>
-          <p:nvPr/>
-        </p:nvSpPr>
-        <p:spPr>
-          <a:xfrm>
-            <a:off x="2998525" y="5805487"/>
-            <a:ext cx="2353009" cy="661720"/>
-          </a:xfrm>
-          <a:prstGeom prst="rect">
-            <a:avLst/>
-          </a:prstGeom>
-        </p:spPr>
-        <p:txBody>
-          <a:bodyPr wrap="square">
-            <a:spAutoFit/>
-          </a:bodyPr>
-          <a:lstStyle/>
-          <a:p>
-            <a:pPr algn="ctr" fontAlgn="auto">
-              <a:spcBef>
-                <a:spcPts val="600"/>
-              </a:spcBef>
-              <a:spcAft>
-                <a:spcPts val="0"/>
-              </a:spcAft>
-            </a:pPr>
-            <a:r>
-              <a:rPr lang="zh-CN" altLang="en-US" b="1" dirty="0">
-                <a:latin typeface="微软雅黑" panose="020B0503020204020204" pitchFamily="34" charset="-122"/>
-                <a:ea typeface="微软雅黑" panose="020B0503020204020204" pitchFamily="34" charset="-122"/>
-              </a:rPr>
-              <a:t>恒星时 </a:t>
-            </a:r>
-            <a:r>
-              <a:rPr lang="en-US" altLang="zh-CN" b="1" i="1" dirty="0">
-                <a:latin typeface="微软雅黑" panose="020B0503020204020204" pitchFamily="34" charset="-122"/>
-                <a:ea typeface="微软雅黑" panose="020B0503020204020204" pitchFamily="34" charset="-122"/>
-              </a:rPr>
-              <a:t>S </a:t>
-            </a:r>
-            <a:r>
-              <a:rPr lang="en-US" altLang="zh-CN" b="1" dirty="0">
-                <a:latin typeface="微软雅黑" panose="020B0503020204020204" pitchFamily="34" charset="-122"/>
-                <a:ea typeface="微软雅黑" panose="020B0503020204020204" pitchFamily="34" charset="-122"/>
-              </a:rPr>
-              <a:t>=</a:t>
-            </a:r>
-            <a:r>
-              <a:rPr lang="en-US" altLang="zh-CN" b="1" i="1" dirty="0">
-                <a:latin typeface="微软雅黑" panose="020B0503020204020204" pitchFamily="34" charset="-122"/>
-                <a:ea typeface="微软雅黑" panose="020B0503020204020204" pitchFamily="34" charset="-122"/>
-              </a:rPr>
-              <a:t>α</a:t>
-            </a:r>
-            <a:r>
-              <a:rPr lang="en-US" altLang="zh-CN" b="1" dirty="0">
-                <a:latin typeface="微软雅黑" panose="020B0503020204020204" pitchFamily="34" charset="-122"/>
-                <a:ea typeface="微软雅黑" panose="020B0503020204020204" pitchFamily="34" charset="-122"/>
-              </a:rPr>
-              <a:t>+</a:t>
-            </a:r>
-            <a:r>
-              <a:rPr lang="en-US" altLang="zh-CN" b="1" i="1" dirty="0">
-                <a:latin typeface="微软雅黑" panose="020B0503020204020204" pitchFamily="34" charset="-122"/>
-                <a:ea typeface="微软雅黑" panose="020B0503020204020204" pitchFamily="34" charset="-122"/>
-              </a:rPr>
-              <a:t>t</a:t>
-            </a:r>
-          </a:p>
-          <a:p>
-            <a:pPr algn="ctr" fontAlgn="auto">
-              <a:spcBef>
-                <a:spcPts val="600"/>
-              </a:spcBef>
-              <a:spcAft>
-                <a:spcPts val="0"/>
-              </a:spcAft>
-            </a:pPr>
-            <a:r>
-              <a:rPr lang="en-US" altLang="zh-CN" sz="1400" b="1" dirty="0">
-                <a:latin typeface="微软雅黑" panose="020B0503020204020204" pitchFamily="34" charset="-122"/>
-                <a:ea typeface="微软雅黑" panose="020B0503020204020204" pitchFamily="34" charset="-122"/>
-              </a:rPr>
-              <a:t>(</a:t>
-            </a:r>
-            <a:r>
-              <a:rPr lang="zh-CN" altLang="en-US" sz="1400" b="1" dirty="0">
-                <a:latin typeface="微软雅黑" panose="020B0503020204020204" pitchFamily="34" charset="-122"/>
-                <a:ea typeface="微软雅黑" panose="020B0503020204020204" pitchFamily="34" charset="-122"/>
-              </a:rPr>
-              <a:t>见本节“时间系统”）</a:t>
             </a:r>
           </a:p>
         </p:txBody>
@@ -24020,6 +23994,148 @@
           </a:prstGeom>
         </p:spPr>
       </p:pic>
+      <p:sp>
+        <p:nvSpPr>
+          <p:cNvPr id="7" name="矩形 6">
+            <a:extLst>
+              <a:ext uri="{FF2B5EF4-FFF2-40B4-BE49-F238E27FC236}">
+                <a16:creationId xmlns:a16="http://schemas.microsoft.com/office/drawing/2014/main" id="{F060E801-3168-1D34-D195-96CCE1CE8C35}"/>
+              </a:ext>
+            </a:extLst>
+          </p:cNvPr>
+          <p:cNvSpPr/>
+          <p:nvPr/>
+        </p:nvSpPr>
+        <p:spPr>
+          <a:xfrm>
+            <a:off x="3147409" y="5879187"/>
+            <a:ext cx="2353009" cy="661720"/>
+          </a:xfrm>
+          <a:prstGeom prst="rect">
+            <a:avLst/>
+          </a:prstGeom>
+        </p:spPr>
+        <p:txBody>
+          <a:bodyPr wrap="square">
+            <a:spAutoFit/>
+          </a:bodyPr>
+          <a:lstStyle/>
+          <a:p>
+            <a:pPr fontAlgn="auto">
+              <a:spcBef>
+                <a:spcPts val="600"/>
+              </a:spcBef>
+              <a:spcAft>
+                <a:spcPts val="0"/>
+              </a:spcAft>
+            </a:pPr>
+            <a:r>
+              <a:rPr lang="zh-CN" altLang="en-US" b="1" dirty="0">
+                <a:latin typeface="微软雅黑" panose="020B0503020204020204" pitchFamily="34" charset="-122"/>
+                <a:ea typeface="微软雅黑" panose="020B0503020204020204" pitchFamily="34" charset="-122"/>
+              </a:rPr>
+              <a:t>  恒星时  </a:t>
+            </a:r>
+            <a:endParaRPr lang="en-US" altLang="zh-CN" b="1" i="1" dirty="0">
+              <a:latin typeface="微软雅黑" panose="020B0503020204020204" pitchFamily="34" charset="-122"/>
+              <a:ea typeface="微软雅黑" panose="020B0503020204020204" pitchFamily="34" charset="-122"/>
+            </a:endParaRPr>
+          </a:p>
+          <a:p>
+            <a:pPr algn="ctr" fontAlgn="auto">
+              <a:spcBef>
+                <a:spcPts val="600"/>
+              </a:spcBef>
+              <a:spcAft>
+                <a:spcPts val="0"/>
+              </a:spcAft>
+            </a:pPr>
+            <a:r>
+              <a:rPr lang="en-US" altLang="zh-CN" sz="1400" b="1" dirty="0">
+                <a:latin typeface="微软雅黑" panose="020B0503020204020204" pitchFamily="34" charset="-122"/>
+                <a:ea typeface="微软雅黑" panose="020B0503020204020204" pitchFamily="34" charset="-122"/>
+              </a:rPr>
+              <a:t>(</a:t>
+            </a:r>
+            <a:r>
+              <a:rPr lang="zh-CN" altLang="en-US" sz="1400" b="1" dirty="0">
+                <a:latin typeface="微软雅黑" panose="020B0503020204020204" pitchFamily="34" charset="-122"/>
+                <a:ea typeface="微软雅黑" panose="020B0503020204020204" pitchFamily="34" charset="-122"/>
+              </a:rPr>
+              <a:t>见本节“时间系统”）</a:t>
+            </a:r>
+          </a:p>
+        </p:txBody>
+      </p:sp>
+      <p:graphicFrame>
+        <p:nvGraphicFramePr>
+          <p:cNvPr id="9" name="对象 8">
+            <a:extLst>
+              <a:ext uri="{FF2B5EF4-FFF2-40B4-BE49-F238E27FC236}">
+                <a16:creationId xmlns:a16="http://schemas.microsoft.com/office/drawing/2014/main" id="{375A497F-37E3-ECAF-B358-A839EA25C577}"/>
+              </a:ext>
+            </a:extLst>
+          </p:cNvPr>
+          <p:cNvGraphicFramePr>
+            <a:graphicFrameLocks noChangeAspect="1"/>
+          </p:cNvGraphicFramePr>
+          <p:nvPr>
+            <p:extLst>
+              <p:ext uri="{D42A27DB-BD31-4B8C-83A1-F6EECF244321}">
+                <p14:modId xmlns:p14="http://schemas.microsoft.com/office/powerpoint/2010/main" val="275608947"/>
+              </p:ext>
+            </p:extLst>
+          </p:nvPr>
+        </p:nvGraphicFramePr>
+        <p:xfrm>
+          <a:off x="4176376" y="5905922"/>
+          <a:ext cx="1098550" cy="377825"/>
+        </p:xfrm>
+        <a:graphic>
+          <a:graphicData uri="http://schemas.openxmlformats.org/presentationml/2006/ole">
+            <mc:AlternateContent xmlns:mc="http://schemas.openxmlformats.org/markup-compatibility/2006">
+              <mc:Choice xmlns:v="urn:schemas-microsoft-com:vml" Requires="v">
+                <p:oleObj name="AxMath" r:id="rId6" imgW="549360" imgH="189000" progId="Equation.AxMath">
+                  <p:embed/>
+                </p:oleObj>
+              </mc:Choice>
+              <mc:Fallback>
+                <p:oleObj name="AxMath" r:id="rId6" imgW="549360" imgH="189000" progId="Equation.AxMath">
+                  <p:embed/>
+                  <p:pic>
+                    <p:nvPicPr>
+                      <p:cNvPr id="7" name="对象 6">
+                        <a:extLst>
+                          <a:ext uri="{FF2B5EF4-FFF2-40B4-BE49-F238E27FC236}">
+                            <a16:creationId xmlns:a16="http://schemas.microsoft.com/office/drawing/2014/main" id="{139AE67D-5362-43ED-B8CD-4536CC752BF9}"/>
+                          </a:ext>
+                        </a:extLst>
+                      </p:cNvPr>
+                      <p:cNvPicPr/>
+                      <p:nvPr/>
+                    </p:nvPicPr>
+                    <p:blipFill>
+                      <a:blip r:embed="rId7"/>
+                      <a:stretch>
+                        <a:fillRect/>
+                      </a:stretch>
+                    </p:blipFill>
+                    <p:spPr>
+                      <a:xfrm>
+                        <a:off x="4176376" y="5905922"/>
+                        <a:ext cx="1098550" cy="377825"/>
+                      </a:xfrm>
+                      <a:prstGeom prst="rect">
+                        <a:avLst/>
+                      </a:prstGeom>
+                    </p:spPr>
+                  </p:pic>
+                </p:oleObj>
+              </mc:Fallback>
+            </mc:AlternateContent>
+          </a:graphicData>
+        </a:graphic>
+      </p:graphicFrame>
     </p:spTree>
     <p:extLst>
       <p:ext uri="{BB962C8B-B14F-4D97-AF65-F5344CB8AC3E}">
@@ -24030,18 +24146,107 @@
   <p:clrMapOvr>
     <a:masterClrMapping/>
   </p:clrMapOvr>
-  <mc:AlternateContent xmlns:mc="http://schemas.openxmlformats.org/markup-compatibility/2006">
-    <mc:Choice xmlns:p159="http://schemas.microsoft.com/office/powerpoint/2015/09/main" Requires="p159">
+  <mc:AlternateContent xmlns:mc="http://schemas.openxmlformats.org/markup-compatibility/2006" xmlns:p159="http://schemas.microsoft.com/office/powerpoint/2015/09/main">
+    <mc:Choice Requires="p159">
       <p:transition spd="slow">
         <p159:morph option="byObject"/>
       </p:transition>
     </mc:Choice>
-    <mc:Fallback>
+    <mc:Fallback xmlns="">
       <p:transition spd="slow">
         <p:fade/>
       </p:transition>
     </mc:Fallback>
   </mc:AlternateContent>
+  <p:timing>
+    <p:tnLst>
+      <p:par>
+        <p:cTn id="1" dur="indefinite" restart="never" nodeType="tmRoot">
+          <p:childTnLst>
+            <p:seq concurrent="1" nextAc="seek">
+              <p:cTn id="2" dur="indefinite" nodeType="mainSeq">
+                <p:childTnLst>
+                  <p:par>
+                    <p:cTn id="3" fill="hold">
+                      <p:stCondLst>
+                        <p:cond delay="indefinite"/>
+                        <p:cond evt="onBegin" delay="0">
+                          <p:tn val="2"/>
+                        </p:cond>
+                      </p:stCondLst>
+                      <p:childTnLst>
+                        <p:par>
+                          <p:cTn id="4" fill="hold">
+                            <p:stCondLst>
+                              <p:cond delay="0"/>
+                            </p:stCondLst>
+                            <p:childTnLst>
+                              <p:par>
+                                <p:cTn id="5" presetID="10" presetClass="entr" presetSubtype="0" fill="hold" grpId="0" nodeType="withEffect">
+                                  <p:stCondLst>
+                                    <p:cond delay="0"/>
+                                  </p:stCondLst>
+                                  <p:childTnLst>
+                                    <p:set>
+                                      <p:cBhvr>
+                                        <p:cTn id="6" dur="1" fill="hold">
+                                          <p:stCondLst>
+                                            <p:cond delay="0"/>
+                                          </p:stCondLst>
+                                        </p:cTn>
+                                        <p:tgtEl>
+                                          <p:spTgt spid="7"/>
+                                        </p:tgtEl>
+                                        <p:attrNameLst>
+                                          <p:attrName>style.visibility</p:attrName>
+                                        </p:attrNameLst>
+                                      </p:cBhvr>
+                                      <p:to>
+                                        <p:strVal val="visible"/>
+                                      </p:to>
+                                    </p:set>
+                                    <p:animEffect transition="in" filter="fade">
+                                      <p:cBhvr>
+                                        <p:cTn id="7" dur="500"/>
+                                        <p:tgtEl>
+                                          <p:spTgt spid="7"/>
+                                        </p:tgtEl>
+                                      </p:cBhvr>
+                                    </p:animEffect>
+                                  </p:childTnLst>
+                                </p:cTn>
+                              </p:par>
+                            </p:childTnLst>
+                          </p:cTn>
+                        </p:par>
+                      </p:childTnLst>
+                    </p:cTn>
+                  </p:par>
+                </p:childTnLst>
+              </p:cTn>
+              <p:prevCondLst>
+                <p:cond evt="onPrev" delay="0">
+                  <p:tgtEl>
+                    <p:sldTgt/>
+                  </p:tgtEl>
+                </p:cond>
+              </p:prevCondLst>
+              <p:nextCondLst>
+                <p:cond evt="onNext" delay="0">
+                  <p:tgtEl>
+                    <p:sldTgt/>
+                  </p:tgtEl>
+                </p:cond>
+              </p:nextCondLst>
+            </p:seq>
+          </p:childTnLst>
+        </p:cTn>
+      </p:par>
+    </p:tnLst>
+    <p:bldLst>
+      <p:bldP spid="7" grpId="0"/>
+    </p:bldLst>
+  </p:timing>
 </p:sld>
 </file>
 
@@ -25562,13 +25767,13 @@
   <p:clrMapOvr>
     <a:masterClrMapping/>
   </p:clrMapOvr>
-  <mc:AlternateContent xmlns:mc="http://schemas.openxmlformats.org/markup-compatibility/2006">
-    <mc:Choice xmlns:p159="http://schemas.microsoft.com/office/powerpoint/2015/09/main" Requires="p159">
+  <mc:AlternateContent xmlns:mc="http://schemas.openxmlformats.org/markup-compatibility/2006" xmlns:p159="http://schemas.microsoft.com/office/powerpoint/2015/09/main">
+    <mc:Choice Requires="p159">
       <p:transition spd="slow">
         <p159:morph option="byObject"/>
       </p:transition>
     </mc:Choice>
-    <mc:Fallback>
+    <mc:Fallback xmlns="">
       <p:transition spd="slow">
         <p:fade/>
       </p:transition>
@@ -26010,13 +26215,13 @@
   <p:clrMapOvr>
     <a:masterClrMapping/>
   </p:clrMapOvr>
-  <mc:AlternateContent xmlns:mc="http://schemas.openxmlformats.org/markup-compatibility/2006">
-    <mc:Choice xmlns:p159="http://schemas.microsoft.com/office/powerpoint/2015/09/main" Requires="p159">
+  <mc:AlternateContent xmlns:mc="http://schemas.openxmlformats.org/markup-compatibility/2006" xmlns:p159="http://schemas.microsoft.com/office/powerpoint/2015/09/main">
+    <mc:Choice Requires="p159">
       <p:transition spd="slow">
         <p159:morph option="byObject"/>
       </p:transition>
     </mc:Choice>
-    <mc:Fallback>
+    <mc:Fallback xmlns="">
       <p:transition spd="slow">
         <p:fade/>
       </p:transition>
@@ -26447,13 +26652,13 @@
   <p:clrMapOvr>
     <a:masterClrMapping/>
   </p:clrMapOvr>
-  <mc:AlternateContent xmlns:mc="http://schemas.openxmlformats.org/markup-compatibility/2006">
-    <mc:Choice xmlns:p159="http://schemas.microsoft.com/office/powerpoint/2015/09/main" Requires="p159">
+  <mc:AlternateContent xmlns:mc="http://schemas.openxmlformats.org/markup-compatibility/2006" xmlns:p159="http://schemas.microsoft.com/office/powerpoint/2015/09/main">
+    <mc:Choice Requires="p159">
       <p:transition spd="slow">
         <p159:morph option="byObject"/>
       </p:transition>
     </mc:Choice>
-    <mc:Fallback>
+    <mc:Fallback xmlns="">
       <p:transition spd="slow">
         <p:fade/>
       </p:transition>

</xml_diff>

<commit_message>
Spherical Astronomy XIA&Huang and Miao
</commit_message>
<xml_diff>
--- a/01 天球概念与时间系统.pptx
+++ b/01 天球概念与时间系统.pptx
@@ -246,7 +246,7 @@
           <a:p>
             <a:fld id="{26DDD1A4-63E9-4C41-BD0C-A6576214358F}" type="datetimeFigureOut">
               <a:rPr kumimoji="1" lang="zh-CN" altLang="en-US" smtClean="0"/>
-              <a:t>2023/9/22</a:t>
+              <a:t>2024/1/1</a:t>
             </a:fld>
             <a:endParaRPr kumimoji="1" lang="zh-CN" altLang="en-US"/>
           </a:p>
@@ -840,7 +840,7 @@
           <a:p>
             <a:fld id="{8664C608-40B1-4030-A28D-5B74BC98ADCE}" type="datetimeFigureOut">
               <a:rPr lang="en-US" smtClean="0"/>
-              <a:t>9/22/2023</a:t>
+              <a:t>1/1/2024</a:t>
             </a:fld>
             <a:endParaRPr lang="en-US" dirty="0"/>
           </a:p>
@@ -1680,7 +1680,7 @@
         <p:spPr>
           <a:xfrm>
             <a:off x="3003414" y="4516087"/>
-            <a:ext cx="5626779" cy="1953868"/>
+            <a:ext cx="5626779" cy="1308628"/>
           </a:xfrm>
           <a:prstGeom prst="rect">
             <a:avLst/>
@@ -1725,6 +1725,57 @@
               <a:t>》</a:t>
             </a:r>
             <a:r>
+              <a:rPr kumimoji="0" lang="zh-CN" altLang="en-US" sz="1600" b="1" i="0" u="none" strike="noStrike" kern="1200" cap="none" spc="0" normalizeH="0" baseline="0" noProof="0" dirty="0">
+                <a:ln>
+                  <a:noFill/>
+                </a:ln>
+                <a:solidFill>
+                  <a:prstClr val="black"/>
+                </a:solidFill>
+                <a:effectLst/>
+                <a:uLnTx/>
+                <a:uFillTx/>
+                <a:latin typeface="Times New Roman" panose="02020603050405020304" pitchFamily="18" charset="0"/>
+                <a:ea typeface="微软雅黑" panose="020B0503020204020204" pitchFamily="34" charset="-122"/>
+                <a:cs typeface="Times New Roman" panose="02020603050405020304" pitchFamily="18" charset="0"/>
+              </a:rPr>
+              <a:t>（夏 </a:t>
+            </a:r>
+            <a:r>
+              <a:rPr kumimoji="0" lang="en-US" altLang="zh-CN" sz="1600" b="1" i="0" u="none" strike="noStrike" kern="1200" cap="none" spc="0" normalizeH="0" baseline="0" noProof="0" dirty="0">
+                <a:ln>
+                  <a:noFill/>
+                </a:ln>
+                <a:solidFill>
+                  <a:prstClr val="black"/>
+                </a:solidFill>
+                <a:effectLst/>
+                <a:uLnTx/>
+                <a:uFillTx/>
+                <a:latin typeface="Times New Roman" panose="02020603050405020304" pitchFamily="18" charset="0"/>
+                <a:ea typeface="微软雅黑" panose="020B0503020204020204" pitchFamily="34" charset="-122"/>
+                <a:cs typeface="Times New Roman" panose="02020603050405020304" pitchFamily="18" charset="0"/>
+              </a:rPr>
+              <a:t>/</a:t>
+            </a:r>
+            <a:r>
+              <a:rPr kumimoji="0" lang="zh-CN" altLang="en-US" sz="1600" b="1" i="0" u="none" strike="noStrike" kern="1200" cap="none" spc="0" normalizeH="0" baseline="0" noProof="0" dirty="0">
+                <a:ln>
+                  <a:noFill/>
+                </a:ln>
+                <a:solidFill>
+                  <a:prstClr val="black"/>
+                </a:solidFill>
+                <a:effectLst/>
+                <a:uLnTx/>
+                <a:uFillTx/>
+                <a:latin typeface="Times New Roman" panose="02020603050405020304" pitchFamily="18" charset="0"/>
+                <a:ea typeface="微软雅黑" panose="020B0503020204020204" pitchFamily="34" charset="-122"/>
+                <a:cs typeface="Times New Roman" panose="02020603050405020304" pitchFamily="18" charset="0"/>
+              </a:rPr>
+              <a:t>黄版）</a:t>
+            </a:r>
+            <a:r>
               <a:rPr lang="zh-CN" altLang="en-US" sz="2800" b="1" dirty="0">
                 <a:latin typeface="Times New Roman" panose="02020603050405020304" pitchFamily="18" charset="0"/>
                 <a:ea typeface="微软雅黑" panose="020B0503020204020204" pitchFamily="34" charset="-122"/>
@@ -1780,7 +1831,7 @@
               <a:t>第 </a:t>
             </a:r>
             <a:r>
-              <a:rPr lang="en-US" altLang="zh-CN" sz="2800" b="1">
+              <a:rPr lang="en-US" altLang="zh-CN" sz="2800" b="1" dirty="0">
                 <a:latin typeface="Times New Roman" panose="02020603050405020304" pitchFamily="18" charset="0"/>
                 <a:ea typeface="微软雅黑" panose="020B0503020204020204" pitchFamily="34" charset="-122"/>
                 <a:cs typeface="Times New Roman" panose="02020603050405020304" pitchFamily="18" charset="0"/>
@@ -1795,21 +1846,6 @@
               </a:rPr>
               <a:t>节</a:t>
             </a:r>
-            <a:endParaRPr lang="en-US" altLang="zh-CN" sz="2800" b="1" dirty="0">
-              <a:latin typeface="Times New Roman" panose="02020603050405020304" pitchFamily="18" charset="0"/>
-              <a:ea typeface="微软雅黑" panose="020B0503020204020204" pitchFamily="34" charset="-122"/>
-              <a:cs typeface="Times New Roman" panose="02020603050405020304" pitchFamily="18" charset="0"/>
-            </a:endParaRPr>
-          </a:p>
-          <a:p>
-            <a:pPr fontAlgn="auto">
-              <a:lnSpc>
-                <a:spcPct val="150000"/>
-              </a:lnSpc>
-              <a:spcAft>
-                <a:spcPts val="0"/>
-              </a:spcAft>
-            </a:pPr>
             <a:endParaRPr lang="en-US" altLang="zh-CN" sz="2800" b="1" dirty="0">
               <a:latin typeface="Times New Roman" panose="02020603050405020304" pitchFamily="18" charset="0"/>
               <a:ea typeface="微软雅黑" panose="020B0503020204020204" pitchFamily="34" charset="-122"/>

</xml_diff>